<commit_message>
Before refactoring with main/test
</commit_message>
<xml_diff>
--- a/doc/Steps overview.pptx
+++ b/doc/Steps overview.pptx
@@ -16,9 +16,10 @@
     <p:sldId id="269" r:id="rId10"/>
     <p:sldId id="267" r:id="rId11"/>
     <p:sldId id="271" r:id="rId12"/>
-    <p:sldId id="261" r:id="rId13"/>
-    <p:sldId id="262" r:id="rId14"/>
-    <p:sldId id="260" r:id="rId15"/>
+    <p:sldId id="272" r:id="rId13"/>
+    <p:sldId id="261" r:id="rId14"/>
+    <p:sldId id="262" r:id="rId15"/>
+    <p:sldId id="260" r:id="rId16"/>
   </p:sldIdLst>
   <p:sldSz cx="12192000" cy="6858000"/>
   <p:notesSz cx="6858000" cy="9144000"/>
@@ -3720,6 +3721,93 @@
   <p:cSld>
     <p:spTree>
       <p:nvGrpSpPr>
+        <p:cNvPr id="1" name=""/>
+        <p:cNvGrpSpPr/>
+        <p:nvPr/>
+      </p:nvGrpSpPr>
+      <p:grpSpPr>
+        <a:xfrm>
+          <a:off x="0" y="0"/>
+          <a:ext cx="0" cy="0"/>
+          <a:chOff x="0" y="0"/>
+          <a:chExt cx="0" cy="0"/>
+        </a:xfrm>
+      </p:grpSpPr>
+      <p:sp>
+        <p:nvSpPr>
+          <p:cNvPr id="2" name="Titre 1">
+            <a:extLst>
+              <a:ext uri="{FF2B5EF4-FFF2-40B4-BE49-F238E27FC236}">
+                <a16:creationId xmlns:a16="http://schemas.microsoft.com/office/drawing/2014/main" id="{4670362E-1FFE-AA2A-385D-F8315FBCEF68}"/>
+              </a:ext>
+            </a:extLst>
+          </p:cNvPr>
+          <p:cNvSpPr>
+            <a:spLocks noGrp="1"/>
+          </p:cNvSpPr>
+          <p:nvPr>
+            <p:ph type="title"/>
+          </p:nvPr>
+        </p:nvSpPr>
+        <p:spPr/>
+        <p:txBody>
+          <a:bodyPr/>
+          <a:lstStyle/>
+          <a:p>
+            <a:r>
+              <a:rPr lang="en-GB" dirty="0"/>
+              <a:t>Libraries not accessible</a:t>
+            </a:r>
+          </a:p>
+        </p:txBody>
+      </p:sp>
+      <p:pic>
+        <p:nvPicPr>
+          <p:cNvPr id="5" name="Espace réservé du contenu 4">
+            <a:extLst>
+              <a:ext uri="{FF2B5EF4-FFF2-40B4-BE49-F238E27FC236}">
+                <a16:creationId xmlns:a16="http://schemas.microsoft.com/office/drawing/2014/main" id="{24B90690-CF0C-865F-A6C0-6F661F1620D7}"/>
+              </a:ext>
+            </a:extLst>
+          </p:cNvPr>
+          <p:cNvPicPr>
+            <a:picLocks noGrp="1" noChangeAspect="1"/>
+          </p:cNvPicPr>
+          <p:nvPr>
+            <p:ph idx="1"/>
+          </p:nvPr>
+        </p:nvPicPr>
+        <p:blipFill>
+          <a:blip r:embed="rId2"/>
+          <a:stretch>
+            <a:fillRect/>
+          </a:stretch>
+        </p:blipFill>
+        <p:spPr>
+          <a:xfrm>
+            <a:off x="923925" y="1562881"/>
+            <a:ext cx="5124450" cy="1466794"/>
+          </a:xfrm>
+        </p:spPr>
+      </p:pic>
+    </p:spTree>
+    <p:extLst>
+      <p:ext uri="{BB962C8B-B14F-4D97-AF65-F5344CB8AC3E}">
+        <p14:creationId xmlns:p14="http://schemas.microsoft.com/office/powerpoint/2010/main" val="451518883"/>
+      </p:ext>
+    </p:extLst>
+  </p:cSld>
+  <p:clrMapOvr>
+    <a:masterClrMapping/>
+  </p:clrMapOvr>
+</p:sld>
+</file>
+
+<file path=ppt/slides/slide13.xml><?xml version="1.0" encoding="utf-8"?>
+<p:sld xmlns:a="http://schemas.openxmlformats.org/drawingml/2006/main" xmlns:r="http://schemas.openxmlformats.org/officeDocument/2006/relationships" xmlns:p="http://schemas.openxmlformats.org/presentationml/2006/main">
+  <p:cSld>
+    <p:spTree>
+      <p:nvGrpSpPr>
         <p:cNvPr id="1" name="">
           <a:extLst>
             <a:ext uri="{FF2B5EF4-FFF2-40B4-BE49-F238E27FC236}">
@@ -3908,7 +3996,7 @@
 </p:sld>
 </file>
 
-<file path=ppt/slides/slide13.xml><?xml version="1.0" encoding="utf-8"?>
+<file path=ppt/slides/slide14.xml><?xml version="1.0" encoding="utf-8"?>
 <p:sld xmlns:a="http://schemas.openxmlformats.org/drawingml/2006/main" xmlns:r="http://schemas.openxmlformats.org/officeDocument/2006/relationships" xmlns:p="http://schemas.openxmlformats.org/presentationml/2006/main">
   <p:cSld>
     <p:spTree>
@@ -4053,7 +4141,7 @@
 </p:sld>
 </file>
 
-<file path=ppt/slides/slide14.xml><?xml version="1.0" encoding="utf-8"?>
+<file path=ppt/slides/slide15.xml><?xml version="1.0" encoding="utf-8"?>
 <p:sld xmlns:a="http://schemas.openxmlformats.org/drawingml/2006/main" xmlns:r="http://schemas.openxmlformats.org/officeDocument/2006/relationships" xmlns:p="http://schemas.openxmlformats.org/presentationml/2006/main">
   <p:cSld>
     <p:spTree>
@@ -8556,12 +8644,8 @@
           <a:lstStyle/>
           <a:p>
             <a:r>
-              <a:rPr lang="en-GB" dirty="0"/>
-              <a:t>Aligning code with </a:t>
-            </a:r>
-            <a:r>
-              <a:rPr lang="en-GB" dirty="0" err="1"/>
-              <a:t>github</a:t>
+              <a:rPr lang="en-GB"/>
+              <a:t>Aligning code with github</a:t>
             </a:r>
             <a:endParaRPr lang="en-GB" dirty="0"/>
           </a:p>

</xml_diff>

<commit_message>
First working configuration with snakeyaml
</commit_message>
<xml_diff>
--- a/doc/Steps overview.pptx
+++ b/doc/Steps overview.pptx
@@ -16,14 +16,15 @@
     <p:sldId id="269" r:id="rId10"/>
     <p:sldId id="267" r:id="rId11"/>
     <p:sldId id="271" r:id="rId12"/>
-    <p:sldId id="272" r:id="rId13"/>
-    <p:sldId id="261" r:id="rId14"/>
-    <p:sldId id="273" r:id="rId15"/>
-    <p:sldId id="274" r:id="rId16"/>
-    <p:sldId id="276" r:id="rId17"/>
-    <p:sldId id="275" r:id="rId18"/>
-    <p:sldId id="262" r:id="rId19"/>
-    <p:sldId id="260" r:id="rId20"/>
+    <p:sldId id="277" r:id="rId13"/>
+    <p:sldId id="272" r:id="rId14"/>
+    <p:sldId id="261" r:id="rId15"/>
+    <p:sldId id="273" r:id="rId16"/>
+    <p:sldId id="274" r:id="rId17"/>
+    <p:sldId id="276" r:id="rId18"/>
+    <p:sldId id="275" r:id="rId19"/>
+    <p:sldId id="262" r:id="rId20"/>
+    <p:sldId id="260" r:id="rId21"/>
   </p:sldIdLst>
   <p:sldSz cx="12192000" cy="6858000"/>
   <p:notesSz cx="6858000" cy="9144000"/>
@@ -279,7 +280,7 @@
           <a:p>
             <a:fld id="{54E383A8-4E35-4FEC-85D5-4853630A56E9}" type="datetimeFigureOut">
               <a:rPr lang="LID4096" smtClean="0"/>
-              <a:t>02/12/2024</a:t>
+              <a:t>02/13/2024</a:t>
             </a:fld>
             <a:endParaRPr lang="LID4096"/>
           </a:p>
@@ -479,7 +480,7 @@
           <a:p>
             <a:fld id="{54E383A8-4E35-4FEC-85D5-4853630A56E9}" type="datetimeFigureOut">
               <a:rPr lang="LID4096" smtClean="0"/>
-              <a:t>02/12/2024</a:t>
+              <a:t>02/13/2024</a:t>
             </a:fld>
             <a:endParaRPr lang="LID4096"/>
           </a:p>
@@ -689,7 +690,7 @@
           <a:p>
             <a:fld id="{54E383A8-4E35-4FEC-85D5-4853630A56E9}" type="datetimeFigureOut">
               <a:rPr lang="LID4096" smtClean="0"/>
-              <a:t>02/12/2024</a:t>
+              <a:t>02/13/2024</a:t>
             </a:fld>
             <a:endParaRPr lang="LID4096"/>
           </a:p>
@@ -889,7 +890,7 @@
           <a:p>
             <a:fld id="{54E383A8-4E35-4FEC-85D5-4853630A56E9}" type="datetimeFigureOut">
               <a:rPr lang="LID4096" smtClean="0"/>
-              <a:t>02/12/2024</a:t>
+              <a:t>02/13/2024</a:t>
             </a:fld>
             <a:endParaRPr lang="LID4096"/>
           </a:p>
@@ -1165,7 +1166,7 @@
           <a:p>
             <a:fld id="{54E383A8-4E35-4FEC-85D5-4853630A56E9}" type="datetimeFigureOut">
               <a:rPr lang="LID4096" smtClean="0"/>
-              <a:t>02/12/2024</a:t>
+              <a:t>02/13/2024</a:t>
             </a:fld>
             <a:endParaRPr lang="LID4096"/>
           </a:p>
@@ -1433,7 +1434,7 @@
           <a:p>
             <a:fld id="{54E383A8-4E35-4FEC-85D5-4853630A56E9}" type="datetimeFigureOut">
               <a:rPr lang="LID4096" smtClean="0"/>
-              <a:t>02/12/2024</a:t>
+              <a:t>02/13/2024</a:t>
             </a:fld>
             <a:endParaRPr lang="LID4096"/>
           </a:p>
@@ -1848,7 +1849,7 @@
           <a:p>
             <a:fld id="{54E383A8-4E35-4FEC-85D5-4853630A56E9}" type="datetimeFigureOut">
               <a:rPr lang="LID4096" smtClean="0"/>
-              <a:t>02/12/2024</a:t>
+              <a:t>02/13/2024</a:t>
             </a:fld>
             <a:endParaRPr lang="LID4096"/>
           </a:p>
@@ -1990,7 +1991,7 @@
           <a:p>
             <a:fld id="{54E383A8-4E35-4FEC-85D5-4853630A56E9}" type="datetimeFigureOut">
               <a:rPr lang="LID4096" smtClean="0"/>
-              <a:t>02/12/2024</a:t>
+              <a:t>02/13/2024</a:t>
             </a:fld>
             <a:endParaRPr lang="LID4096"/>
           </a:p>
@@ -2103,7 +2104,7 @@
           <a:p>
             <a:fld id="{54E383A8-4E35-4FEC-85D5-4853630A56E9}" type="datetimeFigureOut">
               <a:rPr lang="LID4096" smtClean="0"/>
-              <a:t>02/12/2024</a:t>
+              <a:t>02/13/2024</a:t>
             </a:fld>
             <a:endParaRPr lang="LID4096"/>
           </a:p>
@@ -2416,7 +2417,7 @@
           <a:p>
             <a:fld id="{54E383A8-4E35-4FEC-85D5-4853630A56E9}" type="datetimeFigureOut">
               <a:rPr lang="LID4096" smtClean="0"/>
-              <a:t>02/12/2024</a:t>
+              <a:t>02/13/2024</a:t>
             </a:fld>
             <a:endParaRPr lang="LID4096"/>
           </a:p>
@@ -2705,7 +2706,7 @@
           <a:p>
             <a:fld id="{54E383A8-4E35-4FEC-85D5-4853630A56E9}" type="datetimeFigureOut">
               <a:rPr lang="LID4096" smtClean="0"/>
-              <a:t>02/12/2024</a:t>
+              <a:t>02/13/2024</a:t>
             </a:fld>
             <a:endParaRPr lang="LID4096"/>
           </a:p>
@@ -2948,7 +2949,7 @@
           <a:p>
             <a:fld id="{54E383A8-4E35-4FEC-85D5-4853630A56E9}" type="datetimeFigureOut">
               <a:rPr lang="LID4096" smtClean="0"/>
-              <a:t>02/12/2024</a:t>
+              <a:t>02/13/2024</a:t>
             </a:fld>
             <a:endParaRPr lang="LID4096"/>
           </a:p>
@@ -3388,6 +3389,13 @@
           <a:p>
             <a:r>
               <a:rPr lang="en-GB" dirty="0"/>
+              <a:t>Yet Another </a:t>
+            </a:r>
+            <a:br>
+              <a:rPr lang="en-GB" dirty="0"/>
+            </a:br>
+            <a:r>
+              <a:rPr lang="en-GB" dirty="0"/>
               <a:t>VU-meter</a:t>
             </a:r>
           </a:p>
@@ -3541,8 +3549,8 @@
         </p:nvSpPr>
         <p:spPr>
           <a:xfrm rot="19410285">
-            <a:off x="5025005" y="3665989"/>
-            <a:ext cx="737574" cy="369332"/>
+            <a:off x="4794912" y="3665989"/>
+            <a:ext cx="1197764" cy="369332"/>
           </a:xfrm>
           <a:prstGeom prst="rect">
             <a:avLst/>
@@ -3558,10 +3566,10 @@
             <a:r>
               <a:rPr lang="en-GB" dirty="0">
                 <a:solidFill>
-                  <a:srgbClr val="FF0000"/>
+                  <a:srgbClr val="FFC000"/>
                 </a:solidFill>
               </a:rPr>
-              <a:t>TODO</a:t>
+              <a:t>On going…</a:t>
             </a:r>
           </a:p>
         </p:txBody>
@@ -3852,6 +3860,170 @@
           <p:cNvPr id="2" name="Titre 1">
             <a:extLst>
               <a:ext uri="{FF2B5EF4-FFF2-40B4-BE49-F238E27FC236}">
+                <a16:creationId xmlns:a16="http://schemas.microsoft.com/office/drawing/2014/main" id="{9ED20E8D-EAEE-1BCF-434A-4DA0B2653CB2}"/>
+              </a:ext>
+            </a:extLst>
+          </p:cNvPr>
+          <p:cNvSpPr>
+            <a:spLocks noGrp="1"/>
+          </p:cNvSpPr>
+          <p:nvPr>
+            <p:ph type="title"/>
+          </p:nvPr>
+        </p:nvSpPr>
+        <p:spPr/>
+        <p:txBody>
+          <a:bodyPr/>
+          <a:lstStyle/>
+          <a:p>
+            <a:r>
+              <a:rPr lang="en-GB" dirty="0"/>
+              <a:t>Configuration</a:t>
+            </a:r>
+          </a:p>
+        </p:txBody>
+      </p:sp>
+      <p:sp>
+        <p:nvSpPr>
+          <p:cNvPr id="3" name="Espace réservé du contenu 2">
+            <a:extLst>
+              <a:ext uri="{FF2B5EF4-FFF2-40B4-BE49-F238E27FC236}">
+                <a16:creationId xmlns:a16="http://schemas.microsoft.com/office/drawing/2014/main" id="{CE7B7F40-0EB7-39AE-CD3C-3531D62D2D17}"/>
+              </a:ext>
+            </a:extLst>
+          </p:cNvPr>
+          <p:cNvSpPr>
+            <a:spLocks noGrp="1"/>
+          </p:cNvSpPr>
+          <p:nvPr>
+            <p:ph idx="1"/>
+          </p:nvPr>
+        </p:nvSpPr>
+        <p:spPr/>
+        <p:txBody>
+          <a:bodyPr/>
+          <a:lstStyle/>
+          <a:p>
+            <a:r>
+              <a:rPr lang="en-GB" dirty="0"/>
+              <a:t>Selected solution: </a:t>
+            </a:r>
+            <a:r>
+              <a:rPr lang="en-GB" dirty="0" err="1"/>
+              <a:t>snakeyaml</a:t>
+            </a:r>
+            <a:endParaRPr lang="en-GB" dirty="0"/>
+          </a:p>
+          <a:p>
+            <a:r>
+              <a:rPr lang="en-GB" dirty="0"/>
+              <a:t>Eclipse plugin :</a:t>
+            </a:r>
+          </a:p>
+          <a:p>
+            <a:pPr marL="0" indent="0">
+              <a:buNone/>
+            </a:pPr>
+            <a:r>
+              <a:rPr lang="en-GB" dirty="0">
+                <a:hlinkClick r:id="rId2"/>
+              </a:rPr>
+              <a:t>https://marketplace.eclipse.org/content/liclipsetext</a:t>
+            </a:r>
+            <a:endParaRPr lang="en-GB" dirty="0"/>
+          </a:p>
+          <a:p>
+            <a:pPr marL="0" indent="0">
+              <a:buNone/>
+            </a:pPr>
+            <a:r>
+              <a:rPr lang="en-GB" dirty="0"/>
+              <a:t>Note: </a:t>
+            </a:r>
+            <a:r>
+              <a:rPr lang="en-GB" dirty="0">
+                <a:hlinkClick r:id="rId3"/>
+              </a:rPr>
+              <a:t>https://github.com/de-jcup/update-site-eclipse-yaml-editor/tree/main</a:t>
+            </a:r>
+            <a:r>
+              <a:rPr lang="en-GB" dirty="0"/>
+              <a:t> is not working...</a:t>
+            </a:r>
+          </a:p>
+          <a:p>
+            <a:endParaRPr lang="en-GB" dirty="0"/>
+          </a:p>
+          <a:p>
+            <a:endParaRPr lang="en-GB" dirty="0"/>
+          </a:p>
+        </p:txBody>
+      </p:sp>
+      <p:pic>
+        <p:nvPicPr>
+          <p:cNvPr id="5" name="Image 4">
+            <a:extLst>
+              <a:ext uri="{FF2B5EF4-FFF2-40B4-BE49-F238E27FC236}">
+                <a16:creationId xmlns:a16="http://schemas.microsoft.com/office/drawing/2014/main" id="{764B4125-99D4-A06D-3505-1DF5138A7FCF}"/>
+              </a:ext>
+            </a:extLst>
+          </p:cNvPr>
+          <p:cNvPicPr>
+            <a:picLocks noChangeAspect="1"/>
+          </p:cNvPicPr>
+          <p:nvPr/>
+        </p:nvPicPr>
+        <p:blipFill>
+          <a:blip r:embed="rId4"/>
+          <a:stretch>
+            <a:fillRect/>
+          </a:stretch>
+        </p:blipFill>
+        <p:spPr>
+          <a:xfrm>
+            <a:off x="7290165" y="5394345"/>
+            <a:ext cx="3362325" cy="1658634"/>
+          </a:xfrm>
+          <a:prstGeom prst="rect">
+            <a:avLst/>
+          </a:prstGeom>
+        </p:spPr>
+      </p:pic>
+    </p:spTree>
+    <p:extLst>
+      <p:ext uri="{BB962C8B-B14F-4D97-AF65-F5344CB8AC3E}">
+        <p14:creationId xmlns:p14="http://schemas.microsoft.com/office/powerpoint/2010/main" val="3735636471"/>
+      </p:ext>
+    </p:extLst>
+  </p:cSld>
+  <p:clrMapOvr>
+    <a:masterClrMapping/>
+  </p:clrMapOvr>
+</p:sld>
+</file>
+
+<file path=ppt/slides/slide13.xml><?xml version="1.0" encoding="utf-8"?>
+<p:sld xmlns:a="http://schemas.openxmlformats.org/drawingml/2006/main" xmlns:r="http://schemas.openxmlformats.org/officeDocument/2006/relationships" xmlns:p="http://schemas.openxmlformats.org/presentationml/2006/main">
+  <p:cSld>
+    <p:spTree>
+      <p:nvGrpSpPr>
+        <p:cNvPr id="1" name=""/>
+        <p:cNvGrpSpPr/>
+        <p:nvPr/>
+      </p:nvGrpSpPr>
+      <p:grpSpPr>
+        <a:xfrm>
+          <a:off x="0" y="0"/>
+          <a:ext cx="0" cy="0"/>
+          <a:chOff x="0" y="0"/>
+          <a:chExt cx="0" cy="0"/>
+        </a:xfrm>
+      </p:grpSpPr>
+      <p:sp>
+        <p:nvSpPr>
+          <p:cNvPr id="2" name="Titre 1">
+            <a:extLst>
+              <a:ext uri="{FF2B5EF4-FFF2-40B4-BE49-F238E27FC236}">
                 <a16:creationId xmlns:a16="http://schemas.microsoft.com/office/drawing/2014/main" id="{4670362E-1FFE-AA2A-385D-F8315FBCEF68}"/>
               </a:ext>
             </a:extLst>
@@ -3917,7 +4089,7 @@
 </p:sld>
 </file>
 
-<file path=ppt/slides/slide13.xml><?xml version="1.0" encoding="utf-8"?>
+<file path=ppt/slides/slide14.xml><?xml version="1.0" encoding="utf-8"?>
 <p:sld xmlns:a="http://schemas.openxmlformats.org/drawingml/2006/main" xmlns:r="http://schemas.openxmlformats.org/officeDocument/2006/relationships" xmlns:p="http://schemas.openxmlformats.org/presentationml/2006/main">
   <p:cSld>
     <p:spTree>
@@ -4104,7 +4276,7 @@
 </p:sld>
 </file>
 
-<file path=ppt/slides/slide14.xml><?xml version="1.0" encoding="utf-8"?>
+<file path=ppt/slides/slide15.xml><?xml version="1.0" encoding="utf-8"?>
 <p:sld xmlns:a="http://schemas.openxmlformats.org/drawingml/2006/main" xmlns:r="http://schemas.openxmlformats.org/officeDocument/2006/relationships" xmlns:p="http://schemas.openxmlformats.org/presentationml/2006/main">
   <p:cSld>
     <p:spTree>
@@ -4850,7 +5022,7 @@
 </p:sld>
 </file>
 
-<file path=ppt/slides/slide15.xml><?xml version="1.0" encoding="utf-8"?>
+<file path=ppt/slides/slide16.xml><?xml version="1.0" encoding="utf-8"?>
 <p:sld xmlns:a="http://schemas.openxmlformats.org/drawingml/2006/main" xmlns:r="http://schemas.openxmlformats.org/officeDocument/2006/relationships" xmlns:p="http://schemas.openxmlformats.org/presentationml/2006/main">
   <p:cSld>
     <p:spTree>
@@ -5964,7 +6136,7 @@
 </p:sld>
 </file>
 
-<file path=ppt/slides/slide16.xml><?xml version="1.0" encoding="utf-8"?>
+<file path=ppt/slides/slide17.xml><?xml version="1.0" encoding="utf-8"?>
 <p:sld xmlns:a="http://schemas.openxmlformats.org/drawingml/2006/main" xmlns:r="http://schemas.openxmlformats.org/officeDocument/2006/relationships" xmlns:p="http://schemas.openxmlformats.org/presentationml/2006/main">
   <p:cSld>
     <p:spTree>
@@ -6909,7 +7081,7 @@
 </p:sld>
 </file>
 
-<file path=ppt/slides/slide17.xml><?xml version="1.0" encoding="utf-8"?>
+<file path=ppt/slides/slide18.xml><?xml version="1.0" encoding="utf-8"?>
 <p:sld xmlns:a="http://schemas.openxmlformats.org/drawingml/2006/main" xmlns:r="http://schemas.openxmlformats.org/officeDocument/2006/relationships" xmlns:p="http://schemas.openxmlformats.org/presentationml/2006/main">
   <p:cSld>
     <p:spTree>
@@ -8005,7 +8177,7 @@
 </p:sld>
 </file>
 
-<file path=ppt/slides/slide18.xml><?xml version="1.0" encoding="utf-8"?>
+<file path=ppt/slides/slide19.xml><?xml version="1.0" encoding="utf-8"?>
 <p:sld xmlns:a="http://schemas.openxmlformats.org/drawingml/2006/main" xmlns:r="http://schemas.openxmlformats.org/officeDocument/2006/relationships" xmlns:p="http://schemas.openxmlformats.org/presentationml/2006/main">
   <p:cSld>
     <p:spTree>
@@ -8141,137 +8313,6 @@
     <p:extLst>
       <p:ext uri="{BB962C8B-B14F-4D97-AF65-F5344CB8AC3E}">
         <p14:creationId xmlns:p14="http://schemas.microsoft.com/office/powerpoint/2010/main" val="1762366662"/>
-      </p:ext>
-    </p:extLst>
-  </p:cSld>
-  <p:clrMapOvr>
-    <a:masterClrMapping/>
-  </p:clrMapOvr>
-</p:sld>
-</file>
-
-<file path=ppt/slides/slide19.xml><?xml version="1.0" encoding="utf-8"?>
-<p:sld xmlns:a="http://schemas.openxmlformats.org/drawingml/2006/main" xmlns:r="http://schemas.openxmlformats.org/officeDocument/2006/relationships" xmlns:p="http://schemas.openxmlformats.org/presentationml/2006/main">
-  <p:cSld>
-    <p:spTree>
-      <p:nvGrpSpPr>
-        <p:cNvPr id="1" name=""/>
-        <p:cNvGrpSpPr/>
-        <p:nvPr/>
-      </p:nvGrpSpPr>
-      <p:grpSpPr>
-        <a:xfrm>
-          <a:off x="0" y="0"/>
-          <a:ext cx="0" cy="0"/>
-          <a:chOff x="0" y="0"/>
-          <a:chExt cx="0" cy="0"/>
-        </a:xfrm>
-      </p:grpSpPr>
-      <p:sp>
-        <p:nvSpPr>
-          <p:cNvPr id="2" name="Titre 1">
-            <a:extLst>
-              <a:ext uri="{FF2B5EF4-FFF2-40B4-BE49-F238E27FC236}">
-                <a16:creationId xmlns:a16="http://schemas.microsoft.com/office/drawing/2014/main" id="{5CABA1D9-3AE1-4B10-25F7-8379A4E72456}"/>
-              </a:ext>
-            </a:extLst>
-          </p:cNvPr>
-          <p:cNvSpPr>
-            <a:spLocks noGrp="1"/>
-          </p:cNvSpPr>
-          <p:nvPr>
-            <p:ph type="title"/>
-          </p:nvPr>
-        </p:nvSpPr>
-        <p:spPr/>
-        <p:txBody>
-          <a:bodyPr/>
-          <a:lstStyle/>
-          <a:p>
-            <a:r>
-              <a:rPr lang="en-GB" dirty="0"/>
-              <a:t>Step 5 – Mobile</a:t>
-            </a:r>
-          </a:p>
-        </p:txBody>
-      </p:sp>
-      <p:sp>
-        <p:nvSpPr>
-          <p:cNvPr id="3" name="Espace réservé du contenu 2">
-            <a:extLst>
-              <a:ext uri="{FF2B5EF4-FFF2-40B4-BE49-F238E27FC236}">
-                <a16:creationId xmlns:a16="http://schemas.microsoft.com/office/drawing/2014/main" id="{C025A62A-E994-CA58-30C0-B3581DBBDFA1}"/>
-              </a:ext>
-            </a:extLst>
-          </p:cNvPr>
-          <p:cNvSpPr>
-            <a:spLocks noGrp="1"/>
-          </p:cNvSpPr>
-          <p:nvPr>
-            <p:ph idx="1"/>
-          </p:nvPr>
-        </p:nvSpPr>
-        <p:spPr/>
-        <p:txBody>
-          <a:bodyPr/>
-          <a:lstStyle/>
-          <a:p>
-            <a:r>
-              <a:rPr lang="en-GB" dirty="0"/>
-              <a:t>Reverse client/server model (like X-windows)?</a:t>
-            </a:r>
-          </a:p>
-          <a:p>
-            <a:r>
-              <a:rPr lang="en-GB" dirty="0"/>
-              <a:t>Framework: ??</a:t>
-            </a:r>
-          </a:p>
-        </p:txBody>
-      </p:sp>
-      <p:sp>
-        <p:nvSpPr>
-          <p:cNvPr id="4" name="ZoneTexte 3">
-            <a:extLst>
-              <a:ext uri="{FF2B5EF4-FFF2-40B4-BE49-F238E27FC236}">
-                <a16:creationId xmlns:a16="http://schemas.microsoft.com/office/drawing/2014/main" id="{7E1C1182-C6C6-3507-A9E3-8B70D43CABB8}"/>
-              </a:ext>
-            </a:extLst>
-          </p:cNvPr>
-          <p:cNvSpPr txBox="1"/>
-          <p:nvPr/>
-        </p:nvSpPr>
-        <p:spPr>
-          <a:xfrm rot="19410285">
-            <a:off x="5025005" y="3665989"/>
-            <a:ext cx="737574" cy="369332"/>
-          </a:xfrm>
-          <a:prstGeom prst="rect">
-            <a:avLst/>
-          </a:prstGeom>
-          <a:noFill/>
-        </p:spPr>
-        <p:txBody>
-          <a:bodyPr wrap="none" rtlCol="0">
-            <a:spAutoFit/>
-          </a:bodyPr>
-          <a:lstStyle/>
-          <a:p>
-            <a:r>
-              <a:rPr lang="en-GB" dirty="0">
-                <a:solidFill>
-                  <a:srgbClr val="FF0000"/>
-                </a:solidFill>
-              </a:rPr>
-              <a:t>TODO</a:t>
-            </a:r>
-          </a:p>
-        </p:txBody>
-      </p:sp>
-    </p:spTree>
-    <p:extLst>
-      <p:ext uri="{BB962C8B-B14F-4D97-AF65-F5344CB8AC3E}">
-        <p14:creationId xmlns:p14="http://schemas.microsoft.com/office/powerpoint/2010/main" val="2577180211"/>
       </p:ext>
     </p:extLst>
   </p:cSld>
@@ -9182,6 +9223,137 @@
     <p:extLst>
       <p:ext uri="{BB962C8B-B14F-4D97-AF65-F5344CB8AC3E}">
         <p14:creationId xmlns:p14="http://schemas.microsoft.com/office/powerpoint/2010/main" val="1081699282"/>
+      </p:ext>
+    </p:extLst>
+  </p:cSld>
+  <p:clrMapOvr>
+    <a:masterClrMapping/>
+  </p:clrMapOvr>
+</p:sld>
+</file>
+
+<file path=ppt/slides/slide20.xml><?xml version="1.0" encoding="utf-8"?>
+<p:sld xmlns:a="http://schemas.openxmlformats.org/drawingml/2006/main" xmlns:r="http://schemas.openxmlformats.org/officeDocument/2006/relationships" xmlns:p="http://schemas.openxmlformats.org/presentationml/2006/main">
+  <p:cSld>
+    <p:spTree>
+      <p:nvGrpSpPr>
+        <p:cNvPr id="1" name=""/>
+        <p:cNvGrpSpPr/>
+        <p:nvPr/>
+      </p:nvGrpSpPr>
+      <p:grpSpPr>
+        <a:xfrm>
+          <a:off x="0" y="0"/>
+          <a:ext cx="0" cy="0"/>
+          <a:chOff x="0" y="0"/>
+          <a:chExt cx="0" cy="0"/>
+        </a:xfrm>
+      </p:grpSpPr>
+      <p:sp>
+        <p:nvSpPr>
+          <p:cNvPr id="2" name="Titre 1">
+            <a:extLst>
+              <a:ext uri="{FF2B5EF4-FFF2-40B4-BE49-F238E27FC236}">
+                <a16:creationId xmlns:a16="http://schemas.microsoft.com/office/drawing/2014/main" id="{5CABA1D9-3AE1-4B10-25F7-8379A4E72456}"/>
+              </a:ext>
+            </a:extLst>
+          </p:cNvPr>
+          <p:cNvSpPr>
+            <a:spLocks noGrp="1"/>
+          </p:cNvSpPr>
+          <p:nvPr>
+            <p:ph type="title"/>
+          </p:nvPr>
+        </p:nvSpPr>
+        <p:spPr/>
+        <p:txBody>
+          <a:bodyPr/>
+          <a:lstStyle/>
+          <a:p>
+            <a:r>
+              <a:rPr lang="en-GB" dirty="0"/>
+              <a:t>Step 5 – Mobile</a:t>
+            </a:r>
+          </a:p>
+        </p:txBody>
+      </p:sp>
+      <p:sp>
+        <p:nvSpPr>
+          <p:cNvPr id="3" name="Espace réservé du contenu 2">
+            <a:extLst>
+              <a:ext uri="{FF2B5EF4-FFF2-40B4-BE49-F238E27FC236}">
+                <a16:creationId xmlns:a16="http://schemas.microsoft.com/office/drawing/2014/main" id="{C025A62A-E994-CA58-30C0-B3581DBBDFA1}"/>
+              </a:ext>
+            </a:extLst>
+          </p:cNvPr>
+          <p:cNvSpPr>
+            <a:spLocks noGrp="1"/>
+          </p:cNvSpPr>
+          <p:nvPr>
+            <p:ph idx="1"/>
+          </p:nvPr>
+        </p:nvSpPr>
+        <p:spPr/>
+        <p:txBody>
+          <a:bodyPr/>
+          <a:lstStyle/>
+          <a:p>
+            <a:r>
+              <a:rPr lang="en-GB" dirty="0"/>
+              <a:t>Reverse client/server model (like X-windows)?</a:t>
+            </a:r>
+          </a:p>
+          <a:p>
+            <a:r>
+              <a:rPr lang="en-GB" dirty="0"/>
+              <a:t>Framework: ??</a:t>
+            </a:r>
+          </a:p>
+        </p:txBody>
+      </p:sp>
+      <p:sp>
+        <p:nvSpPr>
+          <p:cNvPr id="4" name="ZoneTexte 3">
+            <a:extLst>
+              <a:ext uri="{FF2B5EF4-FFF2-40B4-BE49-F238E27FC236}">
+                <a16:creationId xmlns:a16="http://schemas.microsoft.com/office/drawing/2014/main" id="{7E1C1182-C6C6-3507-A9E3-8B70D43CABB8}"/>
+              </a:ext>
+            </a:extLst>
+          </p:cNvPr>
+          <p:cNvSpPr txBox="1"/>
+          <p:nvPr/>
+        </p:nvSpPr>
+        <p:spPr>
+          <a:xfrm rot="19410285">
+            <a:off x="5025005" y="3665989"/>
+            <a:ext cx="737574" cy="369332"/>
+          </a:xfrm>
+          <a:prstGeom prst="rect">
+            <a:avLst/>
+          </a:prstGeom>
+          <a:noFill/>
+        </p:spPr>
+        <p:txBody>
+          <a:bodyPr wrap="none" rtlCol="0">
+            <a:spAutoFit/>
+          </a:bodyPr>
+          <a:lstStyle/>
+          <a:p>
+            <a:r>
+              <a:rPr lang="en-GB" dirty="0">
+                <a:solidFill>
+                  <a:srgbClr val="FF0000"/>
+                </a:solidFill>
+              </a:rPr>
+              <a:t>TODO</a:t>
+            </a:r>
+          </a:p>
+        </p:txBody>
+      </p:sp>
+    </p:spTree>
+    <p:extLst>
+      <p:ext uri="{BB962C8B-B14F-4D97-AF65-F5344CB8AC3E}">
+        <p14:creationId xmlns:p14="http://schemas.microsoft.com/office/powerpoint/2010/main" val="2577180211"/>
       </p:ext>
     </p:extLst>
   </p:cSld>

</xml_diff>

<commit_message>
configuration of graphical displayer
</commit_message>
<xml_diff>
--- a/doc/Steps overview.pptx
+++ b/doc/Steps overview.pptx
@@ -3658,98 +3658,105 @@
             <p:ph idx="1"/>
           </p:nvPr>
         </p:nvSpPr>
-        <p:spPr/>
-        <p:txBody>
-          <a:bodyPr/>
-          <a:lstStyle/>
-          <a:p>
-            <a:r>
-              <a:rPr lang="en-GB" dirty="0"/>
+        <p:spPr>
+          <a:xfrm>
+            <a:off x="820783" y="1425031"/>
+            <a:ext cx="10515600" cy="4351338"/>
+          </a:xfrm>
+        </p:spPr>
+        <p:txBody>
+          <a:bodyPr>
+            <a:normAutofit/>
+          </a:bodyPr>
+          <a:lstStyle/>
+          <a:p>
+            <a:r>
+              <a:rPr lang="en-GB" sz="1400" dirty="0"/>
               <a:t>Alternatives: Log4j, Log4j 2, </a:t>
             </a:r>
             <a:r>
-              <a:rPr lang="en-GB" dirty="0" err="1"/>
+              <a:rPr lang="en-GB" sz="1400" dirty="0" err="1"/>
               <a:t>Logback</a:t>
             </a:r>
             <a:r>
-              <a:rPr lang="en-GB" dirty="0"/>
+              <a:rPr lang="en-GB" sz="1400" dirty="0"/>
               <a:t>+ SL4J (</a:t>
             </a:r>
             <a:r>
-              <a:rPr lang="en-GB" sz="2000" dirty="0">
+              <a:rPr lang="en-GB" sz="1100" dirty="0">
                 <a:hlinkClick r:id="rId2"/>
               </a:rPr>
               <a:t>https://www.baeldung.com/java-logging-intro</a:t>
             </a:r>
             <a:r>
-              <a:rPr lang="en-GB" dirty="0"/>
+              <a:rPr lang="en-GB" sz="1400" dirty="0"/>
               <a:t>)</a:t>
             </a:r>
           </a:p>
           <a:p>
             <a:r>
-              <a:rPr lang="en-GB" dirty="0"/>
+              <a:rPr lang="en-GB" sz="1400" dirty="0"/>
               <a:t>Selection: SL4J+Logback because </a:t>
             </a:r>
             <a:r>
-              <a:rPr lang="en-US" dirty="0"/>
+              <a:rPr lang="en-US" sz="1400" dirty="0"/>
               <a:t>provides a common interface and abstraction for most of the Java logging frameworks.</a:t>
             </a:r>
             <a:br>
-              <a:rPr lang="en-US" dirty="0"/>
+              <a:rPr lang="en-US" sz="1400" dirty="0"/>
             </a:br>
             <a:r>
-              <a:rPr lang="en-US" dirty="0">
+              <a:rPr lang="en-US" sz="1400" dirty="0">
                 <a:hlinkClick r:id="rId3"/>
               </a:rPr>
               <a:t>https://www.baeldung.com/logback</a:t>
             </a:r>
             <a:br>
-              <a:rPr lang="en-US" dirty="0"/>
+              <a:rPr lang="en-US" sz="1400" dirty="0"/>
             </a:br>
-            <a:endParaRPr lang="en-US" dirty="0"/>
-          </a:p>
-          <a:p>
-            <a:r>
-              <a:rPr lang="en-US" dirty="0"/>
+            <a:endParaRPr lang="en-US" sz="1400" dirty="0"/>
+          </a:p>
+          <a:p>
+            <a:r>
+              <a:rPr lang="en-US" sz="1400" dirty="0"/>
               <a:t>Requires to convert to Maven project</a:t>
             </a:r>
           </a:p>
           <a:p>
             <a:r>
-              <a:rPr lang="en-US" dirty="0"/>
+              <a:rPr lang="en-US" sz="1400" dirty="0"/>
               <a:t>Specify compilation option in pom.xml:</a:t>
             </a:r>
           </a:p>
           <a:p>
             <a:r>
-              <a:rPr lang="en-US" dirty="0"/>
+              <a:rPr lang="en-US" sz="1400" dirty="0"/>
               <a:t>Configure SL4J/</a:t>
             </a:r>
             <a:r>
-              <a:rPr lang="en-US" dirty="0" err="1"/>
+              <a:rPr lang="en-US" sz="1400" dirty="0" err="1"/>
               <a:t>logback</a:t>
             </a:r>
             <a:r>
-              <a:rPr lang="en-US" dirty="0"/>
+              <a:rPr lang="en-US" sz="1400" dirty="0"/>
               <a:t>: </a:t>
             </a:r>
             <a:r>
-              <a:rPr lang="en-US" dirty="0">
+              <a:rPr lang="en-US" sz="1400" dirty="0">
                 <a:hlinkClick r:id="rId4"/>
               </a:rPr>
               <a:t>https://logback.qos.ch/setup.html</a:t>
             </a:r>
-            <a:endParaRPr lang="en-US" dirty="0"/>
+            <a:endParaRPr lang="en-US" sz="1400" dirty="0"/>
           </a:p>
           <a:p>
             <a:pPr marL="0" indent="0">
               <a:buNone/>
             </a:pPr>
-            <a:endParaRPr lang="en-US" dirty="0"/>
-          </a:p>
-          <a:p>
-            <a:endParaRPr lang="en-GB" dirty="0"/>
+            <a:endParaRPr lang="en-US" sz="1400" dirty="0"/>
+          </a:p>
+          <a:p>
+            <a:endParaRPr lang="en-GB" sz="1400" dirty="0"/>
           </a:p>
         </p:txBody>
       </p:sp>
@@ -3775,7 +3782,7 @@
         </p:blipFill>
         <p:spPr>
           <a:xfrm>
-            <a:off x="7688973" y="3587341"/>
+            <a:off x="6922854" y="2055103"/>
             <a:ext cx="3523961" cy="1782311"/>
           </a:xfrm>
           <a:prstGeom prst="rect">
@@ -3797,7 +3804,7 @@
         </p:nvSpPr>
         <p:spPr>
           <a:xfrm>
-            <a:off x="8896525" y="4524200"/>
+            <a:off x="8076860" y="2975487"/>
             <a:ext cx="2162175" cy="428625"/>
           </a:xfrm>
           <a:prstGeom prst="roundRect">
@@ -3835,6 +3842,36 @@
           </a:p>
         </p:txBody>
       </p:sp>
+      <p:pic>
+        <p:nvPicPr>
+          <p:cNvPr id="7" name="Image 6">
+            <a:extLst>
+              <a:ext uri="{FF2B5EF4-FFF2-40B4-BE49-F238E27FC236}">
+                <a16:creationId xmlns:a16="http://schemas.microsoft.com/office/drawing/2014/main" id="{1F3E4468-8977-C43E-2934-26BA60882F7F}"/>
+              </a:ext>
+            </a:extLst>
+          </p:cNvPr>
+          <p:cNvPicPr>
+            <a:picLocks noChangeAspect="1"/>
+          </p:cNvPicPr>
+          <p:nvPr/>
+        </p:nvPicPr>
+        <p:blipFill>
+          <a:blip r:embed="rId6"/>
+          <a:stretch>
+            <a:fillRect/>
+          </a:stretch>
+        </p:blipFill>
+        <p:spPr>
+          <a:xfrm>
+            <a:off x="1467166" y="3893577"/>
+            <a:ext cx="4281156" cy="1765818"/>
+          </a:xfrm>
+          <a:prstGeom prst="rect">
+            <a:avLst/>
+          </a:prstGeom>
+        </p:spPr>
+      </p:pic>
     </p:spTree>
     <p:extLst>
       <p:ext uri="{BB962C8B-B14F-4D97-AF65-F5344CB8AC3E}">

</xml_diff>

<commit_message>
Multithreaded processing (monitoring + screen handling)
</commit_message>
<xml_diff>
--- a/doc/Steps overview.pptx
+++ b/doc/Steps overview.pptx
@@ -32,9 +32,14 @@
     <p:sldId id="284" r:id="rId26"/>
     <p:sldId id="285" r:id="rId27"/>
     <p:sldId id="286" r:id="rId28"/>
-    <p:sldId id="262" r:id="rId29"/>
-    <p:sldId id="260" r:id="rId30"/>
-    <p:sldId id="278" r:id="rId31"/>
+    <p:sldId id="288" r:id="rId29"/>
+    <p:sldId id="291" r:id="rId30"/>
+    <p:sldId id="290" r:id="rId31"/>
+    <p:sldId id="292" r:id="rId32"/>
+    <p:sldId id="289" r:id="rId33"/>
+    <p:sldId id="262" r:id="rId34"/>
+    <p:sldId id="260" r:id="rId35"/>
+    <p:sldId id="278" r:id="rId36"/>
   </p:sldIdLst>
   <p:sldSz cx="12192000" cy="6858000"/>
   <p:notesSz cx="6858000" cy="9144000"/>
@@ -290,7 +295,7 @@
           <a:p>
             <a:fld id="{54E383A8-4E35-4FEC-85D5-4853630A56E9}" type="datetimeFigureOut">
               <a:rPr lang="LID4096" smtClean="0"/>
-              <a:t>02/14/2024</a:t>
+              <a:t>02/15/2024</a:t>
             </a:fld>
             <a:endParaRPr lang="LID4096"/>
           </a:p>
@@ -490,7 +495,7 @@
           <a:p>
             <a:fld id="{54E383A8-4E35-4FEC-85D5-4853630A56E9}" type="datetimeFigureOut">
               <a:rPr lang="LID4096" smtClean="0"/>
-              <a:t>02/14/2024</a:t>
+              <a:t>02/15/2024</a:t>
             </a:fld>
             <a:endParaRPr lang="LID4096"/>
           </a:p>
@@ -700,7 +705,7 @@
           <a:p>
             <a:fld id="{54E383A8-4E35-4FEC-85D5-4853630A56E9}" type="datetimeFigureOut">
               <a:rPr lang="LID4096" smtClean="0"/>
-              <a:t>02/14/2024</a:t>
+              <a:t>02/15/2024</a:t>
             </a:fld>
             <a:endParaRPr lang="LID4096"/>
           </a:p>
@@ -900,7 +905,7 @@
           <a:p>
             <a:fld id="{54E383A8-4E35-4FEC-85D5-4853630A56E9}" type="datetimeFigureOut">
               <a:rPr lang="LID4096" smtClean="0"/>
-              <a:t>02/14/2024</a:t>
+              <a:t>02/15/2024</a:t>
             </a:fld>
             <a:endParaRPr lang="LID4096"/>
           </a:p>
@@ -1176,7 +1181,7 @@
           <a:p>
             <a:fld id="{54E383A8-4E35-4FEC-85D5-4853630A56E9}" type="datetimeFigureOut">
               <a:rPr lang="LID4096" smtClean="0"/>
-              <a:t>02/14/2024</a:t>
+              <a:t>02/15/2024</a:t>
             </a:fld>
             <a:endParaRPr lang="LID4096"/>
           </a:p>
@@ -1444,7 +1449,7 @@
           <a:p>
             <a:fld id="{54E383A8-4E35-4FEC-85D5-4853630A56E9}" type="datetimeFigureOut">
               <a:rPr lang="LID4096" smtClean="0"/>
-              <a:t>02/14/2024</a:t>
+              <a:t>02/15/2024</a:t>
             </a:fld>
             <a:endParaRPr lang="LID4096"/>
           </a:p>
@@ -1859,7 +1864,7 @@
           <a:p>
             <a:fld id="{54E383A8-4E35-4FEC-85D5-4853630A56E9}" type="datetimeFigureOut">
               <a:rPr lang="LID4096" smtClean="0"/>
-              <a:t>02/14/2024</a:t>
+              <a:t>02/15/2024</a:t>
             </a:fld>
             <a:endParaRPr lang="LID4096"/>
           </a:p>
@@ -2001,7 +2006,7 @@
           <a:p>
             <a:fld id="{54E383A8-4E35-4FEC-85D5-4853630A56E9}" type="datetimeFigureOut">
               <a:rPr lang="LID4096" smtClean="0"/>
-              <a:t>02/14/2024</a:t>
+              <a:t>02/15/2024</a:t>
             </a:fld>
             <a:endParaRPr lang="LID4096"/>
           </a:p>
@@ -2114,7 +2119,7 @@
           <a:p>
             <a:fld id="{54E383A8-4E35-4FEC-85D5-4853630A56E9}" type="datetimeFigureOut">
               <a:rPr lang="LID4096" smtClean="0"/>
-              <a:t>02/14/2024</a:t>
+              <a:t>02/15/2024</a:t>
             </a:fld>
             <a:endParaRPr lang="LID4096"/>
           </a:p>
@@ -2427,7 +2432,7 @@
           <a:p>
             <a:fld id="{54E383A8-4E35-4FEC-85D5-4853630A56E9}" type="datetimeFigureOut">
               <a:rPr lang="LID4096" smtClean="0"/>
-              <a:t>02/14/2024</a:t>
+              <a:t>02/15/2024</a:t>
             </a:fld>
             <a:endParaRPr lang="LID4096"/>
           </a:p>
@@ -2716,7 +2721,7 @@
           <a:p>
             <a:fld id="{54E383A8-4E35-4FEC-85D5-4853630A56E9}" type="datetimeFigureOut">
               <a:rPr lang="LID4096" smtClean="0"/>
-              <a:t>02/14/2024</a:t>
+              <a:t>02/15/2024</a:t>
             </a:fld>
             <a:endParaRPr lang="LID4096"/>
           </a:p>
@@ -2959,7 +2964,7 @@
           <a:p>
             <a:fld id="{54E383A8-4E35-4FEC-85D5-4853630A56E9}" type="datetimeFigureOut">
               <a:rPr lang="LID4096" smtClean="0"/>
-              <a:t>02/14/2024</a:t>
+              <a:t>02/15/2024</a:t>
             </a:fld>
             <a:endParaRPr lang="LID4096"/>
           </a:p>
@@ -9387,72 +9392,6 @@
           </a:p>
         </p:txBody>
       </p:sp>
-      <p:pic>
-        <p:nvPicPr>
-          <p:cNvPr id="5" name="Image 4">
-            <a:extLst>
-              <a:ext uri="{FF2B5EF4-FFF2-40B4-BE49-F238E27FC236}">
-                <a16:creationId xmlns:a16="http://schemas.microsoft.com/office/drawing/2014/main" id="{568F9307-7053-5915-0E24-97A24F4C289B}"/>
-              </a:ext>
-            </a:extLst>
-          </p:cNvPr>
-          <p:cNvPicPr>
-            <a:picLocks noChangeAspect="1"/>
-          </p:cNvPicPr>
-          <p:nvPr/>
-        </p:nvPicPr>
-        <p:blipFill>
-          <a:blip r:embed="rId2"/>
-          <a:stretch>
-            <a:fillRect/>
-          </a:stretch>
-        </p:blipFill>
-        <p:spPr>
-          <a:xfrm>
-            <a:off x="10747079" y="1788245"/>
-            <a:ext cx="7943850" cy="3857625"/>
-          </a:xfrm>
-          <a:prstGeom prst="rect">
-            <a:avLst/>
-          </a:prstGeom>
-          <a:ln>
-            <a:solidFill>
-              <a:srgbClr val="FF0000"/>
-            </a:solidFill>
-            <a:prstDash val="dashDot"/>
-          </a:ln>
-        </p:spPr>
-      </p:pic>
-      <p:pic>
-        <p:nvPicPr>
-          <p:cNvPr id="4" name="Image 3">
-            <a:extLst>
-              <a:ext uri="{FF2B5EF4-FFF2-40B4-BE49-F238E27FC236}">
-                <a16:creationId xmlns:a16="http://schemas.microsoft.com/office/drawing/2014/main" id="{CE6014E4-F351-0035-3D2F-7AD9F9C652B9}"/>
-              </a:ext>
-            </a:extLst>
-          </p:cNvPr>
-          <p:cNvPicPr>
-            <a:picLocks noChangeAspect="1"/>
-          </p:cNvPicPr>
-          <p:nvPr/>
-        </p:nvPicPr>
-        <p:blipFill>
-          <a:blip r:embed="rId3"/>
-          <a:stretch>
-            <a:fillRect/>
-          </a:stretch>
-        </p:blipFill>
-        <p:spPr>
-          <a:xfrm>
-            <a:off x="8410822" y="-2037072"/>
-            <a:ext cx="7946778" cy="4074143"/>
-          </a:xfrm>
-          <a:prstGeom prst="rect">
-            <a:avLst/>
-          </a:prstGeom>
-        </p:spPr>
-      </p:pic>
       <p:cxnSp>
         <p:nvCxnSpPr>
           <p:cNvPr id="9" name="Connecteur droit 8">
@@ -14816,16 +14755,14 @@
         </p:blipFill>
         <p:spPr>
           <a:xfrm>
-            <a:off x="12677479" y="1407245"/>
+            <a:off x="10711946" y="1441428"/>
             <a:ext cx="7943850" cy="3857625"/>
           </a:xfrm>
           <a:prstGeom prst="rect">
             <a:avLst/>
           </a:prstGeom>
           <a:ln>
-            <a:solidFill>
-              <a:srgbClr val="FF0000"/>
-            </a:solidFill>
+            <a:noFill/>
             <a:prstDash val="dashDot"/>
           </a:ln>
         </p:spPr>
@@ -15322,7 +15259,7 @@
         </p:blipFill>
         <p:spPr>
           <a:xfrm>
-            <a:off x="12652622" y="1620528"/>
+            <a:off x="10567448" y="1406883"/>
             <a:ext cx="7946778" cy="4074143"/>
           </a:xfrm>
           <a:prstGeom prst="rect">
@@ -19333,7 +19270,7 @@
           </a:prstGeom>
           <a:ln>
             <a:solidFill>
-              <a:schemeClr val="bg1"/>
+              <a:srgbClr val="FF0000"/>
             </a:solidFill>
           </a:ln>
         </p:spPr>
@@ -20831,7 +20768,7 @@
           </a:prstGeom>
           <a:ln>
             <a:solidFill>
-              <a:schemeClr val="bg1"/>
+              <a:srgbClr val="FF0000"/>
             </a:solidFill>
           </a:ln>
         </p:spPr>
@@ -21102,13 +21039,7 @@
   <p:cSld>
     <p:spTree>
       <p:nvGrpSpPr>
-        <p:cNvPr id="1" name="">
-          <a:extLst>
-            <a:ext uri="{FF2B5EF4-FFF2-40B4-BE49-F238E27FC236}">
-              <a16:creationId xmlns:a16="http://schemas.microsoft.com/office/drawing/2014/main" id="{BD080549-0AF8-4969-FBFC-DA319D487BD6}"/>
-            </a:ext>
-          </a:extLst>
-        </p:cNvPr>
+        <p:cNvPr id="1" name=""/>
         <p:cNvGrpSpPr/>
         <p:nvPr/>
       </p:nvGrpSpPr>
@@ -21125,7 +21056,7 @@
           <p:cNvPr id="2" name="Titre 1">
             <a:extLst>
               <a:ext uri="{FF2B5EF4-FFF2-40B4-BE49-F238E27FC236}">
-                <a16:creationId xmlns:a16="http://schemas.microsoft.com/office/drawing/2014/main" id="{D60EA576-ED00-5388-5F99-9251025CC996}"/>
+                <a16:creationId xmlns:a16="http://schemas.microsoft.com/office/drawing/2014/main" id="{16053C39-63EA-C03E-D351-C69301FCB935}"/>
               </a:ext>
             </a:extLst>
           </p:cNvPr>
@@ -21143,15 +21074,7 @@
           <a:p>
             <a:r>
               <a:rPr lang="en-GB" dirty="0"/>
-              <a:t>Step 4 – C/S model (</a:t>
-            </a:r>
-            <a:r>
-              <a:rPr lang="en-GB" dirty="0" err="1"/>
-              <a:t>angular+Spring</a:t>
-            </a:r>
-            <a:r>
-              <a:rPr lang="en-GB" dirty="0"/>
-              <a:t>)</a:t>
+              <a:t>JavaFX</a:t>
             </a:r>
           </a:p>
         </p:txBody>
@@ -21161,7 +21084,7 @@
           <p:cNvPr id="3" name="Espace réservé du contenu 2">
             <a:extLst>
               <a:ext uri="{FF2B5EF4-FFF2-40B4-BE49-F238E27FC236}">
-                <a16:creationId xmlns:a16="http://schemas.microsoft.com/office/drawing/2014/main" id="{C282D129-760F-85C3-4F4E-75E9299D91E7}"/>
+                <a16:creationId xmlns:a16="http://schemas.microsoft.com/office/drawing/2014/main" id="{06788429-95CC-5135-CA5F-8654ED3F6EC0}"/>
               </a:ext>
             </a:extLst>
           </p:cNvPr>
@@ -21179,60 +21102,216 @@
           <a:p>
             <a:r>
               <a:rPr lang="en-GB" dirty="0"/>
-              <a:t>GUI Framework: Angular</a:t>
-            </a:r>
-          </a:p>
-          <a:p>
-            <a:r>
-              <a:rPr lang="en-GB" dirty="0"/>
-              <a:t>Server : swing</a:t>
-            </a:r>
-          </a:p>
-        </p:txBody>
-      </p:sp>
-      <p:sp>
-        <p:nvSpPr>
-          <p:cNvPr id="4" name="ZoneTexte 3">
-            <a:extLst>
-              <a:ext uri="{FF2B5EF4-FFF2-40B4-BE49-F238E27FC236}">
-                <a16:creationId xmlns:a16="http://schemas.microsoft.com/office/drawing/2014/main" id="{34204BC3-FC0F-F4A2-EF5A-B1A1C83549CF}"/>
-              </a:ext>
-            </a:extLst>
-          </p:cNvPr>
-          <p:cNvSpPr txBox="1"/>
-          <p:nvPr/>
-        </p:nvSpPr>
-        <p:spPr>
-          <a:xfrm rot="19410285">
-            <a:off x="5025005" y="3665989"/>
-            <a:ext cx="737574" cy="369332"/>
-          </a:xfrm>
-          <a:prstGeom prst="rect">
-            <a:avLst/>
-          </a:prstGeom>
-          <a:noFill/>
-        </p:spPr>
-        <p:txBody>
-          <a:bodyPr wrap="none" rtlCol="0">
-            <a:spAutoFit/>
-          </a:bodyPr>
-          <a:lstStyle/>
-          <a:p>
-            <a:r>
-              <a:rPr lang="en-GB" dirty="0">
+              <a:t>Integration with Eclipse: cf. </a:t>
+            </a:r>
+            <a:r>
+              <a:rPr lang="en-GB" sz="2000" dirty="0">
+                <a:hlinkClick r:id="rId2"/>
+              </a:rPr>
+              <a:t>https://www.youtube.com/watch?v=bk28ytggz7E</a:t>
+            </a:r>
+            <a:endParaRPr lang="en-GB" sz="2000" dirty="0"/>
+          </a:p>
+          <a:p>
+            <a:r>
+              <a:rPr lang="en-GB" sz="2000" dirty="0">
+                <a:hlinkClick r:id="rId3"/>
+              </a:rPr>
+              <a:t>https://www.youtube.com/watch?v=nz8P528uGjk</a:t>
+            </a:r>
+            <a:endParaRPr lang="en-GB" sz="2000" dirty="0"/>
+          </a:p>
+          <a:p>
+            <a:r>
+              <a:rPr lang="en-GB" sz="2000" dirty="0"/>
+              <a:t>Download SKD: https://openjfx.io/</a:t>
+            </a:r>
+          </a:p>
+          <a:p>
+            <a:r>
+              <a:rPr lang="en-GB" sz="2000" dirty="0"/>
+              <a:t>:</a:t>
+            </a:r>
+          </a:p>
+          <a:p>
+            <a:endParaRPr lang="en-GB" sz="2000" dirty="0"/>
+          </a:p>
+          <a:p>
+            <a:r>
+              <a:rPr lang="en-GB" sz="2000" dirty="0">
                 <a:solidFill>
                   <a:srgbClr val="FF0000"/>
                 </a:solidFill>
               </a:rPr>
-              <a:t>TODO</a:t>
-            </a:r>
-          </a:p>
-        </p:txBody>
-      </p:sp>
+              <a:t>!</a:t>
+            </a:r>
+            <a:r>
+              <a:rPr lang="en-GB" sz="2000" dirty="0"/>
+              <a:t> Delete module-info from generated project</a:t>
+            </a:r>
+          </a:p>
+          <a:p>
+            <a:endParaRPr lang="en-GB" sz="2000" dirty="0"/>
+          </a:p>
+          <a:p>
+            <a:endParaRPr lang="en-GB" dirty="0"/>
+          </a:p>
+        </p:txBody>
+      </p:sp>
+      <p:pic>
+        <p:nvPicPr>
+          <p:cNvPr id="5" name="Image 4">
+            <a:extLst>
+              <a:ext uri="{FF2B5EF4-FFF2-40B4-BE49-F238E27FC236}">
+                <a16:creationId xmlns:a16="http://schemas.microsoft.com/office/drawing/2014/main" id="{47E9FE68-DFE4-7E1E-1B65-24862B6A22C0}"/>
+              </a:ext>
+            </a:extLst>
+          </p:cNvPr>
+          <p:cNvPicPr>
+            <a:picLocks noChangeAspect="1"/>
+          </p:cNvPicPr>
+          <p:nvPr/>
+        </p:nvPicPr>
+        <p:blipFill>
+          <a:blip r:embed="rId4"/>
+          <a:stretch>
+            <a:fillRect/>
+          </a:stretch>
+        </p:blipFill>
+        <p:spPr>
+          <a:xfrm>
+            <a:off x="7579846" y="5851758"/>
+            <a:ext cx="5286375" cy="819150"/>
+          </a:xfrm>
+          <a:prstGeom prst="rect">
+            <a:avLst/>
+          </a:prstGeom>
+        </p:spPr>
+      </p:pic>
+      <p:pic>
+        <p:nvPicPr>
+          <p:cNvPr id="7" name="Image 6">
+            <a:extLst>
+              <a:ext uri="{FF2B5EF4-FFF2-40B4-BE49-F238E27FC236}">
+                <a16:creationId xmlns:a16="http://schemas.microsoft.com/office/drawing/2014/main" id="{2FF8E3FD-F2CA-A59F-0847-84C54720A9B4}"/>
+              </a:ext>
+            </a:extLst>
+          </p:cNvPr>
+          <p:cNvPicPr>
+            <a:picLocks noChangeAspect="1"/>
+          </p:cNvPicPr>
+          <p:nvPr/>
+        </p:nvPicPr>
+        <p:blipFill>
+          <a:blip r:embed="rId5"/>
+          <a:stretch>
+            <a:fillRect/>
+          </a:stretch>
+        </p:blipFill>
+        <p:spPr>
+          <a:xfrm>
+            <a:off x="8206817" y="3419738"/>
+            <a:ext cx="2895487" cy="1928812"/>
+          </a:xfrm>
+          <a:prstGeom prst="rect">
+            <a:avLst/>
+          </a:prstGeom>
+        </p:spPr>
+      </p:pic>
+      <p:pic>
+        <p:nvPicPr>
+          <p:cNvPr id="11" name="Image 10">
+            <a:extLst>
+              <a:ext uri="{FF2B5EF4-FFF2-40B4-BE49-F238E27FC236}">
+                <a16:creationId xmlns:a16="http://schemas.microsoft.com/office/drawing/2014/main" id="{1D4D81C3-3D8F-80E8-1A0C-F88BBDDD7D87}"/>
+              </a:ext>
+            </a:extLst>
+          </p:cNvPr>
+          <p:cNvPicPr>
+            <a:picLocks noChangeAspect="1"/>
+          </p:cNvPicPr>
+          <p:nvPr/>
+        </p:nvPicPr>
+        <p:blipFill>
+          <a:blip r:embed="rId6"/>
+          <a:stretch>
+            <a:fillRect/>
+          </a:stretch>
+        </p:blipFill>
+        <p:spPr>
+          <a:xfrm>
+            <a:off x="1272642" y="4419600"/>
+            <a:ext cx="2915511" cy="2162174"/>
+          </a:xfrm>
+          <a:prstGeom prst="rect">
+            <a:avLst/>
+          </a:prstGeom>
+        </p:spPr>
+      </p:pic>
+      <p:pic>
+        <p:nvPicPr>
+          <p:cNvPr id="13" name="Image 12">
+            <a:extLst>
+              <a:ext uri="{FF2B5EF4-FFF2-40B4-BE49-F238E27FC236}">
+                <a16:creationId xmlns:a16="http://schemas.microsoft.com/office/drawing/2014/main" id="{D895EE36-E180-0D7D-FE40-31D750A94992}"/>
+              </a:ext>
+            </a:extLst>
+          </p:cNvPr>
+          <p:cNvPicPr>
+            <a:picLocks noChangeAspect="1"/>
+          </p:cNvPicPr>
+          <p:nvPr/>
+        </p:nvPicPr>
+        <p:blipFill>
+          <a:blip r:embed="rId7"/>
+          <a:stretch>
+            <a:fillRect/>
+          </a:stretch>
+        </p:blipFill>
+        <p:spPr>
+          <a:xfrm>
+            <a:off x="3819525" y="5076919"/>
+            <a:ext cx="3448050" cy="1528668"/>
+          </a:xfrm>
+          <a:prstGeom prst="rect">
+            <a:avLst/>
+          </a:prstGeom>
+        </p:spPr>
+      </p:pic>
+      <p:pic>
+        <p:nvPicPr>
+          <p:cNvPr id="15" name="Image 14">
+            <a:extLst>
+              <a:ext uri="{FF2B5EF4-FFF2-40B4-BE49-F238E27FC236}">
+                <a16:creationId xmlns:a16="http://schemas.microsoft.com/office/drawing/2014/main" id="{342A10C5-EE03-84B7-A2C5-699CEFB20623}"/>
+              </a:ext>
+            </a:extLst>
+          </p:cNvPr>
+          <p:cNvPicPr>
+            <a:picLocks noChangeAspect="1"/>
+          </p:cNvPicPr>
+          <p:nvPr/>
+        </p:nvPicPr>
+        <p:blipFill>
+          <a:blip r:embed="rId8"/>
+          <a:stretch>
+            <a:fillRect/>
+          </a:stretch>
+        </p:blipFill>
+        <p:spPr>
+          <a:xfrm>
+            <a:off x="5922628" y="2658987"/>
+            <a:ext cx="2212989" cy="1702764"/>
+          </a:xfrm>
+          <a:prstGeom prst="rect">
+            <a:avLst/>
+          </a:prstGeom>
+        </p:spPr>
+      </p:pic>
     </p:spTree>
     <p:extLst>
       <p:ext uri="{BB962C8B-B14F-4D97-AF65-F5344CB8AC3E}">
-        <p14:creationId xmlns:p14="http://schemas.microsoft.com/office/powerpoint/2010/main" val="1762366662"/>
+        <p14:creationId xmlns:p14="http://schemas.microsoft.com/office/powerpoint/2010/main" val="1513246137"/>
       </p:ext>
     </p:extLst>
   </p:cSld>
@@ -21264,7 +21343,7 @@
           <p:cNvPr id="2" name="Titre 1">
             <a:extLst>
               <a:ext uri="{FF2B5EF4-FFF2-40B4-BE49-F238E27FC236}">
-                <a16:creationId xmlns:a16="http://schemas.microsoft.com/office/drawing/2014/main" id="{5CABA1D9-3AE1-4B10-25F7-8379A4E72456}"/>
+                <a16:creationId xmlns:a16="http://schemas.microsoft.com/office/drawing/2014/main" id="{70DBC2F8-62A7-8882-4E17-7BABF004C66D}"/>
               </a:ext>
             </a:extLst>
           </p:cNvPr>
@@ -21282,7 +21361,7 @@
           <a:p>
             <a:r>
               <a:rPr lang="en-GB" dirty="0"/>
-              <a:t>Step 5 – Mobile</a:t>
+              <a:t>Run configuration</a:t>
             </a:r>
           </a:p>
         </p:txBody>
@@ -21292,7 +21371,7 @@
           <p:cNvPr id="3" name="Espace réservé du contenu 2">
             <a:extLst>
               <a:ext uri="{FF2B5EF4-FFF2-40B4-BE49-F238E27FC236}">
-                <a16:creationId xmlns:a16="http://schemas.microsoft.com/office/drawing/2014/main" id="{C025A62A-E994-CA58-30C0-B3581DBBDFA1}"/>
+                <a16:creationId xmlns:a16="http://schemas.microsoft.com/office/drawing/2014/main" id="{D9345A12-3C8E-896A-E2B4-E656F9832A38}"/>
               </a:ext>
             </a:extLst>
           </p:cNvPr>
@@ -21308,62 +21387,74 @@
           <a:bodyPr/>
           <a:lstStyle/>
           <a:p>
-            <a:r>
-              <a:rPr lang="en-GB" dirty="0"/>
-              <a:t>Reverse client/server model (like X-windows)?</a:t>
-            </a:r>
-          </a:p>
-          <a:p>
-            <a:r>
-              <a:rPr lang="en-GB" dirty="0"/>
-              <a:t>Framework: ??</a:t>
-            </a:r>
-          </a:p>
-        </p:txBody>
-      </p:sp>
-      <p:sp>
-        <p:nvSpPr>
-          <p:cNvPr id="4" name="ZoneTexte 3">
-            <a:extLst>
-              <a:ext uri="{FF2B5EF4-FFF2-40B4-BE49-F238E27FC236}">
-                <a16:creationId xmlns:a16="http://schemas.microsoft.com/office/drawing/2014/main" id="{7E1C1182-C6C6-3507-A9E3-8B70D43CABB8}"/>
-              </a:ext>
-            </a:extLst>
-          </p:cNvPr>
-          <p:cNvSpPr txBox="1"/>
-          <p:nvPr/>
-        </p:nvSpPr>
-        <p:spPr>
-          <a:xfrm rot="19410285">
-            <a:off x="5025005" y="3665989"/>
-            <a:ext cx="737574" cy="369332"/>
+            <a:endParaRPr lang="en-GB" dirty="0"/>
+          </a:p>
+        </p:txBody>
+      </p:sp>
+      <p:pic>
+        <p:nvPicPr>
+          <p:cNvPr id="5" name="Image 4">
+            <a:extLst>
+              <a:ext uri="{FF2B5EF4-FFF2-40B4-BE49-F238E27FC236}">
+                <a16:creationId xmlns:a16="http://schemas.microsoft.com/office/drawing/2014/main" id="{9806F6AE-7266-FBE4-F860-67DF3FE378F4}"/>
+              </a:ext>
+            </a:extLst>
+          </p:cNvPr>
+          <p:cNvPicPr>
+            <a:picLocks noChangeAspect="1"/>
+          </p:cNvPicPr>
+          <p:nvPr/>
+        </p:nvPicPr>
+        <p:blipFill>
+          <a:blip r:embed="rId2"/>
+          <a:stretch>
+            <a:fillRect/>
+          </a:stretch>
+        </p:blipFill>
+        <p:spPr>
+          <a:xfrm>
+            <a:off x="1073791" y="1879572"/>
+            <a:ext cx="6042870" cy="2184563"/>
           </a:xfrm>
           <a:prstGeom prst="rect">
             <a:avLst/>
           </a:prstGeom>
-          <a:noFill/>
-        </p:spPr>
-        <p:txBody>
-          <a:bodyPr wrap="none" rtlCol="0">
-            <a:spAutoFit/>
-          </a:bodyPr>
-          <a:lstStyle/>
-          <a:p>
-            <a:r>
-              <a:rPr lang="en-GB" dirty="0">
-                <a:solidFill>
-                  <a:srgbClr val="FF0000"/>
-                </a:solidFill>
-              </a:rPr>
-              <a:t>TODO</a:t>
-            </a:r>
-          </a:p>
-        </p:txBody>
-      </p:sp>
+        </p:spPr>
+      </p:pic>
+      <p:pic>
+        <p:nvPicPr>
+          <p:cNvPr id="7" name="Image 6">
+            <a:extLst>
+              <a:ext uri="{FF2B5EF4-FFF2-40B4-BE49-F238E27FC236}">
+                <a16:creationId xmlns:a16="http://schemas.microsoft.com/office/drawing/2014/main" id="{C19B1849-2C43-AEC2-5EB3-6F71FD707833}"/>
+              </a:ext>
+            </a:extLst>
+          </p:cNvPr>
+          <p:cNvPicPr>
+            <a:picLocks noChangeAspect="1"/>
+          </p:cNvPicPr>
+          <p:nvPr/>
+        </p:nvPicPr>
+        <p:blipFill>
+          <a:blip r:embed="rId3"/>
+          <a:stretch>
+            <a:fillRect/>
+          </a:stretch>
+        </p:blipFill>
+        <p:spPr>
+          <a:xfrm>
+            <a:off x="7138000" y="1907971"/>
+            <a:ext cx="2868056" cy="2118744"/>
+          </a:xfrm>
+          <a:prstGeom prst="rect">
+            <a:avLst/>
+          </a:prstGeom>
+        </p:spPr>
+      </p:pic>
     </p:spTree>
     <p:extLst>
       <p:ext uri="{BB962C8B-B14F-4D97-AF65-F5344CB8AC3E}">
-        <p14:creationId xmlns:p14="http://schemas.microsoft.com/office/powerpoint/2010/main" val="2577180211"/>
+        <p14:creationId xmlns:p14="http://schemas.microsoft.com/office/powerpoint/2010/main" val="2948847707"/>
       </p:ext>
     </p:extLst>
   </p:cSld>
@@ -22569,6 +22660,709 @@
           <p:cNvPr id="2" name="Titre 1">
             <a:extLst>
               <a:ext uri="{FF2B5EF4-FFF2-40B4-BE49-F238E27FC236}">
+                <a16:creationId xmlns:a16="http://schemas.microsoft.com/office/drawing/2014/main" id="{7DDDD0F4-DB89-E51C-2E0F-9302CEFD5CCA}"/>
+              </a:ext>
+            </a:extLst>
+          </p:cNvPr>
+          <p:cNvSpPr>
+            <a:spLocks noGrp="1"/>
+          </p:cNvSpPr>
+          <p:nvPr>
+            <p:ph type="title"/>
+          </p:nvPr>
+        </p:nvSpPr>
+        <p:spPr/>
+        <p:txBody>
+          <a:bodyPr/>
+          <a:lstStyle/>
+          <a:p>
+            <a:r>
+              <a:rPr lang="en-GB" dirty="0"/>
+              <a:t>Screen design – Scene Builder</a:t>
+            </a:r>
+          </a:p>
+        </p:txBody>
+      </p:sp>
+      <p:sp>
+        <p:nvSpPr>
+          <p:cNvPr id="3" name="Espace réservé du contenu 2">
+            <a:extLst>
+              <a:ext uri="{FF2B5EF4-FFF2-40B4-BE49-F238E27FC236}">
+                <a16:creationId xmlns:a16="http://schemas.microsoft.com/office/drawing/2014/main" id="{C104AEB7-905B-C647-0C27-5C0163C55311}"/>
+              </a:ext>
+            </a:extLst>
+          </p:cNvPr>
+          <p:cNvSpPr>
+            <a:spLocks noGrp="1"/>
+          </p:cNvSpPr>
+          <p:nvPr>
+            <p:ph idx="1"/>
+          </p:nvPr>
+        </p:nvSpPr>
+        <p:spPr/>
+        <p:txBody>
+          <a:bodyPr/>
+          <a:lstStyle/>
+          <a:p>
+            <a:r>
+              <a:rPr lang="en-GB" dirty="0">
+                <a:hlinkClick r:id="rId2">
+                  <a:extLst>
+                    <a:ext uri="{A12FA001-AC4F-418D-AE19-62706E023703}">
+                      <ahyp:hlinkClr xmlns:ahyp="http://schemas.microsoft.com/office/drawing/2018/hyperlinkcolor" val="tx"/>
+                    </a:ext>
+                  </a:extLst>
+                </a:hlinkClick>
+              </a:rPr>
+              <a:t>Install:</a:t>
+            </a:r>
+          </a:p>
+          <a:p>
+            <a:pPr marL="457200" lvl="1" indent="0">
+              <a:buNone/>
+            </a:pPr>
+            <a:r>
+              <a:rPr lang="en-GB" dirty="0">
+                <a:solidFill>
+                  <a:srgbClr val="0563C1"/>
+                </a:solidFill>
+                <a:hlinkClick r:id="rId2">
+                  <a:extLst>
+                    <a:ext uri="{A12FA001-AC4F-418D-AE19-62706E023703}">
+                      <ahyp:hlinkClr xmlns:ahyp="http://schemas.microsoft.com/office/drawing/2018/hyperlinkcolor" val="tx"/>
+                    </a:ext>
+                  </a:extLst>
+                </a:hlinkClick>
+              </a:rPr>
+              <a:t>https://www.youtube.com/watch?v=cfGTJVVcWvE&amp;list=PLpFneQZCNR2ktqseX11XRBc5Kyzdg2fbo</a:t>
+            </a:r>
+            <a:endParaRPr lang="en-GB" dirty="0">
+              <a:solidFill>
+                <a:srgbClr val="0563C1"/>
+              </a:solidFill>
+            </a:endParaRPr>
+          </a:p>
+          <a:p>
+            <a:pPr marL="457200" lvl="1" indent="0">
+              <a:buNone/>
+            </a:pPr>
+            <a:endParaRPr lang="en-GB" dirty="0">
+              <a:solidFill>
+                <a:srgbClr val="0563C1"/>
+              </a:solidFill>
+            </a:endParaRPr>
+          </a:p>
+          <a:p>
+            <a:pPr marL="457200" lvl="1" indent="0">
+              <a:buNone/>
+            </a:pPr>
+            <a:endParaRPr lang="en-GB" dirty="0"/>
+          </a:p>
+          <a:p>
+            <a:r>
+              <a:rPr lang="en-GB" dirty="0">
+                <a:hlinkClick r:id="rId3">
+                  <a:extLst>
+                    <a:ext uri="{A12FA001-AC4F-418D-AE19-62706E023703}">
+                      <ahyp:hlinkClr xmlns:ahyp="http://schemas.microsoft.com/office/drawing/2018/hyperlinkcolor" val="tx"/>
+                    </a:ext>
+                  </a:extLst>
+                </a:hlinkClick>
+              </a:rPr>
+              <a:t>Use:</a:t>
+            </a:r>
+          </a:p>
+          <a:p>
+            <a:pPr marL="457200" lvl="1" indent="0">
+              <a:buNone/>
+            </a:pPr>
+            <a:r>
+              <a:rPr lang="en-GB" dirty="0">
+                <a:solidFill>
+                  <a:srgbClr val="0563C1"/>
+                </a:solidFill>
+                <a:hlinkClick r:id="rId3">
+                  <a:extLst>
+                    <a:ext uri="{A12FA001-AC4F-418D-AE19-62706E023703}">
+                      <ahyp:hlinkClr xmlns:ahyp="http://schemas.microsoft.com/office/drawing/2018/hyperlinkcolor" val="tx"/>
+                    </a:ext>
+                  </a:extLst>
+                </a:hlinkClick>
+              </a:rPr>
+              <a:t>https://www.youtube.com/watch?v=q5A-qW2eGKs&amp;list=PLpFneQZCNR2ktqseX11XRBc5Kyzdg2fbo&amp;index=2</a:t>
+            </a:r>
+            <a:endParaRPr lang="en-GB" dirty="0"/>
+          </a:p>
+          <a:p>
+            <a:endParaRPr lang="en-GB" dirty="0"/>
+          </a:p>
+        </p:txBody>
+      </p:sp>
+      <p:pic>
+        <p:nvPicPr>
+          <p:cNvPr id="7" name="Image 6">
+            <a:extLst>
+              <a:ext uri="{FF2B5EF4-FFF2-40B4-BE49-F238E27FC236}">
+                <a16:creationId xmlns:a16="http://schemas.microsoft.com/office/drawing/2014/main" id="{0CAF1986-560D-9DFA-8D7E-0256E81C6831}"/>
+              </a:ext>
+            </a:extLst>
+          </p:cNvPr>
+          <p:cNvPicPr>
+            <a:picLocks noChangeAspect="1"/>
+          </p:cNvPicPr>
+          <p:nvPr/>
+        </p:nvPicPr>
+        <p:blipFill>
+          <a:blip r:embed="rId4"/>
+          <a:stretch>
+            <a:fillRect/>
+          </a:stretch>
+        </p:blipFill>
+        <p:spPr>
+          <a:xfrm>
+            <a:off x="4162425" y="2741564"/>
+            <a:ext cx="6610350" cy="1375487"/>
+          </a:xfrm>
+          <a:prstGeom prst="rect">
+            <a:avLst/>
+          </a:prstGeom>
+        </p:spPr>
+      </p:pic>
+      <p:pic>
+        <p:nvPicPr>
+          <p:cNvPr id="1026" name="Picture 2">
+            <a:extLst>
+              <a:ext uri="{FF2B5EF4-FFF2-40B4-BE49-F238E27FC236}">
+                <a16:creationId xmlns:a16="http://schemas.microsoft.com/office/drawing/2014/main" id="{C663A71E-A9DA-462D-8531-105DD9851BF1}"/>
+              </a:ext>
+            </a:extLst>
+          </p:cNvPr>
+          <p:cNvPicPr>
+            <a:picLocks noChangeAspect="1" noChangeArrowheads="1"/>
+          </p:cNvPicPr>
+          <p:nvPr/>
+        </p:nvPicPr>
+        <p:blipFill>
+          <a:blip r:embed="rId5">
+            <a:extLst>
+              <a:ext uri="{28A0092B-C50C-407E-A947-70E740481C1C}">
+                <a14:useLocalDpi xmlns:a14="http://schemas.microsoft.com/office/drawing/2010/main" val="0"/>
+              </a:ext>
+            </a:extLst>
+          </a:blip>
+          <a:srcRect/>
+          <a:stretch>
+            <a:fillRect/>
+          </a:stretch>
+        </p:blipFill>
+        <p:spPr bwMode="auto">
+          <a:xfrm>
+            <a:off x="8047039" y="371475"/>
+            <a:ext cx="1281130" cy="1409700"/>
+          </a:xfrm>
+          <a:prstGeom prst="rect">
+            <a:avLst/>
+          </a:prstGeom>
+          <a:noFill/>
+          <a:extLst>
+            <a:ext uri="{909E8E84-426E-40DD-AFC4-6F175D3DCCD1}">
+              <a14:hiddenFill xmlns:a14="http://schemas.microsoft.com/office/drawing/2010/main">
+                <a:solidFill>
+                  <a:srgbClr val="FFFFFF"/>
+                </a:solidFill>
+              </a14:hiddenFill>
+            </a:ext>
+          </a:extLst>
+        </p:spPr>
+      </p:pic>
+    </p:spTree>
+    <p:extLst>
+      <p:ext uri="{BB962C8B-B14F-4D97-AF65-F5344CB8AC3E}">
+        <p14:creationId xmlns:p14="http://schemas.microsoft.com/office/powerpoint/2010/main" val="2118749072"/>
+      </p:ext>
+    </p:extLst>
+  </p:cSld>
+  <p:clrMapOvr>
+    <a:masterClrMapping/>
+  </p:clrMapOvr>
+</p:sld>
+</file>
+
+<file path=ppt/slides/slide31.xml><?xml version="1.0" encoding="utf-8"?>
+<p:sld xmlns:a="http://schemas.openxmlformats.org/drawingml/2006/main" xmlns:r="http://schemas.openxmlformats.org/officeDocument/2006/relationships" xmlns:p="http://schemas.openxmlformats.org/presentationml/2006/main">
+  <p:cSld>
+    <p:spTree>
+      <p:nvGrpSpPr>
+        <p:cNvPr id="1" name=""/>
+        <p:cNvGrpSpPr/>
+        <p:nvPr/>
+      </p:nvGrpSpPr>
+      <p:grpSpPr>
+        <a:xfrm>
+          <a:off x="0" y="0"/>
+          <a:ext cx="0" cy="0"/>
+          <a:chOff x="0" y="0"/>
+          <a:chExt cx="0" cy="0"/>
+        </a:xfrm>
+      </p:grpSpPr>
+      <p:sp>
+        <p:nvSpPr>
+          <p:cNvPr id="2" name="Titre 1">
+            <a:extLst>
+              <a:ext uri="{FF2B5EF4-FFF2-40B4-BE49-F238E27FC236}">
+                <a16:creationId xmlns:a16="http://schemas.microsoft.com/office/drawing/2014/main" id="{9DE23040-F7EF-8FA4-CFCF-C7D144873BBC}"/>
+              </a:ext>
+            </a:extLst>
+          </p:cNvPr>
+          <p:cNvSpPr>
+            <a:spLocks noGrp="1"/>
+          </p:cNvSpPr>
+          <p:nvPr>
+            <p:ph type="title"/>
+          </p:nvPr>
+        </p:nvSpPr>
+        <p:spPr/>
+        <p:txBody>
+          <a:bodyPr/>
+          <a:lstStyle/>
+          <a:p>
+            <a:r>
+              <a:rPr lang="en-GB" dirty="0"/>
+              <a:t>Release</a:t>
+            </a:r>
+          </a:p>
+        </p:txBody>
+      </p:sp>
+      <p:sp>
+        <p:nvSpPr>
+          <p:cNvPr id="3" name="Espace réservé du contenu 2">
+            <a:extLst>
+              <a:ext uri="{FF2B5EF4-FFF2-40B4-BE49-F238E27FC236}">
+                <a16:creationId xmlns:a16="http://schemas.microsoft.com/office/drawing/2014/main" id="{345D2DF2-7654-1069-3763-EDA318B88CD9}"/>
+              </a:ext>
+            </a:extLst>
+          </p:cNvPr>
+          <p:cNvSpPr>
+            <a:spLocks noGrp="1"/>
+          </p:cNvSpPr>
+          <p:nvPr>
+            <p:ph idx="1"/>
+          </p:nvPr>
+        </p:nvSpPr>
+        <p:spPr/>
+        <p:txBody>
+          <a:bodyPr/>
+          <a:lstStyle/>
+          <a:p>
+            <a:r>
+              <a:rPr lang="en-GB" dirty="0"/>
+              <a:t>Build, Release, Publish, install on another machine from </a:t>
+            </a:r>
+            <a:r>
+              <a:rPr lang="en-GB" dirty="0" err="1"/>
+              <a:t>github</a:t>
+            </a:r>
+            <a:endParaRPr lang="en-GB" dirty="0"/>
+          </a:p>
+        </p:txBody>
+      </p:sp>
+    </p:spTree>
+    <p:extLst>
+      <p:ext uri="{BB962C8B-B14F-4D97-AF65-F5344CB8AC3E}">
+        <p14:creationId xmlns:p14="http://schemas.microsoft.com/office/powerpoint/2010/main" val="118254220"/>
+      </p:ext>
+    </p:extLst>
+  </p:cSld>
+  <p:clrMapOvr>
+    <a:masterClrMapping/>
+  </p:clrMapOvr>
+</p:sld>
+</file>
+
+<file path=ppt/slides/slide32.xml><?xml version="1.0" encoding="utf-8"?>
+<p:sld xmlns:a="http://schemas.openxmlformats.org/drawingml/2006/main" xmlns:r="http://schemas.openxmlformats.org/officeDocument/2006/relationships" xmlns:p="http://schemas.openxmlformats.org/presentationml/2006/main">
+  <p:cSld>
+    <p:spTree>
+      <p:nvGrpSpPr>
+        <p:cNvPr id="1" name=""/>
+        <p:cNvGrpSpPr/>
+        <p:nvPr/>
+      </p:nvGrpSpPr>
+      <p:grpSpPr>
+        <a:xfrm>
+          <a:off x="0" y="0"/>
+          <a:ext cx="0" cy="0"/>
+          <a:chOff x="0" y="0"/>
+          <a:chExt cx="0" cy="0"/>
+        </a:xfrm>
+      </p:grpSpPr>
+      <p:sp>
+        <p:nvSpPr>
+          <p:cNvPr id="2" name="Titre 1">
+            <a:extLst>
+              <a:ext uri="{FF2B5EF4-FFF2-40B4-BE49-F238E27FC236}">
+                <a16:creationId xmlns:a16="http://schemas.microsoft.com/office/drawing/2014/main" id="{2653F1FD-0A88-3F85-5165-81D519D295B6}"/>
+              </a:ext>
+            </a:extLst>
+          </p:cNvPr>
+          <p:cNvSpPr>
+            <a:spLocks noGrp="1"/>
+          </p:cNvSpPr>
+          <p:nvPr>
+            <p:ph type="title"/>
+          </p:nvPr>
+        </p:nvSpPr>
+        <p:spPr/>
+        <p:txBody>
+          <a:bodyPr/>
+          <a:lstStyle/>
+          <a:p>
+            <a:r>
+              <a:rPr lang="en-GB" dirty="0"/>
+              <a:t>OSGi</a:t>
+            </a:r>
+          </a:p>
+        </p:txBody>
+      </p:sp>
+      <p:sp>
+        <p:nvSpPr>
+          <p:cNvPr id="3" name="Espace réservé du contenu 2">
+            <a:extLst>
+              <a:ext uri="{FF2B5EF4-FFF2-40B4-BE49-F238E27FC236}">
+                <a16:creationId xmlns:a16="http://schemas.microsoft.com/office/drawing/2014/main" id="{5F3E4689-2322-EF4A-493A-5D8AD60D431E}"/>
+              </a:ext>
+            </a:extLst>
+          </p:cNvPr>
+          <p:cNvSpPr>
+            <a:spLocks noGrp="1"/>
+          </p:cNvSpPr>
+          <p:nvPr>
+            <p:ph idx="1"/>
+          </p:nvPr>
+        </p:nvSpPr>
+        <p:spPr/>
+        <p:txBody>
+          <a:bodyPr/>
+          <a:lstStyle/>
+          <a:p>
+            <a:r>
+              <a:rPr lang="en-GB" dirty="0"/>
+              <a:t>To evaluate..</a:t>
+            </a:r>
+          </a:p>
+        </p:txBody>
+      </p:sp>
+    </p:spTree>
+    <p:extLst>
+      <p:ext uri="{BB962C8B-B14F-4D97-AF65-F5344CB8AC3E}">
+        <p14:creationId xmlns:p14="http://schemas.microsoft.com/office/powerpoint/2010/main" val="1235747462"/>
+      </p:ext>
+    </p:extLst>
+  </p:cSld>
+  <p:clrMapOvr>
+    <a:masterClrMapping/>
+  </p:clrMapOvr>
+</p:sld>
+</file>
+
+<file path=ppt/slides/slide33.xml><?xml version="1.0" encoding="utf-8"?>
+<p:sld xmlns:a="http://schemas.openxmlformats.org/drawingml/2006/main" xmlns:r="http://schemas.openxmlformats.org/officeDocument/2006/relationships" xmlns:p="http://schemas.openxmlformats.org/presentationml/2006/main">
+  <p:cSld>
+    <p:spTree>
+      <p:nvGrpSpPr>
+        <p:cNvPr id="1" name="">
+          <a:extLst>
+            <a:ext uri="{FF2B5EF4-FFF2-40B4-BE49-F238E27FC236}">
+              <a16:creationId xmlns:a16="http://schemas.microsoft.com/office/drawing/2014/main" id="{BD080549-0AF8-4969-FBFC-DA319D487BD6}"/>
+            </a:ext>
+          </a:extLst>
+        </p:cNvPr>
+        <p:cNvGrpSpPr/>
+        <p:nvPr/>
+      </p:nvGrpSpPr>
+      <p:grpSpPr>
+        <a:xfrm>
+          <a:off x="0" y="0"/>
+          <a:ext cx="0" cy="0"/>
+          <a:chOff x="0" y="0"/>
+          <a:chExt cx="0" cy="0"/>
+        </a:xfrm>
+      </p:grpSpPr>
+      <p:sp>
+        <p:nvSpPr>
+          <p:cNvPr id="2" name="Titre 1">
+            <a:extLst>
+              <a:ext uri="{FF2B5EF4-FFF2-40B4-BE49-F238E27FC236}">
+                <a16:creationId xmlns:a16="http://schemas.microsoft.com/office/drawing/2014/main" id="{D60EA576-ED00-5388-5F99-9251025CC996}"/>
+              </a:ext>
+            </a:extLst>
+          </p:cNvPr>
+          <p:cNvSpPr>
+            <a:spLocks noGrp="1"/>
+          </p:cNvSpPr>
+          <p:nvPr>
+            <p:ph type="title"/>
+          </p:nvPr>
+        </p:nvSpPr>
+        <p:spPr/>
+        <p:txBody>
+          <a:bodyPr/>
+          <a:lstStyle/>
+          <a:p>
+            <a:r>
+              <a:rPr lang="en-GB" dirty="0"/>
+              <a:t>Step 4 – C/S model (</a:t>
+            </a:r>
+            <a:r>
+              <a:rPr lang="en-GB" dirty="0" err="1"/>
+              <a:t>angular+Spring</a:t>
+            </a:r>
+            <a:r>
+              <a:rPr lang="en-GB" dirty="0"/>
+              <a:t>)</a:t>
+            </a:r>
+          </a:p>
+        </p:txBody>
+      </p:sp>
+      <p:sp>
+        <p:nvSpPr>
+          <p:cNvPr id="3" name="Espace réservé du contenu 2">
+            <a:extLst>
+              <a:ext uri="{FF2B5EF4-FFF2-40B4-BE49-F238E27FC236}">
+                <a16:creationId xmlns:a16="http://schemas.microsoft.com/office/drawing/2014/main" id="{C282D129-760F-85C3-4F4E-75E9299D91E7}"/>
+              </a:ext>
+            </a:extLst>
+          </p:cNvPr>
+          <p:cNvSpPr>
+            <a:spLocks noGrp="1"/>
+          </p:cNvSpPr>
+          <p:nvPr>
+            <p:ph idx="1"/>
+          </p:nvPr>
+        </p:nvSpPr>
+        <p:spPr/>
+        <p:txBody>
+          <a:bodyPr/>
+          <a:lstStyle/>
+          <a:p>
+            <a:r>
+              <a:rPr lang="en-GB" dirty="0"/>
+              <a:t>GUI Framework: Angular</a:t>
+            </a:r>
+          </a:p>
+          <a:p>
+            <a:r>
+              <a:rPr lang="en-GB" dirty="0"/>
+              <a:t>Server : swing</a:t>
+            </a:r>
+          </a:p>
+        </p:txBody>
+      </p:sp>
+      <p:sp>
+        <p:nvSpPr>
+          <p:cNvPr id="4" name="ZoneTexte 3">
+            <a:extLst>
+              <a:ext uri="{FF2B5EF4-FFF2-40B4-BE49-F238E27FC236}">
+                <a16:creationId xmlns:a16="http://schemas.microsoft.com/office/drawing/2014/main" id="{34204BC3-FC0F-F4A2-EF5A-B1A1C83549CF}"/>
+              </a:ext>
+            </a:extLst>
+          </p:cNvPr>
+          <p:cNvSpPr txBox="1"/>
+          <p:nvPr/>
+        </p:nvSpPr>
+        <p:spPr>
+          <a:xfrm rot="19410285">
+            <a:off x="5025005" y="3665989"/>
+            <a:ext cx="737574" cy="369332"/>
+          </a:xfrm>
+          <a:prstGeom prst="rect">
+            <a:avLst/>
+          </a:prstGeom>
+          <a:noFill/>
+        </p:spPr>
+        <p:txBody>
+          <a:bodyPr wrap="none" rtlCol="0">
+            <a:spAutoFit/>
+          </a:bodyPr>
+          <a:lstStyle/>
+          <a:p>
+            <a:r>
+              <a:rPr lang="en-GB" dirty="0">
+                <a:solidFill>
+                  <a:srgbClr val="FF0000"/>
+                </a:solidFill>
+              </a:rPr>
+              <a:t>TODO</a:t>
+            </a:r>
+          </a:p>
+        </p:txBody>
+      </p:sp>
+    </p:spTree>
+    <p:extLst>
+      <p:ext uri="{BB962C8B-B14F-4D97-AF65-F5344CB8AC3E}">
+        <p14:creationId xmlns:p14="http://schemas.microsoft.com/office/powerpoint/2010/main" val="1762366662"/>
+      </p:ext>
+    </p:extLst>
+  </p:cSld>
+  <p:clrMapOvr>
+    <a:masterClrMapping/>
+  </p:clrMapOvr>
+</p:sld>
+</file>
+
+<file path=ppt/slides/slide34.xml><?xml version="1.0" encoding="utf-8"?>
+<p:sld xmlns:a="http://schemas.openxmlformats.org/drawingml/2006/main" xmlns:r="http://schemas.openxmlformats.org/officeDocument/2006/relationships" xmlns:p="http://schemas.openxmlformats.org/presentationml/2006/main">
+  <p:cSld>
+    <p:spTree>
+      <p:nvGrpSpPr>
+        <p:cNvPr id="1" name=""/>
+        <p:cNvGrpSpPr/>
+        <p:nvPr/>
+      </p:nvGrpSpPr>
+      <p:grpSpPr>
+        <a:xfrm>
+          <a:off x="0" y="0"/>
+          <a:ext cx="0" cy="0"/>
+          <a:chOff x="0" y="0"/>
+          <a:chExt cx="0" cy="0"/>
+        </a:xfrm>
+      </p:grpSpPr>
+      <p:sp>
+        <p:nvSpPr>
+          <p:cNvPr id="2" name="Titre 1">
+            <a:extLst>
+              <a:ext uri="{FF2B5EF4-FFF2-40B4-BE49-F238E27FC236}">
+                <a16:creationId xmlns:a16="http://schemas.microsoft.com/office/drawing/2014/main" id="{5CABA1D9-3AE1-4B10-25F7-8379A4E72456}"/>
+              </a:ext>
+            </a:extLst>
+          </p:cNvPr>
+          <p:cNvSpPr>
+            <a:spLocks noGrp="1"/>
+          </p:cNvSpPr>
+          <p:nvPr>
+            <p:ph type="title"/>
+          </p:nvPr>
+        </p:nvSpPr>
+        <p:spPr/>
+        <p:txBody>
+          <a:bodyPr/>
+          <a:lstStyle/>
+          <a:p>
+            <a:r>
+              <a:rPr lang="en-GB" dirty="0"/>
+              <a:t>Step 5 – Mobile</a:t>
+            </a:r>
+          </a:p>
+        </p:txBody>
+      </p:sp>
+      <p:sp>
+        <p:nvSpPr>
+          <p:cNvPr id="3" name="Espace réservé du contenu 2">
+            <a:extLst>
+              <a:ext uri="{FF2B5EF4-FFF2-40B4-BE49-F238E27FC236}">
+                <a16:creationId xmlns:a16="http://schemas.microsoft.com/office/drawing/2014/main" id="{C025A62A-E994-CA58-30C0-B3581DBBDFA1}"/>
+              </a:ext>
+            </a:extLst>
+          </p:cNvPr>
+          <p:cNvSpPr>
+            <a:spLocks noGrp="1"/>
+          </p:cNvSpPr>
+          <p:nvPr>
+            <p:ph idx="1"/>
+          </p:nvPr>
+        </p:nvSpPr>
+        <p:spPr/>
+        <p:txBody>
+          <a:bodyPr/>
+          <a:lstStyle/>
+          <a:p>
+            <a:r>
+              <a:rPr lang="en-GB" dirty="0"/>
+              <a:t>Reverse client/server model (like X-windows)?</a:t>
+            </a:r>
+          </a:p>
+          <a:p>
+            <a:r>
+              <a:rPr lang="en-GB" dirty="0"/>
+              <a:t>Framework: ??</a:t>
+            </a:r>
+          </a:p>
+        </p:txBody>
+      </p:sp>
+      <p:sp>
+        <p:nvSpPr>
+          <p:cNvPr id="4" name="ZoneTexte 3">
+            <a:extLst>
+              <a:ext uri="{FF2B5EF4-FFF2-40B4-BE49-F238E27FC236}">
+                <a16:creationId xmlns:a16="http://schemas.microsoft.com/office/drawing/2014/main" id="{7E1C1182-C6C6-3507-A9E3-8B70D43CABB8}"/>
+              </a:ext>
+            </a:extLst>
+          </p:cNvPr>
+          <p:cNvSpPr txBox="1"/>
+          <p:nvPr/>
+        </p:nvSpPr>
+        <p:spPr>
+          <a:xfrm rot="19410285">
+            <a:off x="5025005" y="3665989"/>
+            <a:ext cx="737574" cy="369332"/>
+          </a:xfrm>
+          <a:prstGeom prst="rect">
+            <a:avLst/>
+          </a:prstGeom>
+          <a:noFill/>
+        </p:spPr>
+        <p:txBody>
+          <a:bodyPr wrap="none" rtlCol="0">
+            <a:spAutoFit/>
+          </a:bodyPr>
+          <a:lstStyle/>
+          <a:p>
+            <a:r>
+              <a:rPr lang="en-GB" dirty="0">
+                <a:solidFill>
+                  <a:srgbClr val="FF0000"/>
+                </a:solidFill>
+              </a:rPr>
+              <a:t>TODO</a:t>
+            </a:r>
+          </a:p>
+        </p:txBody>
+      </p:sp>
+    </p:spTree>
+    <p:extLst>
+      <p:ext uri="{BB962C8B-B14F-4D97-AF65-F5344CB8AC3E}">
+        <p14:creationId xmlns:p14="http://schemas.microsoft.com/office/powerpoint/2010/main" val="2577180211"/>
+      </p:ext>
+    </p:extLst>
+  </p:cSld>
+  <p:clrMapOvr>
+    <a:masterClrMapping/>
+  </p:clrMapOvr>
+</p:sld>
+</file>
+
+<file path=ppt/slides/slide35.xml><?xml version="1.0" encoding="utf-8"?>
+<p:sld xmlns:a="http://schemas.openxmlformats.org/drawingml/2006/main" xmlns:r="http://schemas.openxmlformats.org/officeDocument/2006/relationships" xmlns:p="http://schemas.openxmlformats.org/presentationml/2006/main">
+  <p:cSld>
+    <p:spTree>
+      <p:nvGrpSpPr>
+        <p:cNvPr id="1" name=""/>
+        <p:cNvGrpSpPr/>
+        <p:nvPr/>
+      </p:nvGrpSpPr>
+      <p:grpSpPr>
+        <a:xfrm>
+          <a:off x="0" y="0"/>
+          <a:ext cx="0" cy="0"/>
+          <a:chOff x="0" y="0"/>
+          <a:chExt cx="0" cy="0"/>
+        </a:xfrm>
+      </p:grpSpPr>
+      <p:sp>
+        <p:nvSpPr>
+          <p:cNvPr id="2" name="Titre 1">
+            <a:extLst>
+              <a:ext uri="{FF2B5EF4-FFF2-40B4-BE49-F238E27FC236}">
                 <a16:creationId xmlns:a16="http://schemas.microsoft.com/office/drawing/2014/main" id="{C72D59AB-3121-0F34-DE2F-B0D497368B1B}"/>
               </a:ext>
             </a:extLst>

</xml_diff>

<commit_message>
fix private setter issue !!!
</commit_message>
<xml_diff>
--- a/doc/Steps overview.pptx
+++ b/doc/Steps overview.pptx
@@ -8306,8 +8306,8 @@
         </p:nvSpPr>
         <p:spPr>
           <a:xfrm>
-            <a:off x="828675" y="1857375"/>
-            <a:ext cx="7524749" cy="4601260"/>
+            <a:off x="971287" y="3392562"/>
+            <a:ext cx="7524749" cy="3123932"/>
           </a:xfrm>
           <a:prstGeom prst="rect">
             <a:avLst/>
@@ -8331,7 +8331,7 @@
               </a:spcAft>
             </a:pPr>
             <a:r>
-              <a:rPr lang="en-US" sz="1000" dirty="0">
+              <a:rPr lang="en-US" sz="700" dirty="0">
                 <a:solidFill>
                   <a:srgbClr val="808080"/>
                 </a:solidFill>
@@ -8340,7 +8340,7 @@
               </a:rPr>
               <a:t>// Calculate the intersection point of two line segments</a:t>
             </a:r>
-            <a:endParaRPr lang="en-US" sz="1000" dirty="0">
+            <a:endParaRPr lang="en-US" sz="700" dirty="0">
               <a:solidFill>
                 <a:srgbClr val="D9E8F7"/>
               </a:solidFill>
@@ -8358,7 +8358,7 @@
               </a:spcAft>
             </a:pPr>
             <a:r>
-              <a:rPr lang="en-US" sz="1000" dirty="0">
+              <a:rPr lang="en-US" sz="700" dirty="0">
                 <a:solidFill>
                   <a:srgbClr val="CC6C1D"/>
                 </a:solidFill>
@@ -8368,7 +8368,7 @@
               <a:t>public</a:t>
             </a:r>
             <a:r>
-              <a:rPr lang="en-US" sz="1000" dirty="0">
+              <a:rPr lang="en-US" sz="700" dirty="0">
                 <a:solidFill>
                   <a:srgbClr val="D9E8F7"/>
                 </a:solidFill>
@@ -8378,7 +8378,7 @@
               <a:t> </a:t>
             </a:r>
             <a:r>
-              <a:rPr lang="en-US" sz="1000" dirty="0">
+              <a:rPr lang="en-US" sz="700" dirty="0">
                 <a:solidFill>
                   <a:srgbClr val="CC6C1D"/>
                 </a:solidFill>
@@ -8388,7 +8388,7 @@
               <a:t>static</a:t>
             </a:r>
             <a:r>
-              <a:rPr lang="en-US" sz="1000" dirty="0">
+              <a:rPr lang="en-US" sz="700" dirty="0">
                 <a:solidFill>
                   <a:srgbClr val="D9E8F7"/>
                 </a:solidFill>
@@ -8398,7 +8398,7 @@
               <a:t> </a:t>
             </a:r>
             <a:r>
-              <a:rPr lang="en-US" sz="1000" dirty="0">
+              <a:rPr lang="en-US" sz="700" dirty="0">
                 <a:solidFill>
                   <a:srgbClr val="CC6C1D"/>
                 </a:solidFill>
@@ -8408,7 +8408,7 @@
               <a:t>double</a:t>
             </a:r>
             <a:r>
-              <a:rPr lang="en-US" sz="1000" dirty="0">
+              <a:rPr lang="en-US" sz="700" dirty="0">
                 <a:solidFill>
                   <a:srgbClr val="F9FAF4"/>
                 </a:solidFill>
@@ -8418,7 +8418,7 @@
               <a:t>[]</a:t>
             </a:r>
             <a:r>
-              <a:rPr lang="en-US" sz="1000" dirty="0">
+              <a:rPr lang="en-US" sz="700" dirty="0">
                 <a:solidFill>
                   <a:srgbClr val="D9E8F7"/>
                 </a:solidFill>
@@ -8428,7 +8428,7 @@
               <a:t> </a:t>
             </a:r>
             <a:r>
-              <a:rPr lang="en-US" sz="1000" dirty="0" err="1">
+              <a:rPr lang="en-US" sz="700" dirty="0" err="1">
                 <a:solidFill>
                   <a:srgbClr val="D9E8F7"/>
                 </a:solidFill>
@@ -8438,7 +8438,7 @@
               <a:t>calculateIntersection</a:t>
             </a:r>
             <a:r>
-              <a:rPr lang="en-US" sz="1000" dirty="0">
+              <a:rPr lang="en-US" sz="700" dirty="0">
                 <a:solidFill>
                   <a:srgbClr val="F9FAF4"/>
                 </a:solidFill>
@@ -8448,7 +8448,7 @@
               <a:t>(</a:t>
             </a:r>
             <a:r>
-              <a:rPr lang="en-US" sz="1000" dirty="0">
+              <a:rPr lang="en-US" sz="700" dirty="0">
                 <a:solidFill>
                   <a:srgbClr val="CC6C1D"/>
                 </a:solidFill>
@@ -8458,7 +8458,7 @@
               <a:t>double</a:t>
             </a:r>
             <a:r>
-              <a:rPr lang="en-US" sz="1000" dirty="0">
+              <a:rPr lang="en-US" sz="700" dirty="0">
                 <a:solidFill>
                   <a:srgbClr val="D9E8F7"/>
                 </a:solidFill>
@@ -8468,7 +8468,7 @@
               <a:t> x1</a:t>
             </a:r>
             <a:r>
-              <a:rPr lang="en-US" sz="1000" dirty="0">
+              <a:rPr lang="en-US" sz="700" dirty="0">
                 <a:solidFill>
                   <a:srgbClr val="E6E6FA"/>
                 </a:solidFill>
@@ -8478,7 +8478,7 @@
               <a:t>,</a:t>
             </a:r>
             <a:r>
-              <a:rPr lang="en-US" sz="1000" dirty="0">
+              <a:rPr lang="en-US" sz="700" dirty="0">
                 <a:solidFill>
                   <a:srgbClr val="D9E8F7"/>
                 </a:solidFill>
@@ -8488,7 +8488,7 @@
               <a:t> </a:t>
             </a:r>
             <a:r>
-              <a:rPr lang="en-US" sz="1000" dirty="0">
+              <a:rPr lang="en-US" sz="700" dirty="0">
                 <a:solidFill>
                   <a:srgbClr val="CC6C1D"/>
                 </a:solidFill>
@@ -8498,7 +8498,7 @@
               <a:t>double</a:t>
             </a:r>
             <a:r>
-              <a:rPr lang="en-US" sz="1000" dirty="0">
+              <a:rPr lang="en-US" sz="700" dirty="0">
                 <a:solidFill>
                   <a:srgbClr val="D9E8F7"/>
                 </a:solidFill>
@@ -8508,7 +8508,7 @@
               <a:t> y1</a:t>
             </a:r>
             <a:r>
-              <a:rPr lang="en-US" sz="1000" dirty="0">
+              <a:rPr lang="en-US" sz="700" dirty="0">
                 <a:solidFill>
                   <a:srgbClr val="E6E6FA"/>
                 </a:solidFill>
@@ -8518,7 +8518,7 @@
               <a:t>,</a:t>
             </a:r>
             <a:r>
-              <a:rPr lang="en-US" sz="1000" dirty="0">
+              <a:rPr lang="en-US" sz="700" dirty="0">
                 <a:solidFill>
                   <a:srgbClr val="D9E8F7"/>
                 </a:solidFill>
@@ -8528,7 +8528,7 @@
               <a:t> </a:t>
             </a:r>
             <a:r>
-              <a:rPr lang="en-US" sz="1000" dirty="0">
+              <a:rPr lang="en-US" sz="700" dirty="0">
                 <a:solidFill>
                   <a:srgbClr val="CC6C1D"/>
                 </a:solidFill>
@@ -8538,7 +8538,7 @@
               <a:t>double</a:t>
             </a:r>
             <a:r>
-              <a:rPr lang="en-US" sz="1000" dirty="0">
+              <a:rPr lang="en-US" sz="700" dirty="0">
                 <a:solidFill>
                   <a:srgbClr val="D9E8F7"/>
                 </a:solidFill>
@@ -8548,7 +8548,7 @@
               <a:t> x2</a:t>
             </a:r>
             <a:r>
-              <a:rPr lang="en-US" sz="1000" dirty="0">
+              <a:rPr lang="en-US" sz="700" dirty="0">
                 <a:solidFill>
                   <a:srgbClr val="E6E6FA"/>
                 </a:solidFill>
@@ -8558,7 +8558,7 @@
               <a:t>,</a:t>
             </a:r>
             <a:r>
-              <a:rPr lang="en-US" sz="1000" dirty="0">
+              <a:rPr lang="en-US" sz="700" dirty="0">
                 <a:solidFill>
                   <a:srgbClr val="D9E8F7"/>
                 </a:solidFill>
@@ -8568,7 +8568,7 @@
               <a:t> </a:t>
             </a:r>
             <a:r>
-              <a:rPr lang="en-US" sz="1000" dirty="0">
+              <a:rPr lang="en-US" sz="700" dirty="0">
                 <a:solidFill>
                   <a:srgbClr val="CC6C1D"/>
                 </a:solidFill>
@@ -8578,7 +8578,7 @@
               <a:t>double</a:t>
             </a:r>
             <a:r>
-              <a:rPr lang="en-US" sz="1000" dirty="0">
+              <a:rPr lang="en-US" sz="700" dirty="0">
                 <a:solidFill>
                   <a:srgbClr val="D9E8F7"/>
                 </a:solidFill>
@@ -8588,7 +8588,7 @@
               <a:t> y2</a:t>
             </a:r>
             <a:r>
-              <a:rPr lang="en-US" sz="1000" dirty="0">
+              <a:rPr lang="en-US" sz="700" dirty="0">
                 <a:solidFill>
                   <a:srgbClr val="E6E6FA"/>
                 </a:solidFill>
@@ -8597,7 +8597,7 @@
               </a:rPr>
               <a:t>,</a:t>
             </a:r>
-            <a:endParaRPr lang="en-US" sz="1000" dirty="0">
+            <a:endParaRPr lang="en-US" sz="700" dirty="0">
               <a:solidFill>
                 <a:srgbClr val="AAAAAA"/>
               </a:solidFill>
@@ -8615,7 +8615,7 @@
               </a:spcAft>
             </a:pPr>
             <a:r>
-              <a:rPr lang="en-US" sz="1000" dirty="0">
+              <a:rPr lang="en-US" sz="700" dirty="0">
                 <a:solidFill>
                   <a:srgbClr val="CC6C1D"/>
                 </a:solidFill>
@@ -8625,7 +8625,7 @@
               <a:t>double</a:t>
             </a:r>
             <a:r>
-              <a:rPr lang="en-US" sz="1000" dirty="0">
+              <a:rPr lang="en-US" sz="700" dirty="0">
                 <a:solidFill>
                   <a:srgbClr val="D9E8F7"/>
                 </a:solidFill>
@@ -8635,7 +8635,7 @@
               <a:t> x3</a:t>
             </a:r>
             <a:r>
-              <a:rPr lang="en-US" sz="1000" dirty="0">
+              <a:rPr lang="en-US" sz="700" dirty="0">
                 <a:solidFill>
                   <a:srgbClr val="E6E6FA"/>
                 </a:solidFill>
@@ -8645,7 +8645,7 @@
               <a:t>,</a:t>
             </a:r>
             <a:r>
-              <a:rPr lang="en-US" sz="1000" dirty="0">
+              <a:rPr lang="en-US" sz="700" dirty="0">
                 <a:solidFill>
                   <a:srgbClr val="D9E8F7"/>
                 </a:solidFill>
@@ -8655,7 +8655,7 @@
               <a:t> </a:t>
             </a:r>
             <a:r>
-              <a:rPr lang="en-US" sz="1000" dirty="0">
+              <a:rPr lang="en-US" sz="700" dirty="0">
                 <a:solidFill>
                   <a:srgbClr val="CC6C1D"/>
                 </a:solidFill>
@@ -8665,7 +8665,7 @@
               <a:t>double</a:t>
             </a:r>
             <a:r>
-              <a:rPr lang="en-US" sz="1000" dirty="0">
+              <a:rPr lang="en-US" sz="700" dirty="0">
                 <a:solidFill>
                   <a:srgbClr val="D9E8F7"/>
                 </a:solidFill>
@@ -8675,7 +8675,7 @@
               <a:t> y3</a:t>
             </a:r>
             <a:r>
-              <a:rPr lang="en-US" sz="1000" dirty="0">
+              <a:rPr lang="en-US" sz="700" dirty="0">
                 <a:solidFill>
                   <a:srgbClr val="E6E6FA"/>
                 </a:solidFill>
@@ -8685,7 +8685,7 @@
               <a:t>,</a:t>
             </a:r>
             <a:r>
-              <a:rPr lang="en-US" sz="1000" dirty="0">
+              <a:rPr lang="en-US" sz="700" dirty="0">
                 <a:solidFill>
                   <a:srgbClr val="D9E8F7"/>
                 </a:solidFill>
@@ -8695,7 +8695,7 @@
               <a:t> </a:t>
             </a:r>
             <a:r>
-              <a:rPr lang="en-US" sz="1000" dirty="0">
+              <a:rPr lang="en-US" sz="700" dirty="0">
                 <a:solidFill>
                   <a:srgbClr val="CC6C1D"/>
                 </a:solidFill>
@@ -8705,7 +8705,7 @@
               <a:t>double</a:t>
             </a:r>
             <a:r>
-              <a:rPr lang="en-US" sz="1000" dirty="0">
+              <a:rPr lang="en-US" sz="700" dirty="0">
                 <a:solidFill>
                   <a:srgbClr val="D9E8F7"/>
                 </a:solidFill>
@@ -8715,7 +8715,7 @@
               <a:t> x4</a:t>
             </a:r>
             <a:r>
-              <a:rPr lang="en-US" sz="1000" dirty="0">
+              <a:rPr lang="en-US" sz="700" dirty="0">
                 <a:solidFill>
                   <a:srgbClr val="E6E6FA"/>
                 </a:solidFill>
@@ -8725,7 +8725,7 @@
               <a:t>,</a:t>
             </a:r>
             <a:r>
-              <a:rPr lang="en-US" sz="1000" dirty="0">
+              <a:rPr lang="en-US" sz="700" dirty="0">
                 <a:solidFill>
                   <a:srgbClr val="D9E8F7"/>
                 </a:solidFill>
@@ -8735,7 +8735,7 @@
               <a:t> </a:t>
             </a:r>
             <a:r>
-              <a:rPr lang="en-US" sz="1000" dirty="0">
+              <a:rPr lang="en-US" sz="700" dirty="0">
                 <a:solidFill>
                   <a:srgbClr val="CC6C1D"/>
                 </a:solidFill>
@@ -8745,7 +8745,7 @@
               <a:t>double</a:t>
             </a:r>
             <a:r>
-              <a:rPr lang="en-US" sz="1000" dirty="0">
+              <a:rPr lang="en-US" sz="700" dirty="0">
                 <a:solidFill>
                   <a:srgbClr val="D9E8F7"/>
                 </a:solidFill>
@@ -8755,7 +8755,7 @@
               <a:t> y4</a:t>
             </a:r>
             <a:r>
-              <a:rPr lang="en-US" sz="1000" dirty="0">
+              <a:rPr lang="en-US" sz="700" dirty="0">
                 <a:solidFill>
                   <a:srgbClr val="F9FAF4"/>
                 </a:solidFill>
@@ -8765,7 +8765,7 @@
               <a:t>)</a:t>
             </a:r>
             <a:r>
-              <a:rPr lang="en-US" sz="1000" dirty="0">
+              <a:rPr lang="en-US" sz="700" dirty="0">
                 <a:solidFill>
                   <a:srgbClr val="D9E8F7"/>
                 </a:solidFill>
@@ -8775,7 +8775,7 @@
               <a:t> </a:t>
             </a:r>
             <a:r>
-              <a:rPr lang="en-US" sz="1000" dirty="0">
+              <a:rPr lang="en-US" sz="700" dirty="0">
                 <a:solidFill>
                   <a:srgbClr val="F9FAF4"/>
                 </a:solidFill>
@@ -8784,7 +8784,7 @@
               </a:rPr>
               <a:t>{</a:t>
             </a:r>
-            <a:endParaRPr lang="en-US" sz="1000" dirty="0">
+            <a:endParaRPr lang="en-US" sz="700" dirty="0">
               <a:solidFill>
                 <a:srgbClr val="AAAAAA"/>
               </a:solidFill>
@@ -8802,7 +8802,7 @@
               </a:spcAft>
             </a:pPr>
             <a:r>
-              <a:rPr lang="en-US" sz="1000" dirty="0">
+              <a:rPr lang="en-US" sz="700" dirty="0">
                 <a:solidFill>
                   <a:srgbClr val="CC6C1D"/>
                 </a:solidFill>
@@ -8812,7 +8812,7 @@
               <a:t>double</a:t>
             </a:r>
             <a:r>
-              <a:rPr lang="en-US" sz="1000" dirty="0">
+              <a:rPr lang="en-US" sz="700" dirty="0">
                 <a:solidFill>
                   <a:srgbClr val="F9FAF4"/>
                 </a:solidFill>
@@ -8822,7 +8822,7 @@
               <a:t>[]</a:t>
             </a:r>
             <a:r>
-              <a:rPr lang="en-US" sz="1000" dirty="0">
+              <a:rPr lang="en-US" sz="700" dirty="0">
                 <a:solidFill>
                   <a:srgbClr val="D9E8F7"/>
                 </a:solidFill>
@@ -8832,7 +8832,7 @@
               <a:t> intersection </a:t>
             </a:r>
             <a:r>
-              <a:rPr lang="en-US" sz="1000" dirty="0">
+              <a:rPr lang="en-US" sz="700" dirty="0">
                 <a:solidFill>
                   <a:srgbClr val="E6E6FA"/>
                 </a:solidFill>
@@ -8842,7 +8842,7 @@
               <a:t>=</a:t>
             </a:r>
             <a:r>
-              <a:rPr lang="en-US" sz="1000" dirty="0">
+              <a:rPr lang="en-US" sz="700" dirty="0">
                 <a:solidFill>
                   <a:srgbClr val="D9E8F7"/>
                 </a:solidFill>
@@ -8852,7 +8852,7 @@
               <a:t> </a:t>
             </a:r>
             <a:r>
-              <a:rPr lang="en-US" sz="1000" dirty="0">
+              <a:rPr lang="en-US" sz="700" dirty="0">
                 <a:solidFill>
                   <a:srgbClr val="CC6C1D"/>
                 </a:solidFill>
@@ -8862,7 +8862,7 @@
               <a:t>new</a:t>
             </a:r>
             <a:r>
-              <a:rPr lang="en-US" sz="1000" dirty="0">
+              <a:rPr lang="en-US" sz="700" dirty="0">
                 <a:solidFill>
                   <a:srgbClr val="D9E8F7"/>
                 </a:solidFill>
@@ -8872,7 +8872,7 @@
               <a:t> </a:t>
             </a:r>
             <a:r>
-              <a:rPr lang="en-US" sz="1000" dirty="0">
+              <a:rPr lang="en-US" sz="700" dirty="0">
                 <a:solidFill>
                   <a:srgbClr val="CC6C1D"/>
                 </a:solidFill>
@@ -8882,7 +8882,7 @@
               <a:t>double</a:t>
             </a:r>
             <a:r>
-              <a:rPr lang="en-US" sz="1000" dirty="0">
+              <a:rPr lang="en-US" sz="700" dirty="0">
                 <a:solidFill>
                   <a:srgbClr val="F9FAF4"/>
                 </a:solidFill>
@@ -8892,7 +8892,7 @@
               <a:t>[</a:t>
             </a:r>
             <a:r>
-              <a:rPr lang="en-US" sz="1000" dirty="0">
+              <a:rPr lang="en-US" sz="700" dirty="0">
                 <a:solidFill>
                   <a:srgbClr val="D9E8F7"/>
                 </a:solidFill>
@@ -8902,7 +8902,7 @@
               <a:t>2</a:t>
             </a:r>
             <a:r>
-              <a:rPr lang="en-US" sz="1000" dirty="0">
+              <a:rPr lang="en-US" sz="700" dirty="0">
                 <a:solidFill>
                   <a:srgbClr val="F9FAF4"/>
                 </a:solidFill>
@@ -8912,7 +8912,7 @@
               <a:t>]</a:t>
             </a:r>
             <a:r>
-              <a:rPr lang="en-US" sz="1000" dirty="0">
+              <a:rPr lang="en-US" sz="700" dirty="0">
                 <a:solidFill>
                   <a:srgbClr val="E6E6FA"/>
                 </a:solidFill>
@@ -8921,7 +8921,7 @@
               </a:rPr>
               <a:t>;</a:t>
             </a:r>
-            <a:endParaRPr lang="en-US" sz="1000" dirty="0">
+            <a:endParaRPr lang="en-US" sz="700" dirty="0">
               <a:solidFill>
                 <a:srgbClr val="AAAAAA"/>
               </a:solidFill>
@@ -8939,7 +8939,7 @@
               </a:spcAft>
             </a:pPr>
             <a:br>
-              <a:rPr lang="en-US" sz="1000" dirty="0">
+              <a:rPr lang="en-US" sz="700" dirty="0">
                 <a:solidFill>
                   <a:srgbClr val="AAAAAA"/>
                 </a:solidFill>
@@ -8947,7 +8947,7 @@
                 <a:latin typeface="Consolas" panose="020B0609020204030204" pitchFamily="49" charset="0"/>
               </a:rPr>
             </a:br>
-            <a:endParaRPr lang="en-US" sz="1000" dirty="0">
+            <a:endParaRPr lang="en-US" sz="700" dirty="0">
               <a:solidFill>
                 <a:srgbClr val="AAAAAA"/>
               </a:solidFill>
@@ -8965,7 +8965,7 @@
               </a:spcAft>
             </a:pPr>
             <a:r>
-              <a:rPr lang="en-US" sz="1000" dirty="0">
+              <a:rPr lang="en-US" sz="700" dirty="0">
                 <a:solidFill>
                   <a:srgbClr val="CC6C1D"/>
                 </a:solidFill>
@@ -8975,7 +8975,7 @@
               <a:t>double</a:t>
             </a:r>
             <a:r>
-              <a:rPr lang="en-US" sz="1000" dirty="0">
+              <a:rPr lang="en-US" sz="700" dirty="0">
                 <a:solidFill>
                   <a:srgbClr val="D9E8F7"/>
                 </a:solidFill>
@@ -8985,7 +8985,7 @@
               <a:t> denominator </a:t>
             </a:r>
             <a:r>
-              <a:rPr lang="en-US" sz="1000" dirty="0">
+              <a:rPr lang="en-US" sz="700" dirty="0">
                 <a:solidFill>
                   <a:srgbClr val="E6E6FA"/>
                 </a:solidFill>
@@ -8995,7 +8995,7 @@
               <a:t>=</a:t>
             </a:r>
             <a:r>
-              <a:rPr lang="en-US" sz="1000" dirty="0">
+              <a:rPr lang="en-US" sz="700" dirty="0">
                 <a:solidFill>
                   <a:srgbClr val="D9E8F7"/>
                 </a:solidFill>
@@ -9005,7 +9005,7 @@
               <a:t> </a:t>
             </a:r>
             <a:r>
-              <a:rPr lang="en-US" sz="1000" dirty="0">
+              <a:rPr lang="en-US" sz="700" dirty="0">
                 <a:solidFill>
                   <a:srgbClr val="F9FAF4"/>
                 </a:solidFill>
@@ -9015,7 +9015,7 @@
               <a:t>(</a:t>
             </a:r>
             <a:r>
-              <a:rPr lang="en-US" sz="1000" dirty="0">
+              <a:rPr lang="en-US" sz="700" dirty="0">
                 <a:solidFill>
                   <a:srgbClr val="D9E8F7"/>
                 </a:solidFill>
@@ -9025,7 +9025,7 @@
               <a:t>x1 </a:t>
             </a:r>
             <a:r>
-              <a:rPr lang="en-US" sz="1000" dirty="0">
+              <a:rPr lang="en-US" sz="700" dirty="0">
                 <a:solidFill>
                   <a:srgbClr val="E6E6FA"/>
                 </a:solidFill>
@@ -9035,7 +9035,7 @@
               <a:t>-</a:t>
             </a:r>
             <a:r>
-              <a:rPr lang="en-US" sz="1000" dirty="0">
+              <a:rPr lang="en-US" sz="700" dirty="0">
                 <a:solidFill>
                   <a:srgbClr val="D9E8F7"/>
                 </a:solidFill>
@@ -9045,7 +9045,7 @@
               <a:t> x2</a:t>
             </a:r>
             <a:r>
-              <a:rPr lang="en-US" sz="1000" dirty="0">
+              <a:rPr lang="en-US" sz="700" dirty="0">
                 <a:solidFill>
                   <a:srgbClr val="F9FAF4"/>
                 </a:solidFill>
@@ -9055,7 +9055,7 @@
               <a:t>)</a:t>
             </a:r>
             <a:r>
-              <a:rPr lang="en-US" sz="1000" dirty="0">
+              <a:rPr lang="en-US" sz="700" dirty="0">
                 <a:solidFill>
                   <a:srgbClr val="D9E8F7"/>
                 </a:solidFill>
@@ -9065,7 +9065,7 @@
               <a:t> </a:t>
             </a:r>
             <a:r>
-              <a:rPr lang="en-US" sz="1000" dirty="0">
+              <a:rPr lang="en-US" sz="700" dirty="0">
                 <a:solidFill>
                   <a:srgbClr val="E6E6FA"/>
                 </a:solidFill>
@@ -9075,7 +9075,7 @@
               <a:t>*</a:t>
             </a:r>
             <a:r>
-              <a:rPr lang="en-US" sz="1000" dirty="0">
+              <a:rPr lang="en-US" sz="700" dirty="0">
                 <a:solidFill>
                   <a:srgbClr val="D9E8F7"/>
                 </a:solidFill>
@@ -9085,7 +9085,7 @@
               <a:t> </a:t>
             </a:r>
             <a:r>
-              <a:rPr lang="en-US" sz="1000" dirty="0">
+              <a:rPr lang="en-US" sz="700" dirty="0">
                 <a:solidFill>
                   <a:srgbClr val="F9FAF4"/>
                 </a:solidFill>
@@ -9095,7 +9095,7 @@
               <a:t>(</a:t>
             </a:r>
             <a:r>
-              <a:rPr lang="en-US" sz="1000" dirty="0">
+              <a:rPr lang="en-US" sz="700" dirty="0">
                 <a:solidFill>
                   <a:srgbClr val="D9E8F7"/>
                 </a:solidFill>
@@ -9105,7 +9105,7 @@
               <a:t>y3 </a:t>
             </a:r>
             <a:r>
-              <a:rPr lang="en-US" sz="1000" dirty="0">
+              <a:rPr lang="en-US" sz="700" dirty="0">
                 <a:solidFill>
                   <a:srgbClr val="E6E6FA"/>
                 </a:solidFill>
@@ -9115,7 +9115,7 @@
               <a:t>-</a:t>
             </a:r>
             <a:r>
-              <a:rPr lang="en-US" sz="1000" dirty="0">
+              <a:rPr lang="en-US" sz="700" dirty="0">
                 <a:solidFill>
                   <a:srgbClr val="D9E8F7"/>
                 </a:solidFill>
@@ -9125,7 +9125,7 @@
               <a:t> y4</a:t>
             </a:r>
             <a:r>
-              <a:rPr lang="en-US" sz="1000" dirty="0">
+              <a:rPr lang="en-US" sz="700" dirty="0">
                 <a:solidFill>
                   <a:srgbClr val="F9FAF4"/>
                 </a:solidFill>
@@ -9135,7 +9135,7 @@
               <a:t>)</a:t>
             </a:r>
             <a:r>
-              <a:rPr lang="en-US" sz="1000" dirty="0">
+              <a:rPr lang="en-US" sz="700" dirty="0">
                 <a:solidFill>
                   <a:srgbClr val="D9E8F7"/>
                 </a:solidFill>
@@ -9145,7 +9145,7 @@
               <a:t> </a:t>
             </a:r>
             <a:r>
-              <a:rPr lang="en-US" sz="1000" dirty="0">
+              <a:rPr lang="en-US" sz="700" dirty="0">
                 <a:solidFill>
                   <a:srgbClr val="E6E6FA"/>
                 </a:solidFill>
@@ -9155,7 +9155,7 @@
               <a:t>-</a:t>
             </a:r>
             <a:r>
-              <a:rPr lang="en-US" sz="1000" dirty="0">
+              <a:rPr lang="en-US" sz="700" dirty="0">
                 <a:solidFill>
                   <a:srgbClr val="D9E8F7"/>
                 </a:solidFill>
@@ -9165,7 +9165,7 @@
               <a:t> </a:t>
             </a:r>
             <a:r>
-              <a:rPr lang="en-US" sz="1000" dirty="0">
+              <a:rPr lang="en-US" sz="700" dirty="0">
                 <a:solidFill>
                   <a:srgbClr val="F9FAF4"/>
                 </a:solidFill>
@@ -9175,7 +9175,7 @@
               <a:t>(</a:t>
             </a:r>
             <a:r>
-              <a:rPr lang="en-US" sz="1000" dirty="0">
+              <a:rPr lang="en-US" sz="700" dirty="0">
                 <a:solidFill>
                   <a:srgbClr val="D9E8F7"/>
                 </a:solidFill>
@@ -9185,7 +9185,7 @@
               <a:t>y1 </a:t>
             </a:r>
             <a:r>
-              <a:rPr lang="en-US" sz="1000" dirty="0">
+              <a:rPr lang="en-US" sz="700" dirty="0">
                 <a:solidFill>
                   <a:srgbClr val="E6E6FA"/>
                 </a:solidFill>
@@ -9195,7 +9195,7 @@
               <a:t>-</a:t>
             </a:r>
             <a:r>
-              <a:rPr lang="en-US" sz="1000" dirty="0">
+              <a:rPr lang="en-US" sz="700" dirty="0">
                 <a:solidFill>
                   <a:srgbClr val="D9E8F7"/>
                 </a:solidFill>
@@ -9205,7 +9205,7 @@
               <a:t> y2</a:t>
             </a:r>
             <a:r>
-              <a:rPr lang="en-US" sz="1000" dirty="0">
+              <a:rPr lang="en-US" sz="700" dirty="0">
                 <a:solidFill>
                   <a:srgbClr val="F9FAF4"/>
                 </a:solidFill>
@@ -9215,7 +9215,7 @@
               <a:t>)</a:t>
             </a:r>
             <a:r>
-              <a:rPr lang="en-US" sz="1000" dirty="0">
+              <a:rPr lang="en-US" sz="700" dirty="0">
                 <a:solidFill>
                   <a:srgbClr val="D9E8F7"/>
                 </a:solidFill>
@@ -9225,7 +9225,7 @@
               <a:t> </a:t>
             </a:r>
             <a:r>
-              <a:rPr lang="en-US" sz="1000" dirty="0">
+              <a:rPr lang="en-US" sz="700" dirty="0">
                 <a:solidFill>
                   <a:srgbClr val="E6E6FA"/>
                 </a:solidFill>
@@ -9235,7 +9235,7 @@
               <a:t>*</a:t>
             </a:r>
             <a:r>
-              <a:rPr lang="en-US" sz="1000" dirty="0">
+              <a:rPr lang="en-US" sz="700" dirty="0">
                 <a:solidFill>
                   <a:srgbClr val="D9E8F7"/>
                 </a:solidFill>
@@ -9245,7 +9245,7 @@
               <a:t> </a:t>
             </a:r>
             <a:r>
-              <a:rPr lang="en-US" sz="1000" dirty="0">
+              <a:rPr lang="en-US" sz="700" dirty="0">
                 <a:solidFill>
                   <a:srgbClr val="F9FAF4"/>
                 </a:solidFill>
@@ -9255,7 +9255,7 @@
               <a:t>(</a:t>
             </a:r>
             <a:r>
-              <a:rPr lang="en-US" sz="1000" dirty="0">
+              <a:rPr lang="en-US" sz="700" dirty="0">
                 <a:solidFill>
                   <a:srgbClr val="D9E8F7"/>
                 </a:solidFill>
@@ -9265,7 +9265,7 @@
               <a:t>x3 </a:t>
             </a:r>
             <a:r>
-              <a:rPr lang="en-US" sz="1000" dirty="0">
+              <a:rPr lang="en-US" sz="700" dirty="0">
                 <a:solidFill>
                   <a:srgbClr val="E6E6FA"/>
                 </a:solidFill>
@@ -9275,7 +9275,7 @@
               <a:t>-</a:t>
             </a:r>
             <a:r>
-              <a:rPr lang="en-US" sz="1000" dirty="0">
+              <a:rPr lang="en-US" sz="700" dirty="0">
                 <a:solidFill>
                   <a:srgbClr val="D9E8F7"/>
                 </a:solidFill>
@@ -9285,7 +9285,7 @@
               <a:t> x4</a:t>
             </a:r>
             <a:r>
-              <a:rPr lang="en-US" sz="1000" dirty="0">
+              <a:rPr lang="en-US" sz="700" dirty="0">
                 <a:solidFill>
                   <a:srgbClr val="F9FAF4"/>
                 </a:solidFill>
@@ -9295,7 +9295,7 @@
               <a:t>)</a:t>
             </a:r>
             <a:r>
-              <a:rPr lang="en-US" sz="1000" dirty="0">
+              <a:rPr lang="en-US" sz="700" dirty="0">
                 <a:solidFill>
                   <a:srgbClr val="E6E6FA"/>
                 </a:solidFill>
@@ -9304,7 +9304,7 @@
               </a:rPr>
               <a:t>;</a:t>
             </a:r>
-            <a:endParaRPr lang="en-US" sz="1000" dirty="0">
+            <a:endParaRPr lang="en-US" sz="700" dirty="0">
               <a:solidFill>
                 <a:srgbClr val="AAAAAA"/>
               </a:solidFill>
@@ -9322,7 +9322,7 @@
               </a:spcAft>
             </a:pPr>
             <a:br>
-              <a:rPr lang="en-US" sz="1000" dirty="0">
+              <a:rPr lang="en-US" sz="700" dirty="0">
                 <a:solidFill>
                   <a:srgbClr val="AAAAAA"/>
                 </a:solidFill>
@@ -9330,7 +9330,7 @@
                 <a:latin typeface="Consolas" panose="020B0609020204030204" pitchFamily="49" charset="0"/>
               </a:rPr>
             </a:br>
-            <a:endParaRPr lang="en-US" sz="1000" dirty="0">
+            <a:endParaRPr lang="en-US" sz="700" dirty="0">
               <a:solidFill>
                 <a:srgbClr val="AAAAAA"/>
               </a:solidFill>
@@ -9348,7 +9348,7 @@
               </a:spcAft>
             </a:pPr>
             <a:r>
-              <a:rPr lang="en-US" sz="1000" dirty="0">
+              <a:rPr lang="en-US" sz="700" dirty="0">
                 <a:solidFill>
                   <a:srgbClr val="808080"/>
                 </a:solidFill>
@@ -9357,7 +9357,7 @@
               </a:rPr>
               <a:t>// Check if the lines are parallel (denominator is zero)</a:t>
             </a:r>
-            <a:endParaRPr lang="en-US" sz="1000" dirty="0">
+            <a:endParaRPr lang="en-US" sz="700" dirty="0">
               <a:solidFill>
                 <a:srgbClr val="AAAAAA"/>
               </a:solidFill>
@@ -9375,7 +9375,7 @@
               </a:spcAft>
             </a:pPr>
             <a:r>
-              <a:rPr lang="en-US" sz="1000" dirty="0">
+              <a:rPr lang="en-US" sz="700" dirty="0">
                 <a:solidFill>
                   <a:srgbClr val="CC6C1D"/>
                 </a:solidFill>
@@ -9385,7 +9385,7 @@
               <a:t>if</a:t>
             </a:r>
             <a:r>
-              <a:rPr lang="en-US" sz="1000" dirty="0">
+              <a:rPr lang="en-US" sz="700" dirty="0">
                 <a:solidFill>
                   <a:srgbClr val="D9E8F7"/>
                 </a:solidFill>
@@ -9395,7 +9395,7 @@
               <a:t> </a:t>
             </a:r>
             <a:r>
-              <a:rPr lang="en-US" sz="1000" dirty="0">
+              <a:rPr lang="en-US" sz="700" dirty="0">
                 <a:solidFill>
                   <a:srgbClr val="F9FAF4"/>
                 </a:solidFill>
@@ -9405,7 +9405,7 @@
               <a:t>(</a:t>
             </a:r>
             <a:r>
-              <a:rPr lang="en-US" sz="1000" dirty="0">
+              <a:rPr lang="en-US" sz="700" dirty="0">
                 <a:solidFill>
                   <a:srgbClr val="D9E8F7"/>
                 </a:solidFill>
@@ -9415,7 +9415,7 @@
               <a:t>denominator </a:t>
             </a:r>
             <a:r>
-              <a:rPr lang="en-US" sz="1000" dirty="0">
+              <a:rPr lang="en-US" sz="700" dirty="0">
                 <a:solidFill>
                   <a:srgbClr val="E6E6FA"/>
                 </a:solidFill>
@@ -9425,7 +9425,7 @@
               <a:t>==</a:t>
             </a:r>
             <a:r>
-              <a:rPr lang="en-US" sz="1000" dirty="0">
+              <a:rPr lang="en-US" sz="700" dirty="0">
                 <a:solidFill>
                   <a:srgbClr val="D9E8F7"/>
                 </a:solidFill>
@@ -9435,7 +9435,7 @@
               <a:t> 0</a:t>
             </a:r>
             <a:r>
-              <a:rPr lang="en-US" sz="1000" dirty="0">
+              <a:rPr lang="en-US" sz="700" dirty="0">
                 <a:solidFill>
                   <a:srgbClr val="F9FAF4"/>
                 </a:solidFill>
@@ -9445,7 +9445,7 @@
               <a:t>)</a:t>
             </a:r>
             <a:r>
-              <a:rPr lang="en-US" sz="1000" dirty="0">
+              <a:rPr lang="en-US" sz="700" dirty="0">
                 <a:solidFill>
                   <a:srgbClr val="D9E8F7"/>
                 </a:solidFill>
@@ -9455,7 +9455,7 @@
               <a:t> </a:t>
             </a:r>
             <a:r>
-              <a:rPr lang="en-US" sz="1000" dirty="0">
+              <a:rPr lang="en-US" sz="700" dirty="0">
                 <a:solidFill>
                   <a:srgbClr val="F9FAF4"/>
                 </a:solidFill>
@@ -9464,7 +9464,7 @@
               </a:rPr>
               <a:t>{</a:t>
             </a:r>
-            <a:endParaRPr lang="en-US" sz="1000" dirty="0">
+            <a:endParaRPr lang="en-US" sz="700" dirty="0">
               <a:solidFill>
                 <a:srgbClr val="AAAAAA"/>
               </a:solidFill>
@@ -9482,7 +9482,7 @@
               </a:spcAft>
             </a:pPr>
             <a:r>
-              <a:rPr lang="en-US" sz="1000" dirty="0">
+              <a:rPr lang="en-US" sz="700" dirty="0">
                 <a:solidFill>
                   <a:srgbClr val="CC6C1D"/>
                 </a:solidFill>
@@ -9492,7 +9492,7 @@
               <a:t>return</a:t>
             </a:r>
             <a:r>
-              <a:rPr lang="en-US" sz="1000" dirty="0">
+              <a:rPr lang="en-US" sz="700" dirty="0">
                 <a:solidFill>
                   <a:srgbClr val="D9E8F7"/>
                 </a:solidFill>
@@ -9502,7 +9502,7 @@
               <a:t> </a:t>
             </a:r>
             <a:r>
-              <a:rPr lang="en-US" sz="1000" dirty="0">
+              <a:rPr lang="en-US" sz="700" dirty="0">
                 <a:solidFill>
                   <a:srgbClr val="CC6C1D"/>
                 </a:solidFill>
@@ -9512,7 +9512,7 @@
               <a:t>null</a:t>
             </a:r>
             <a:r>
-              <a:rPr lang="en-US" sz="1000" dirty="0">
+              <a:rPr lang="en-US" sz="700" dirty="0">
                 <a:solidFill>
                   <a:srgbClr val="E6E6FA"/>
                 </a:solidFill>
@@ -9522,7 +9522,7 @@
               <a:t>;</a:t>
             </a:r>
             <a:r>
-              <a:rPr lang="en-US" sz="1000" dirty="0">
+              <a:rPr lang="en-US" sz="700" dirty="0">
                 <a:solidFill>
                   <a:srgbClr val="D9E8F7"/>
                 </a:solidFill>
@@ -9532,7 +9532,7 @@
               <a:t> </a:t>
             </a:r>
             <a:r>
-              <a:rPr lang="en-US" sz="1000" dirty="0">
+              <a:rPr lang="en-US" sz="700" dirty="0">
                 <a:solidFill>
                   <a:srgbClr val="808080"/>
                 </a:solidFill>
@@ -9541,7 +9541,7 @@
               </a:rPr>
               <a:t>// No intersection</a:t>
             </a:r>
-            <a:endParaRPr lang="en-US" sz="1000" dirty="0">
+            <a:endParaRPr lang="en-US" sz="700" dirty="0">
               <a:solidFill>
                 <a:srgbClr val="AAAAAA"/>
               </a:solidFill>
@@ -9559,7 +9559,7 @@
               </a:spcAft>
             </a:pPr>
             <a:r>
-              <a:rPr lang="en-US" sz="1000" dirty="0">
+              <a:rPr lang="en-US" sz="700" dirty="0">
                 <a:solidFill>
                   <a:srgbClr val="F9FAF4"/>
                 </a:solidFill>
@@ -9568,7 +9568,7 @@
               </a:rPr>
               <a:t>}</a:t>
             </a:r>
-            <a:endParaRPr lang="en-US" sz="1000" dirty="0">
+            <a:endParaRPr lang="en-US" sz="700" dirty="0">
               <a:solidFill>
                 <a:srgbClr val="AAAAAA"/>
               </a:solidFill>
@@ -9586,7 +9586,7 @@
               </a:spcAft>
             </a:pPr>
             <a:br>
-              <a:rPr lang="en-US" sz="1000" dirty="0">
+              <a:rPr lang="en-US" sz="700" dirty="0">
                 <a:solidFill>
                   <a:srgbClr val="AAAAAA"/>
                 </a:solidFill>
@@ -9594,7 +9594,7 @@
                 <a:latin typeface="Consolas" panose="020B0609020204030204" pitchFamily="49" charset="0"/>
               </a:rPr>
             </a:br>
-            <a:endParaRPr lang="en-US" sz="1000" dirty="0">
+            <a:endParaRPr lang="en-US" sz="700" dirty="0">
               <a:solidFill>
                 <a:srgbClr val="AAAAAA"/>
               </a:solidFill>
@@ -9612,7 +9612,7 @@
               </a:spcAft>
             </a:pPr>
             <a:r>
-              <a:rPr lang="en-US" sz="1000" dirty="0">
+              <a:rPr lang="en-US" sz="700" dirty="0">
                 <a:solidFill>
                   <a:srgbClr val="CC6C1D"/>
                 </a:solidFill>
@@ -9622,7 +9622,7 @@
               <a:t>double</a:t>
             </a:r>
             <a:r>
-              <a:rPr lang="en-US" sz="1000" dirty="0">
+              <a:rPr lang="en-US" sz="700" dirty="0">
                 <a:solidFill>
                   <a:srgbClr val="D9E8F7"/>
                 </a:solidFill>
@@ -9632,7 +9632,7 @@
               <a:t> t </a:t>
             </a:r>
             <a:r>
-              <a:rPr lang="en-US" sz="1000" dirty="0">
+              <a:rPr lang="en-US" sz="700" dirty="0">
                 <a:solidFill>
                   <a:srgbClr val="E6E6FA"/>
                 </a:solidFill>
@@ -9642,7 +9642,7 @@
               <a:t>=</a:t>
             </a:r>
             <a:r>
-              <a:rPr lang="en-US" sz="1000" dirty="0">
+              <a:rPr lang="en-US" sz="700" dirty="0">
                 <a:solidFill>
                   <a:srgbClr val="D9E8F7"/>
                 </a:solidFill>
@@ -9652,7 +9652,7 @@
               <a:t> </a:t>
             </a:r>
             <a:r>
-              <a:rPr lang="en-US" sz="1000" dirty="0">
+              <a:rPr lang="en-US" sz="700" dirty="0">
                 <a:solidFill>
                   <a:srgbClr val="F9FAF4"/>
                 </a:solidFill>
@@ -9662,7 +9662,7 @@
               <a:t>((</a:t>
             </a:r>
             <a:r>
-              <a:rPr lang="en-US" sz="1000" dirty="0">
+              <a:rPr lang="en-US" sz="700" dirty="0">
                 <a:solidFill>
                   <a:srgbClr val="D9E8F7"/>
                 </a:solidFill>
@@ -9672,7 +9672,7 @@
               <a:t>x1 </a:t>
             </a:r>
             <a:r>
-              <a:rPr lang="en-US" sz="1000" dirty="0">
+              <a:rPr lang="en-US" sz="700" dirty="0">
                 <a:solidFill>
                   <a:srgbClr val="E6E6FA"/>
                 </a:solidFill>
@@ -9682,7 +9682,7 @@
               <a:t>-</a:t>
             </a:r>
             <a:r>
-              <a:rPr lang="en-US" sz="1000" dirty="0">
+              <a:rPr lang="en-US" sz="700" dirty="0">
                 <a:solidFill>
                   <a:srgbClr val="D9E8F7"/>
                 </a:solidFill>
@@ -9692,7 +9692,7 @@
               <a:t> x3</a:t>
             </a:r>
             <a:r>
-              <a:rPr lang="en-US" sz="1000" dirty="0">
+              <a:rPr lang="en-US" sz="700" dirty="0">
                 <a:solidFill>
                   <a:srgbClr val="F9FAF4"/>
                 </a:solidFill>
@@ -9702,7 +9702,7 @@
               <a:t>)</a:t>
             </a:r>
             <a:r>
-              <a:rPr lang="en-US" sz="1000" dirty="0">
+              <a:rPr lang="en-US" sz="700" dirty="0">
                 <a:solidFill>
                   <a:srgbClr val="D9E8F7"/>
                 </a:solidFill>
@@ -9712,7 +9712,7 @@
               <a:t> </a:t>
             </a:r>
             <a:r>
-              <a:rPr lang="en-US" sz="1000" dirty="0">
+              <a:rPr lang="en-US" sz="700" dirty="0">
                 <a:solidFill>
                   <a:srgbClr val="E6E6FA"/>
                 </a:solidFill>
@@ -9722,7 +9722,7 @@
               <a:t>*</a:t>
             </a:r>
             <a:r>
-              <a:rPr lang="en-US" sz="1000" dirty="0">
+              <a:rPr lang="en-US" sz="700" dirty="0">
                 <a:solidFill>
                   <a:srgbClr val="D9E8F7"/>
                 </a:solidFill>
@@ -9732,7 +9732,7 @@
               <a:t> </a:t>
             </a:r>
             <a:r>
-              <a:rPr lang="en-US" sz="1000" dirty="0">
+              <a:rPr lang="en-US" sz="700" dirty="0">
                 <a:solidFill>
                   <a:srgbClr val="F9FAF4"/>
                 </a:solidFill>
@@ -9742,7 +9742,7 @@
               <a:t>(</a:t>
             </a:r>
             <a:r>
-              <a:rPr lang="en-US" sz="1000" dirty="0">
+              <a:rPr lang="en-US" sz="700" dirty="0">
                 <a:solidFill>
                   <a:srgbClr val="D9E8F7"/>
                 </a:solidFill>
@@ -9752,7 +9752,7 @@
               <a:t>y3 </a:t>
             </a:r>
             <a:r>
-              <a:rPr lang="en-US" sz="1000" dirty="0">
+              <a:rPr lang="en-US" sz="700" dirty="0">
                 <a:solidFill>
                   <a:srgbClr val="E6E6FA"/>
                 </a:solidFill>
@@ -9762,7 +9762,7 @@
               <a:t>-</a:t>
             </a:r>
             <a:r>
-              <a:rPr lang="en-US" sz="1000" dirty="0">
+              <a:rPr lang="en-US" sz="700" dirty="0">
                 <a:solidFill>
                   <a:srgbClr val="D9E8F7"/>
                 </a:solidFill>
@@ -9772,7 +9772,7 @@
               <a:t> y4</a:t>
             </a:r>
             <a:r>
-              <a:rPr lang="en-US" sz="1000" dirty="0">
+              <a:rPr lang="en-US" sz="700" dirty="0">
                 <a:solidFill>
                   <a:srgbClr val="F9FAF4"/>
                 </a:solidFill>
@@ -9782,7 +9782,7 @@
               <a:t>)</a:t>
             </a:r>
             <a:r>
-              <a:rPr lang="en-US" sz="1000" dirty="0">
+              <a:rPr lang="en-US" sz="700" dirty="0">
                 <a:solidFill>
                   <a:srgbClr val="D9E8F7"/>
                 </a:solidFill>
@@ -9792,7 +9792,7 @@
               <a:t> </a:t>
             </a:r>
             <a:r>
-              <a:rPr lang="en-US" sz="1000" dirty="0">
+              <a:rPr lang="en-US" sz="700" dirty="0">
                 <a:solidFill>
                   <a:srgbClr val="E6E6FA"/>
                 </a:solidFill>
@@ -9802,7 +9802,7 @@
               <a:t>-</a:t>
             </a:r>
             <a:r>
-              <a:rPr lang="en-US" sz="1000" dirty="0">
+              <a:rPr lang="en-US" sz="700" dirty="0">
                 <a:solidFill>
                   <a:srgbClr val="D9E8F7"/>
                 </a:solidFill>
@@ -9812,7 +9812,7 @@
               <a:t> </a:t>
             </a:r>
             <a:r>
-              <a:rPr lang="en-US" sz="1000" dirty="0">
+              <a:rPr lang="en-US" sz="700" dirty="0">
                 <a:solidFill>
                   <a:srgbClr val="F9FAF4"/>
                 </a:solidFill>
@@ -9822,7 +9822,7 @@
               <a:t>(</a:t>
             </a:r>
             <a:r>
-              <a:rPr lang="en-US" sz="1000" dirty="0">
+              <a:rPr lang="en-US" sz="700" dirty="0">
                 <a:solidFill>
                   <a:srgbClr val="D9E8F7"/>
                 </a:solidFill>
@@ -9832,7 +9832,7 @@
               <a:t>y1 </a:t>
             </a:r>
             <a:r>
-              <a:rPr lang="en-US" sz="1000" dirty="0">
+              <a:rPr lang="en-US" sz="700" dirty="0">
                 <a:solidFill>
                   <a:srgbClr val="E6E6FA"/>
                 </a:solidFill>
@@ -9842,7 +9842,7 @@
               <a:t>-</a:t>
             </a:r>
             <a:r>
-              <a:rPr lang="en-US" sz="1000" dirty="0">
+              <a:rPr lang="en-US" sz="700" dirty="0">
                 <a:solidFill>
                   <a:srgbClr val="D9E8F7"/>
                 </a:solidFill>
@@ -9852,7 +9852,7 @@
               <a:t> y3</a:t>
             </a:r>
             <a:r>
-              <a:rPr lang="en-US" sz="1000" dirty="0">
+              <a:rPr lang="en-US" sz="700" dirty="0">
                 <a:solidFill>
                   <a:srgbClr val="F9FAF4"/>
                 </a:solidFill>
@@ -9862,7 +9862,7 @@
               <a:t>)</a:t>
             </a:r>
             <a:r>
-              <a:rPr lang="en-US" sz="1000" dirty="0">
+              <a:rPr lang="en-US" sz="700" dirty="0">
                 <a:solidFill>
                   <a:srgbClr val="D9E8F7"/>
                 </a:solidFill>
@@ -9872,7 +9872,7 @@
               <a:t> </a:t>
             </a:r>
             <a:r>
-              <a:rPr lang="en-US" sz="1000" dirty="0">
+              <a:rPr lang="en-US" sz="700" dirty="0">
                 <a:solidFill>
                   <a:srgbClr val="E6E6FA"/>
                 </a:solidFill>
@@ -9882,7 +9882,7 @@
               <a:t>*</a:t>
             </a:r>
             <a:r>
-              <a:rPr lang="en-US" sz="1000" dirty="0">
+              <a:rPr lang="en-US" sz="700" dirty="0">
                 <a:solidFill>
                   <a:srgbClr val="D9E8F7"/>
                 </a:solidFill>
@@ -9892,7 +9892,7 @@
               <a:t> </a:t>
             </a:r>
             <a:r>
-              <a:rPr lang="en-US" sz="1000" dirty="0">
+              <a:rPr lang="en-US" sz="700" dirty="0">
                 <a:solidFill>
                   <a:srgbClr val="F9FAF4"/>
                 </a:solidFill>
@@ -9902,7 +9902,7 @@
               <a:t>(</a:t>
             </a:r>
             <a:r>
-              <a:rPr lang="en-US" sz="1000" dirty="0">
+              <a:rPr lang="en-US" sz="700" dirty="0">
                 <a:solidFill>
                   <a:srgbClr val="D9E8F7"/>
                 </a:solidFill>
@@ -9912,7 +9912,7 @@
               <a:t>x3 </a:t>
             </a:r>
             <a:r>
-              <a:rPr lang="en-US" sz="1000" dirty="0">
+              <a:rPr lang="en-US" sz="700" dirty="0">
                 <a:solidFill>
                   <a:srgbClr val="E6E6FA"/>
                 </a:solidFill>
@@ -9922,7 +9922,7 @@
               <a:t>-</a:t>
             </a:r>
             <a:r>
-              <a:rPr lang="en-US" sz="1000" dirty="0">
+              <a:rPr lang="en-US" sz="700" dirty="0">
                 <a:solidFill>
                   <a:srgbClr val="D9E8F7"/>
                 </a:solidFill>
@@ -9932,7 +9932,7 @@
               <a:t> x4</a:t>
             </a:r>
             <a:r>
-              <a:rPr lang="en-US" sz="1000" dirty="0">
+              <a:rPr lang="en-US" sz="700" dirty="0">
                 <a:solidFill>
                   <a:srgbClr val="F9FAF4"/>
                 </a:solidFill>
@@ -9942,7 +9942,7 @@
               <a:t>))</a:t>
             </a:r>
             <a:r>
-              <a:rPr lang="en-US" sz="1000" dirty="0">
+              <a:rPr lang="en-US" sz="700" dirty="0">
                 <a:solidFill>
                   <a:srgbClr val="D9E8F7"/>
                 </a:solidFill>
@@ -9952,7 +9952,7 @@
               <a:t> </a:t>
             </a:r>
             <a:r>
-              <a:rPr lang="en-US" sz="1000" dirty="0">
+              <a:rPr lang="en-US" sz="700" dirty="0">
                 <a:solidFill>
                   <a:srgbClr val="E6E6FA"/>
                 </a:solidFill>
@@ -9962,7 +9962,7 @@
               <a:t>/</a:t>
             </a:r>
             <a:r>
-              <a:rPr lang="en-US" sz="1000" dirty="0">
+              <a:rPr lang="en-US" sz="700" dirty="0">
                 <a:solidFill>
                   <a:srgbClr val="D9E8F7"/>
                 </a:solidFill>
@@ -9972,7 +9972,7 @@
               <a:t> denominator</a:t>
             </a:r>
             <a:r>
-              <a:rPr lang="en-US" sz="1000" dirty="0">
+              <a:rPr lang="en-US" sz="700" dirty="0">
                 <a:solidFill>
                   <a:srgbClr val="E6E6FA"/>
                 </a:solidFill>
@@ -9981,7 +9981,7 @@
               </a:rPr>
               <a:t>;</a:t>
             </a:r>
-            <a:endParaRPr lang="en-US" sz="1000" dirty="0">
+            <a:endParaRPr lang="en-US" sz="700" dirty="0">
               <a:solidFill>
                 <a:srgbClr val="AAAAAA"/>
               </a:solidFill>
@@ -9999,7 +9999,7 @@
               </a:spcAft>
             </a:pPr>
             <a:r>
-              <a:rPr lang="en-US" sz="1000" dirty="0">
+              <a:rPr lang="en-US" sz="700" dirty="0">
                 <a:solidFill>
                   <a:srgbClr val="CC6C1D"/>
                 </a:solidFill>
@@ -10009,7 +10009,7 @@
               <a:t>double</a:t>
             </a:r>
             <a:r>
-              <a:rPr lang="en-US" sz="1000" dirty="0">
+              <a:rPr lang="en-US" sz="700" dirty="0">
                 <a:solidFill>
                   <a:srgbClr val="D9E8F7"/>
                 </a:solidFill>
@@ -10019,7 +10019,7 @@
               <a:t> u </a:t>
             </a:r>
             <a:r>
-              <a:rPr lang="en-US" sz="1000" dirty="0">
+              <a:rPr lang="en-US" sz="700" dirty="0">
                 <a:solidFill>
                   <a:srgbClr val="E6E6FA"/>
                 </a:solidFill>
@@ -10029,7 +10029,7 @@
               <a:t>=</a:t>
             </a:r>
             <a:r>
-              <a:rPr lang="en-US" sz="1000" dirty="0">
+              <a:rPr lang="en-US" sz="700" dirty="0">
                 <a:solidFill>
                   <a:srgbClr val="D9E8F7"/>
                 </a:solidFill>
@@ -10039,7 +10039,7 @@
               <a:t> </a:t>
             </a:r>
             <a:r>
-              <a:rPr lang="en-US" sz="1000" dirty="0">
+              <a:rPr lang="en-US" sz="700" dirty="0">
                 <a:solidFill>
                   <a:srgbClr val="E6E6FA"/>
                 </a:solidFill>
@@ -10049,7 +10049,7 @@
               <a:t>-</a:t>
             </a:r>
             <a:r>
-              <a:rPr lang="en-US" sz="1000" dirty="0">
+              <a:rPr lang="en-US" sz="700" dirty="0">
                 <a:solidFill>
                   <a:srgbClr val="F9FAF4"/>
                 </a:solidFill>
@@ -10059,7 +10059,7 @@
               <a:t>((</a:t>
             </a:r>
             <a:r>
-              <a:rPr lang="en-US" sz="1000" dirty="0">
+              <a:rPr lang="en-US" sz="700" dirty="0">
                 <a:solidFill>
                   <a:srgbClr val="D9E8F7"/>
                 </a:solidFill>
@@ -10069,7 +10069,7 @@
               <a:t>x1 </a:t>
             </a:r>
             <a:r>
-              <a:rPr lang="en-US" sz="1000" dirty="0">
+              <a:rPr lang="en-US" sz="700" dirty="0">
                 <a:solidFill>
                   <a:srgbClr val="E6E6FA"/>
                 </a:solidFill>
@@ -10079,7 +10079,7 @@
               <a:t>-</a:t>
             </a:r>
             <a:r>
-              <a:rPr lang="en-US" sz="1000" dirty="0">
+              <a:rPr lang="en-US" sz="700" dirty="0">
                 <a:solidFill>
                   <a:srgbClr val="D9E8F7"/>
                 </a:solidFill>
@@ -10089,7 +10089,7 @@
               <a:t> x2</a:t>
             </a:r>
             <a:r>
-              <a:rPr lang="en-US" sz="1000" dirty="0">
+              <a:rPr lang="en-US" sz="700" dirty="0">
                 <a:solidFill>
                   <a:srgbClr val="F9FAF4"/>
                 </a:solidFill>
@@ -10099,7 +10099,7 @@
               <a:t>)</a:t>
             </a:r>
             <a:r>
-              <a:rPr lang="en-US" sz="1000" dirty="0">
+              <a:rPr lang="en-US" sz="700" dirty="0">
                 <a:solidFill>
                   <a:srgbClr val="D9E8F7"/>
                 </a:solidFill>
@@ -10109,7 +10109,7 @@
               <a:t> </a:t>
             </a:r>
             <a:r>
-              <a:rPr lang="en-US" sz="1000" dirty="0">
+              <a:rPr lang="en-US" sz="700" dirty="0">
                 <a:solidFill>
                   <a:srgbClr val="E6E6FA"/>
                 </a:solidFill>
@@ -10119,7 +10119,7 @@
               <a:t>*</a:t>
             </a:r>
             <a:r>
-              <a:rPr lang="en-US" sz="1000" dirty="0">
+              <a:rPr lang="en-US" sz="700" dirty="0">
                 <a:solidFill>
                   <a:srgbClr val="D9E8F7"/>
                 </a:solidFill>
@@ -10129,7 +10129,7 @@
               <a:t> </a:t>
             </a:r>
             <a:r>
-              <a:rPr lang="en-US" sz="1000" dirty="0">
+              <a:rPr lang="en-US" sz="700" dirty="0">
                 <a:solidFill>
                   <a:srgbClr val="F9FAF4"/>
                 </a:solidFill>
@@ -10139,7 +10139,7 @@
               <a:t>(</a:t>
             </a:r>
             <a:r>
-              <a:rPr lang="en-US" sz="1000" dirty="0">
+              <a:rPr lang="en-US" sz="700" dirty="0">
                 <a:solidFill>
                   <a:srgbClr val="D9E8F7"/>
                 </a:solidFill>
@@ -10149,7 +10149,7 @@
               <a:t>y1 </a:t>
             </a:r>
             <a:r>
-              <a:rPr lang="en-US" sz="1000" dirty="0">
+              <a:rPr lang="en-US" sz="700" dirty="0">
                 <a:solidFill>
                   <a:srgbClr val="E6E6FA"/>
                 </a:solidFill>
@@ -10159,7 +10159,7 @@
               <a:t>-</a:t>
             </a:r>
             <a:r>
-              <a:rPr lang="en-US" sz="1000" dirty="0">
+              <a:rPr lang="en-US" sz="700" dirty="0">
                 <a:solidFill>
                   <a:srgbClr val="D9E8F7"/>
                 </a:solidFill>
@@ -10169,7 +10169,7 @@
               <a:t> y3</a:t>
             </a:r>
             <a:r>
-              <a:rPr lang="en-US" sz="1000" dirty="0">
+              <a:rPr lang="en-US" sz="700" dirty="0">
                 <a:solidFill>
                   <a:srgbClr val="F9FAF4"/>
                 </a:solidFill>
@@ -10179,7 +10179,7 @@
               <a:t>)</a:t>
             </a:r>
             <a:r>
-              <a:rPr lang="en-US" sz="1000" dirty="0">
+              <a:rPr lang="en-US" sz="700" dirty="0">
                 <a:solidFill>
                   <a:srgbClr val="D9E8F7"/>
                 </a:solidFill>
@@ -10189,7 +10189,7 @@
               <a:t> </a:t>
             </a:r>
             <a:r>
-              <a:rPr lang="en-US" sz="1000" dirty="0">
+              <a:rPr lang="en-US" sz="700" dirty="0">
                 <a:solidFill>
                   <a:srgbClr val="E6E6FA"/>
                 </a:solidFill>
@@ -10199,7 +10199,7 @@
               <a:t>-</a:t>
             </a:r>
             <a:r>
-              <a:rPr lang="en-US" sz="1000" dirty="0">
+              <a:rPr lang="en-US" sz="700" dirty="0">
                 <a:solidFill>
                   <a:srgbClr val="D9E8F7"/>
                 </a:solidFill>
@@ -10209,7 +10209,7 @@
               <a:t> </a:t>
             </a:r>
             <a:r>
-              <a:rPr lang="en-US" sz="1000" dirty="0">
+              <a:rPr lang="en-US" sz="700" dirty="0">
                 <a:solidFill>
                   <a:srgbClr val="F9FAF4"/>
                 </a:solidFill>
@@ -10219,7 +10219,7 @@
               <a:t>(</a:t>
             </a:r>
             <a:r>
-              <a:rPr lang="en-US" sz="1000" dirty="0">
+              <a:rPr lang="en-US" sz="700" dirty="0">
                 <a:solidFill>
                   <a:srgbClr val="D9E8F7"/>
                 </a:solidFill>
@@ -10229,7 +10229,7 @@
               <a:t>y1 </a:t>
             </a:r>
             <a:r>
-              <a:rPr lang="en-US" sz="1000" dirty="0">
+              <a:rPr lang="en-US" sz="700" dirty="0">
                 <a:solidFill>
                   <a:srgbClr val="E6E6FA"/>
                 </a:solidFill>
@@ -10239,7 +10239,7 @@
               <a:t>-</a:t>
             </a:r>
             <a:r>
-              <a:rPr lang="en-US" sz="1000" dirty="0">
+              <a:rPr lang="en-US" sz="700" dirty="0">
                 <a:solidFill>
                   <a:srgbClr val="D9E8F7"/>
                 </a:solidFill>
@@ -10249,7 +10249,7 @@
               <a:t> y2</a:t>
             </a:r>
             <a:r>
-              <a:rPr lang="en-US" sz="1000" dirty="0">
+              <a:rPr lang="en-US" sz="700" dirty="0">
                 <a:solidFill>
                   <a:srgbClr val="F9FAF4"/>
                 </a:solidFill>
@@ -10259,7 +10259,7 @@
               <a:t>)</a:t>
             </a:r>
             <a:r>
-              <a:rPr lang="en-US" sz="1000" dirty="0">
+              <a:rPr lang="en-US" sz="700" dirty="0">
                 <a:solidFill>
                   <a:srgbClr val="D9E8F7"/>
                 </a:solidFill>
@@ -10269,7 +10269,7 @@
               <a:t> </a:t>
             </a:r>
             <a:r>
-              <a:rPr lang="en-US" sz="1000" dirty="0">
+              <a:rPr lang="en-US" sz="700" dirty="0">
                 <a:solidFill>
                   <a:srgbClr val="E6E6FA"/>
                 </a:solidFill>
@@ -10279,7 +10279,7 @@
               <a:t>*</a:t>
             </a:r>
             <a:r>
-              <a:rPr lang="en-US" sz="1000" dirty="0">
+              <a:rPr lang="en-US" sz="700" dirty="0">
                 <a:solidFill>
                   <a:srgbClr val="D9E8F7"/>
                 </a:solidFill>
@@ -10289,7 +10289,7 @@
               <a:t> </a:t>
             </a:r>
             <a:r>
-              <a:rPr lang="en-US" sz="1000" dirty="0">
+              <a:rPr lang="en-US" sz="700" dirty="0">
                 <a:solidFill>
                   <a:srgbClr val="F9FAF4"/>
                 </a:solidFill>
@@ -10299,7 +10299,7 @@
               <a:t>(</a:t>
             </a:r>
             <a:r>
-              <a:rPr lang="en-US" sz="1000" dirty="0">
+              <a:rPr lang="en-US" sz="700" dirty="0">
                 <a:solidFill>
                   <a:srgbClr val="D9E8F7"/>
                 </a:solidFill>
@@ -10309,7 +10309,7 @@
               <a:t>x1 </a:t>
             </a:r>
             <a:r>
-              <a:rPr lang="en-US" sz="1000" dirty="0">
+              <a:rPr lang="en-US" sz="700" dirty="0">
                 <a:solidFill>
                   <a:srgbClr val="E6E6FA"/>
                 </a:solidFill>
@@ -10319,7 +10319,7 @@
               <a:t>-</a:t>
             </a:r>
             <a:r>
-              <a:rPr lang="en-US" sz="1000" dirty="0">
+              <a:rPr lang="en-US" sz="700" dirty="0">
                 <a:solidFill>
                   <a:srgbClr val="D9E8F7"/>
                 </a:solidFill>
@@ -10329,7 +10329,7 @@
               <a:t> x3</a:t>
             </a:r>
             <a:r>
-              <a:rPr lang="en-US" sz="1000" dirty="0">
+              <a:rPr lang="en-US" sz="700" dirty="0">
                 <a:solidFill>
                   <a:srgbClr val="F9FAF4"/>
                 </a:solidFill>
@@ -10339,7 +10339,7 @@
               <a:t>))</a:t>
             </a:r>
             <a:r>
-              <a:rPr lang="en-US" sz="1000" dirty="0">
+              <a:rPr lang="en-US" sz="700" dirty="0">
                 <a:solidFill>
                   <a:srgbClr val="D9E8F7"/>
                 </a:solidFill>
@@ -10349,7 +10349,7 @@
               <a:t> </a:t>
             </a:r>
             <a:r>
-              <a:rPr lang="en-US" sz="1000" dirty="0">
+              <a:rPr lang="en-US" sz="700" dirty="0">
                 <a:solidFill>
                   <a:srgbClr val="E6E6FA"/>
                 </a:solidFill>
@@ -10359,7 +10359,7 @@
               <a:t>/</a:t>
             </a:r>
             <a:r>
-              <a:rPr lang="en-US" sz="1000" dirty="0">
+              <a:rPr lang="en-US" sz="700" dirty="0">
                 <a:solidFill>
                   <a:srgbClr val="D9E8F7"/>
                 </a:solidFill>
@@ -10369,7 +10369,7 @@
               <a:t> denominator</a:t>
             </a:r>
             <a:r>
-              <a:rPr lang="en-US" sz="1000" dirty="0">
+              <a:rPr lang="en-US" sz="700" dirty="0">
                 <a:solidFill>
                   <a:srgbClr val="E6E6FA"/>
                 </a:solidFill>
@@ -10378,7 +10378,7 @@
               </a:rPr>
               <a:t>;</a:t>
             </a:r>
-            <a:endParaRPr lang="en-US" sz="1000" dirty="0">
+            <a:endParaRPr lang="en-US" sz="700" dirty="0">
               <a:solidFill>
                 <a:srgbClr val="AAAAAA"/>
               </a:solidFill>
@@ -10396,7 +10396,7 @@
               </a:spcAft>
             </a:pPr>
             <a:br>
-              <a:rPr lang="en-US" sz="1000" dirty="0">
+              <a:rPr lang="en-US" sz="700" dirty="0">
                 <a:solidFill>
                   <a:srgbClr val="AAAAAA"/>
                 </a:solidFill>
@@ -10404,7 +10404,7 @@
                 <a:latin typeface="Consolas" panose="020B0609020204030204" pitchFamily="49" charset="0"/>
               </a:rPr>
             </a:br>
-            <a:endParaRPr lang="en-US" sz="1000" dirty="0">
+            <a:endParaRPr lang="en-US" sz="700" dirty="0">
               <a:solidFill>
                 <a:srgbClr val="AAAAAA"/>
               </a:solidFill>
@@ -10422,7 +10422,7 @@
               </a:spcAft>
             </a:pPr>
             <a:r>
-              <a:rPr lang="en-US" sz="1000" dirty="0">
+              <a:rPr lang="en-US" sz="700" dirty="0">
                 <a:solidFill>
                   <a:srgbClr val="808080"/>
                 </a:solidFill>
@@ -10431,7 +10431,7 @@
               </a:rPr>
               <a:t>// Check if the intersection point is within the line segments</a:t>
             </a:r>
-            <a:endParaRPr lang="en-US" sz="1000" dirty="0">
+            <a:endParaRPr lang="en-US" sz="700" dirty="0">
               <a:solidFill>
                 <a:srgbClr val="AAAAAA"/>
               </a:solidFill>
@@ -10449,7 +10449,7 @@
               </a:spcAft>
             </a:pPr>
             <a:r>
-              <a:rPr lang="en-US" sz="1000" dirty="0">
+              <a:rPr lang="en-US" sz="700" dirty="0">
                 <a:solidFill>
                   <a:srgbClr val="CC6C1D"/>
                 </a:solidFill>
@@ -10459,7 +10459,7 @@
               <a:t>if</a:t>
             </a:r>
             <a:r>
-              <a:rPr lang="en-US" sz="1000" dirty="0">
+              <a:rPr lang="en-US" sz="700" dirty="0">
                 <a:solidFill>
                   <a:srgbClr val="D9E8F7"/>
                 </a:solidFill>
@@ -10469,7 +10469,7 @@
               <a:t> </a:t>
             </a:r>
             <a:r>
-              <a:rPr lang="en-US" sz="1000" dirty="0">
+              <a:rPr lang="en-US" sz="700" dirty="0">
                 <a:solidFill>
                   <a:srgbClr val="F9FAF4"/>
                 </a:solidFill>
@@ -10479,7 +10479,7 @@
               <a:t>(</a:t>
             </a:r>
             <a:r>
-              <a:rPr lang="en-US" sz="1000" dirty="0">
+              <a:rPr lang="en-US" sz="700" dirty="0">
                 <a:solidFill>
                   <a:srgbClr val="D9E8F7"/>
                 </a:solidFill>
@@ -10489,7 +10489,7 @@
               <a:t>t </a:t>
             </a:r>
             <a:r>
-              <a:rPr lang="en-US" sz="1000" dirty="0">
+              <a:rPr lang="en-US" sz="700" dirty="0">
                 <a:solidFill>
                   <a:srgbClr val="E6E6FA"/>
                 </a:solidFill>
@@ -10499,7 +10499,7 @@
               <a:t>&gt;=</a:t>
             </a:r>
             <a:r>
-              <a:rPr lang="en-US" sz="1000" dirty="0">
+              <a:rPr lang="en-US" sz="700" dirty="0">
                 <a:solidFill>
                   <a:srgbClr val="D9E8F7"/>
                 </a:solidFill>
@@ -10509,7 +10509,7 @@
               <a:t> 0 </a:t>
             </a:r>
             <a:r>
-              <a:rPr lang="en-US" sz="1000" dirty="0">
+              <a:rPr lang="en-US" sz="700" dirty="0">
                 <a:solidFill>
                   <a:srgbClr val="E6E6FA"/>
                 </a:solidFill>
@@ -10519,7 +10519,7 @@
               <a:t>&amp;&amp;</a:t>
             </a:r>
             <a:r>
-              <a:rPr lang="en-US" sz="1000" dirty="0">
+              <a:rPr lang="en-US" sz="700" dirty="0">
                 <a:solidFill>
                   <a:srgbClr val="D9E8F7"/>
                 </a:solidFill>
@@ -10529,7 +10529,7 @@
               <a:t> t </a:t>
             </a:r>
             <a:r>
-              <a:rPr lang="en-US" sz="1000" dirty="0">
+              <a:rPr lang="en-US" sz="700" dirty="0">
                 <a:solidFill>
                   <a:srgbClr val="E6E6FA"/>
                 </a:solidFill>
@@ -10539,7 +10539,7 @@
               <a:t>&lt;=</a:t>
             </a:r>
             <a:r>
-              <a:rPr lang="en-US" sz="1000" dirty="0">
+              <a:rPr lang="en-US" sz="700" dirty="0">
                 <a:solidFill>
                   <a:srgbClr val="D9E8F7"/>
                 </a:solidFill>
@@ -10549,7 +10549,7 @@
               <a:t> 1 </a:t>
             </a:r>
             <a:r>
-              <a:rPr lang="en-US" sz="1000" dirty="0">
+              <a:rPr lang="en-US" sz="700" dirty="0">
                 <a:solidFill>
                   <a:srgbClr val="E6E6FA"/>
                 </a:solidFill>
@@ -10559,7 +10559,7 @@
               <a:t>&amp;&amp;</a:t>
             </a:r>
             <a:r>
-              <a:rPr lang="en-US" sz="1000" dirty="0">
+              <a:rPr lang="en-US" sz="700" dirty="0">
                 <a:solidFill>
                   <a:srgbClr val="D9E8F7"/>
                 </a:solidFill>
@@ -10569,7 +10569,7 @@
               <a:t> u </a:t>
             </a:r>
             <a:r>
-              <a:rPr lang="en-US" sz="1000" dirty="0">
+              <a:rPr lang="en-US" sz="700" dirty="0">
                 <a:solidFill>
                   <a:srgbClr val="E6E6FA"/>
                 </a:solidFill>
@@ -10579,7 +10579,7 @@
               <a:t>&gt;=</a:t>
             </a:r>
             <a:r>
-              <a:rPr lang="en-US" sz="1000" dirty="0">
+              <a:rPr lang="en-US" sz="700" dirty="0">
                 <a:solidFill>
                   <a:srgbClr val="D9E8F7"/>
                 </a:solidFill>
@@ -10589,7 +10589,7 @@
               <a:t> 0 </a:t>
             </a:r>
             <a:r>
-              <a:rPr lang="en-US" sz="1000" dirty="0">
+              <a:rPr lang="en-US" sz="700" dirty="0">
                 <a:solidFill>
                   <a:srgbClr val="E6E6FA"/>
                 </a:solidFill>
@@ -10599,7 +10599,7 @@
               <a:t>&amp;&amp;</a:t>
             </a:r>
             <a:r>
-              <a:rPr lang="en-US" sz="1000" dirty="0">
+              <a:rPr lang="en-US" sz="700" dirty="0">
                 <a:solidFill>
                   <a:srgbClr val="D9E8F7"/>
                 </a:solidFill>
@@ -10609,7 +10609,7 @@
               <a:t> u </a:t>
             </a:r>
             <a:r>
-              <a:rPr lang="en-US" sz="1000" dirty="0">
+              <a:rPr lang="en-US" sz="700" dirty="0">
                 <a:solidFill>
                   <a:srgbClr val="E6E6FA"/>
                 </a:solidFill>
@@ -10619,7 +10619,7 @@
               <a:t>&lt;=</a:t>
             </a:r>
             <a:r>
-              <a:rPr lang="en-US" sz="1000" dirty="0">
+              <a:rPr lang="en-US" sz="700" dirty="0">
                 <a:solidFill>
                   <a:srgbClr val="D9E8F7"/>
                 </a:solidFill>
@@ -10629,7 +10629,7 @@
               <a:t> 1</a:t>
             </a:r>
             <a:r>
-              <a:rPr lang="en-US" sz="1000" dirty="0">
+              <a:rPr lang="en-US" sz="700" dirty="0">
                 <a:solidFill>
                   <a:srgbClr val="F9FAF4"/>
                 </a:solidFill>
@@ -10639,7 +10639,7 @@
               <a:t>)</a:t>
             </a:r>
             <a:r>
-              <a:rPr lang="en-US" sz="1000" dirty="0">
+              <a:rPr lang="en-US" sz="700" dirty="0">
                 <a:solidFill>
                   <a:srgbClr val="D9E8F7"/>
                 </a:solidFill>
@@ -10649,7 +10649,7 @@
               <a:t> </a:t>
             </a:r>
             <a:r>
-              <a:rPr lang="en-US" sz="1000" dirty="0">
+              <a:rPr lang="en-US" sz="700" dirty="0">
                 <a:solidFill>
                   <a:srgbClr val="F9FAF4"/>
                 </a:solidFill>
@@ -10658,7 +10658,7 @@
               </a:rPr>
               <a:t>{</a:t>
             </a:r>
-            <a:endParaRPr lang="en-US" sz="1000" dirty="0">
+            <a:endParaRPr lang="en-US" sz="700" dirty="0">
               <a:solidFill>
                 <a:srgbClr val="AAAAAA"/>
               </a:solidFill>
@@ -10676,7 +10676,7 @@
               </a:spcAft>
             </a:pPr>
             <a:r>
-              <a:rPr lang="en-US" sz="1000" dirty="0">
+              <a:rPr lang="en-US" sz="700" dirty="0">
                 <a:solidFill>
                   <a:srgbClr val="D9E8F7"/>
                 </a:solidFill>
@@ -10686,7 +10686,7 @@
               <a:t>intersection</a:t>
             </a:r>
             <a:r>
-              <a:rPr lang="en-US" sz="1000" dirty="0">
+              <a:rPr lang="en-US" sz="700" dirty="0">
                 <a:solidFill>
                   <a:srgbClr val="F9FAF4"/>
                 </a:solidFill>
@@ -10696,7 +10696,7 @@
               <a:t>[</a:t>
             </a:r>
             <a:r>
-              <a:rPr lang="en-US" sz="1000" dirty="0">
+              <a:rPr lang="en-US" sz="700" dirty="0">
                 <a:solidFill>
                   <a:srgbClr val="D9E8F7"/>
                 </a:solidFill>
@@ -10706,7 +10706,7 @@
               <a:t>0</a:t>
             </a:r>
             <a:r>
-              <a:rPr lang="en-US" sz="1000" dirty="0">
+              <a:rPr lang="en-US" sz="700" dirty="0">
                 <a:solidFill>
                   <a:srgbClr val="F9FAF4"/>
                 </a:solidFill>
@@ -10716,7 +10716,7 @@
               <a:t>]</a:t>
             </a:r>
             <a:r>
-              <a:rPr lang="en-US" sz="1000" dirty="0">
+              <a:rPr lang="en-US" sz="700" dirty="0">
                 <a:solidFill>
                   <a:srgbClr val="D9E8F7"/>
                 </a:solidFill>
@@ -10726,7 +10726,7 @@
               <a:t> </a:t>
             </a:r>
             <a:r>
-              <a:rPr lang="en-US" sz="1000" dirty="0">
+              <a:rPr lang="en-US" sz="700" dirty="0">
                 <a:solidFill>
                   <a:srgbClr val="E6E6FA"/>
                 </a:solidFill>
@@ -10736,7 +10736,7 @@
               <a:t>=</a:t>
             </a:r>
             <a:r>
-              <a:rPr lang="en-US" sz="1000" dirty="0">
+              <a:rPr lang="en-US" sz="700" dirty="0">
                 <a:solidFill>
                   <a:srgbClr val="D9E8F7"/>
                 </a:solidFill>
@@ -10746,7 +10746,7 @@
               <a:t> x1 </a:t>
             </a:r>
             <a:r>
-              <a:rPr lang="en-US" sz="1000" dirty="0">
+              <a:rPr lang="en-US" sz="700" dirty="0">
                 <a:solidFill>
                   <a:srgbClr val="E6E6FA"/>
                 </a:solidFill>
@@ -10756,7 +10756,7 @@
               <a:t>+</a:t>
             </a:r>
             <a:r>
-              <a:rPr lang="en-US" sz="1000" dirty="0">
+              <a:rPr lang="en-US" sz="700" dirty="0">
                 <a:solidFill>
                   <a:srgbClr val="D9E8F7"/>
                 </a:solidFill>
@@ -10766,7 +10766,7 @@
               <a:t> t </a:t>
             </a:r>
             <a:r>
-              <a:rPr lang="en-US" sz="1000" dirty="0">
+              <a:rPr lang="en-US" sz="700" dirty="0">
                 <a:solidFill>
                   <a:srgbClr val="E6E6FA"/>
                 </a:solidFill>
@@ -10776,7 +10776,7 @@
               <a:t>*</a:t>
             </a:r>
             <a:r>
-              <a:rPr lang="en-US" sz="1000" dirty="0">
+              <a:rPr lang="en-US" sz="700" dirty="0">
                 <a:solidFill>
                   <a:srgbClr val="D9E8F7"/>
                 </a:solidFill>
@@ -10786,7 +10786,7 @@
               <a:t> </a:t>
             </a:r>
             <a:r>
-              <a:rPr lang="en-US" sz="1000" dirty="0">
+              <a:rPr lang="en-US" sz="700" dirty="0">
                 <a:solidFill>
                   <a:srgbClr val="F9FAF4"/>
                 </a:solidFill>
@@ -10796,7 +10796,7 @@
               <a:t>(</a:t>
             </a:r>
             <a:r>
-              <a:rPr lang="en-US" sz="1000" dirty="0">
+              <a:rPr lang="en-US" sz="700" dirty="0">
                 <a:solidFill>
                   <a:srgbClr val="D9E8F7"/>
                 </a:solidFill>
@@ -10806,7 +10806,7 @@
               <a:t>x2 </a:t>
             </a:r>
             <a:r>
-              <a:rPr lang="en-US" sz="1000" dirty="0">
+              <a:rPr lang="en-US" sz="700" dirty="0">
                 <a:solidFill>
                   <a:srgbClr val="E6E6FA"/>
                 </a:solidFill>
@@ -10816,7 +10816,7 @@
               <a:t>-</a:t>
             </a:r>
             <a:r>
-              <a:rPr lang="en-US" sz="1000" dirty="0">
+              <a:rPr lang="en-US" sz="700" dirty="0">
                 <a:solidFill>
                   <a:srgbClr val="D9E8F7"/>
                 </a:solidFill>
@@ -10826,7 +10826,7 @@
               <a:t> x1</a:t>
             </a:r>
             <a:r>
-              <a:rPr lang="en-US" sz="1000" dirty="0">
+              <a:rPr lang="en-US" sz="700" dirty="0">
                 <a:solidFill>
                   <a:srgbClr val="F9FAF4"/>
                 </a:solidFill>
@@ -10836,7 +10836,7 @@
               <a:t>)</a:t>
             </a:r>
             <a:r>
-              <a:rPr lang="en-US" sz="1000" dirty="0">
+              <a:rPr lang="en-US" sz="700" dirty="0">
                 <a:solidFill>
                   <a:srgbClr val="E6E6FA"/>
                 </a:solidFill>
@@ -10845,7 +10845,7 @@
               </a:rPr>
               <a:t>;</a:t>
             </a:r>
-            <a:endParaRPr lang="en-US" sz="1000" dirty="0">
+            <a:endParaRPr lang="en-US" sz="700" dirty="0">
               <a:solidFill>
                 <a:srgbClr val="AAAAAA"/>
               </a:solidFill>
@@ -10863,7 +10863,7 @@
               </a:spcAft>
             </a:pPr>
             <a:r>
-              <a:rPr lang="en-US" sz="1000" dirty="0">
+              <a:rPr lang="en-US" sz="700" dirty="0">
                 <a:solidFill>
                   <a:srgbClr val="D9E8F7"/>
                 </a:solidFill>
@@ -10873,7 +10873,7 @@
               <a:t>intersection</a:t>
             </a:r>
             <a:r>
-              <a:rPr lang="en-US" sz="1000" dirty="0">
+              <a:rPr lang="en-US" sz="700" dirty="0">
                 <a:solidFill>
                   <a:srgbClr val="F9FAF4"/>
                 </a:solidFill>
@@ -10883,7 +10883,7 @@
               <a:t>[</a:t>
             </a:r>
             <a:r>
-              <a:rPr lang="en-US" sz="1000" dirty="0">
+              <a:rPr lang="en-US" sz="700" dirty="0">
                 <a:solidFill>
                   <a:srgbClr val="D9E8F7"/>
                 </a:solidFill>
@@ -10893,7 +10893,7 @@
               <a:t>1</a:t>
             </a:r>
             <a:r>
-              <a:rPr lang="en-US" sz="1000" dirty="0">
+              <a:rPr lang="en-US" sz="700" dirty="0">
                 <a:solidFill>
                   <a:srgbClr val="F9FAF4"/>
                 </a:solidFill>
@@ -10903,7 +10903,7 @@
               <a:t>]</a:t>
             </a:r>
             <a:r>
-              <a:rPr lang="en-US" sz="1000" dirty="0">
+              <a:rPr lang="en-US" sz="700" dirty="0">
                 <a:solidFill>
                   <a:srgbClr val="D9E8F7"/>
                 </a:solidFill>
@@ -10913,7 +10913,7 @@
               <a:t> </a:t>
             </a:r>
             <a:r>
-              <a:rPr lang="en-US" sz="1000" dirty="0">
+              <a:rPr lang="en-US" sz="700" dirty="0">
                 <a:solidFill>
                   <a:srgbClr val="E6E6FA"/>
                 </a:solidFill>
@@ -10923,7 +10923,7 @@
               <a:t>=</a:t>
             </a:r>
             <a:r>
-              <a:rPr lang="en-US" sz="1000" dirty="0">
+              <a:rPr lang="en-US" sz="700" dirty="0">
                 <a:solidFill>
                   <a:srgbClr val="D9E8F7"/>
                 </a:solidFill>
@@ -10933,7 +10933,7 @@
               <a:t> y1 </a:t>
             </a:r>
             <a:r>
-              <a:rPr lang="en-US" sz="1000" dirty="0">
+              <a:rPr lang="en-US" sz="700" dirty="0">
                 <a:solidFill>
                   <a:srgbClr val="E6E6FA"/>
                 </a:solidFill>
@@ -10943,7 +10943,7 @@
               <a:t>+</a:t>
             </a:r>
             <a:r>
-              <a:rPr lang="en-US" sz="1000" dirty="0">
+              <a:rPr lang="en-US" sz="700" dirty="0">
                 <a:solidFill>
                   <a:srgbClr val="D9E8F7"/>
                 </a:solidFill>
@@ -10953,7 +10953,7 @@
               <a:t> t </a:t>
             </a:r>
             <a:r>
-              <a:rPr lang="en-US" sz="1000" dirty="0">
+              <a:rPr lang="en-US" sz="700" dirty="0">
                 <a:solidFill>
                   <a:srgbClr val="E6E6FA"/>
                 </a:solidFill>
@@ -10963,7 +10963,7 @@
               <a:t>*</a:t>
             </a:r>
             <a:r>
-              <a:rPr lang="en-US" sz="1000" dirty="0">
+              <a:rPr lang="en-US" sz="700" dirty="0">
                 <a:solidFill>
                   <a:srgbClr val="D9E8F7"/>
                 </a:solidFill>
@@ -10973,7 +10973,7 @@
               <a:t> </a:t>
             </a:r>
             <a:r>
-              <a:rPr lang="en-US" sz="1000" dirty="0">
+              <a:rPr lang="en-US" sz="700" dirty="0">
                 <a:solidFill>
                   <a:srgbClr val="F9FAF4"/>
                 </a:solidFill>
@@ -10983,7 +10983,7 @@
               <a:t>(</a:t>
             </a:r>
             <a:r>
-              <a:rPr lang="en-US" sz="1000" dirty="0">
+              <a:rPr lang="en-US" sz="700" dirty="0">
                 <a:solidFill>
                   <a:srgbClr val="D9E8F7"/>
                 </a:solidFill>
@@ -10993,7 +10993,7 @@
               <a:t>y2 </a:t>
             </a:r>
             <a:r>
-              <a:rPr lang="en-US" sz="1000" dirty="0">
+              <a:rPr lang="en-US" sz="700" dirty="0">
                 <a:solidFill>
                   <a:srgbClr val="E6E6FA"/>
                 </a:solidFill>
@@ -11003,7 +11003,7 @@
               <a:t>-</a:t>
             </a:r>
             <a:r>
-              <a:rPr lang="en-US" sz="1000" dirty="0">
+              <a:rPr lang="en-US" sz="700" dirty="0">
                 <a:solidFill>
                   <a:srgbClr val="D9E8F7"/>
                 </a:solidFill>
@@ -11013,7 +11013,7 @@
               <a:t> y1</a:t>
             </a:r>
             <a:r>
-              <a:rPr lang="en-US" sz="1000" dirty="0">
+              <a:rPr lang="en-US" sz="700" dirty="0">
                 <a:solidFill>
                   <a:srgbClr val="F9FAF4"/>
                 </a:solidFill>
@@ -11023,7 +11023,7 @@
               <a:t>)</a:t>
             </a:r>
             <a:r>
-              <a:rPr lang="en-US" sz="1000" dirty="0">
+              <a:rPr lang="en-US" sz="700" dirty="0">
                 <a:solidFill>
                   <a:srgbClr val="E6E6FA"/>
                 </a:solidFill>
@@ -11032,7 +11032,7 @@
               </a:rPr>
               <a:t>;</a:t>
             </a:r>
-            <a:endParaRPr lang="en-US" sz="1000" dirty="0">
+            <a:endParaRPr lang="en-US" sz="700" dirty="0">
               <a:solidFill>
                 <a:srgbClr val="AAAAAA"/>
               </a:solidFill>
@@ -11050,7 +11050,7 @@
               </a:spcAft>
             </a:pPr>
             <a:r>
-              <a:rPr lang="en-US" sz="1000" dirty="0">
+              <a:rPr lang="en-US" sz="700" dirty="0">
                 <a:solidFill>
                   <a:srgbClr val="CC6C1D"/>
                 </a:solidFill>
@@ -11060,7 +11060,7 @@
               <a:t>return</a:t>
             </a:r>
             <a:r>
-              <a:rPr lang="en-US" sz="1000" dirty="0">
+              <a:rPr lang="en-US" sz="700" dirty="0">
                 <a:solidFill>
                   <a:srgbClr val="D9E8F7"/>
                 </a:solidFill>
@@ -11070,7 +11070,7 @@
               <a:t> intersection</a:t>
             </a:r>
             <a:r>
-              <a:rPr lang="en-US" sz="1000" dirty="0">
+              <a:rPr lang="en-US" sz="700" dirty="0">
                 <a:solidFill>
                   <a:srgbClr val="E6E6FA"/>
                 </a:solidFill>
@@ -11079,7 +11079,7 @@
               </a:rPr>
               <a:t>;</a:t>
             </a:r>
-            <a:endParaRPr lang="en-US" sz="1000" dirty="0">
+            <a:endParaRPr lang="en-US" sz="700" dirty="0">
               <a:solidFill>
                 <a:srgbClr val="AAAAAA"/>
               </a:solidFill>
@@ -11097,7 +11097,7 @@
               </a:spcAft>
             </a:pPr>
             <a:r>
-              <a:rPr lang="en-US" sz="1000" dirty="0">
+              <a:rPr lang="en-US" sz="700" dirty="0">
                 <a:solidFill>
                   <a:srgbClr val="F9FAF4"/>
                 </a:solidFill>
@@ -11107,7 +11107,7 @@
               <a:t>}</a:t>
             </a:r>
             <a:r>
-              <a:rPr lang="en-US" sz="1000" dirty="0">
+              <a:rPr lang="en-US" sz="700" dirty="0">
                 <a:solidFill>
                   <a:srgbClr val="D9E8F7"/>
                 </a:solidFill>
@@ -11117,7 +11117,7 @@
               <a:t> </a:t>
             </a:r>
             <a:r>
-              <a:rPr lang="en-US" sz="1000" dirty="0">
+              <a:rPr lang="en-US" sz="700" dirty="0">
                 <a:solidFill>
                   <a:srgbClr val="CC6C1D"/>
                 </a:solidFill>
@@ -11127,7 +11127,7 @@
               <a:t>else</a:t>
             </a:r>
             <a:r>
-              <a:rPr lang="en-US" sz="1000" dirty="0">
+              <a:rPr lang="en-US" sz="700" dirty="0">
                 <a:solidFill>
                   <a:srgbClr val="D9E8F7"/>
                 </a:solidFill>
@@ -11137,7 +11137,7 @@
               <a:t> </a:t>
             </a:r>
             <a:r>
-              <a:rPr lang="en-US" sz="1000" dirty="0">
+              <a:rPr lang="en-US" sz="700" dirty="0">
                 <a:solidFill>
                   <a:srgbClr val="F9FAF4"/>
                 </a:solidFill>
@@ -11146,7 +11146,7 @@
               </a:rPr>
               <a:t>{</a:t>
             </a:r>
-            <a:endParaRPr lang="en-US" sz="1000" dirty="0">
+            <a:endParaRPr lang="en-US" sz="700" dirty="0">
               <a:solidFill>
                 <a:srgbClr val="AAAAAA"/>
               </a:solidFill>
@@ -11164,7 +11164,7 @@
               </a:spcAft>
             </a:pPr>
             <a:r>
-              <a:rPr lang="en-US" sz="1000" dirty="0">
+              <a:rPr lang="en-US" sz="700" dirty="0">
                 <a:solidFill>
                   <a:srgbClr val="CC6C1D"/>
                 </a:solidFill>
@@ -11174,7 +11174,7 @@
               <a:t>return</a:t>
             </a:r>
             <a:r>
-              <a:rPr lang="en-US" sz="1000" dirty="0">
+              <a:rPr lang="en-US" sz="700" dirty="0">
                 <a:solidFill>
                   <a:srgbClr val="D9E8F7"/>
                 </a:solidFill>
@@ -11184,7 +11184,7 @@
               <a:t> </a:t>
             </a:r>
             <a:r>
-              <a:rPr lang="en-US" sz="1000" dirty="0">
+              <a:rPr lang="en-US" sz="700" dirty="0">
                 <a:solidFill>
                   <a:srgbClr val="CC6C1D"/>
                 </a:solidFill>
@@ -11194,7 +11194,7 @@
               <a:t>null</a:t>
             </a:r>
             <a:r>
-              <a:rPr lang="en-US" sz="1000" dirty="0">
+              <a:rPr lang="en-US" sz="700" dirty="0">
                 <a:solidFill>
                   <a:srgbClr val="E6E6FA"/>
                 </a:solidFill>
@@ -11204,7 +11204,7 @@
               <a:t>;</a:t>
             </a:r>
             <a:r>
-              <a:rPr lang="en-US" sz="1000" dirty="0">
+              <a:rPr lang="en-US" sz="700" dirty="0">
                 <a:solidFill>
                   <a:srgbClr val="D9E8F7"/>
                 </a:solidFill>
@@ -11214,7 +11214,7 @@
               <a:t> </a:t>
             </a:r>
             <a:r>
-              <a:rPr lang="en-US" sz="1000" dirty="0">
+              <a:rPr lang="en-US" sz="700" dirty="0">
                 <a:solidFill>
                   <a:srgbClr val="808080"/>
                 </a:solidFill>
@@ -11223,7 +11223,7 @@
               </a:rPr>
               <a:t>// Intersection is outside the line segments</a:t>
             </a:r>
-            <a:endParaRPr lang="en-US" sz="1000" dirty="0">
+            <a:endParaRPr lang="en-US" sz="700" dirty="0">
               <a:solidFill>
                 <a:srgbClr val="AAAAAA"/>
               </a:solidFill>
@@ -11241,7 +11241,7 @@
               </a:spcAft>
             </a:pPr>
             <a:r>
-              <a:rPr lang="en-US" sz="1000" dirty="0">
+              <a:rPr lang="en-US" sz="700" dirty="0">
                 <a:solidFill>
                   <a:srgbClr val="F9FAF4"/>
                 </a:solidFill>
@@ -11250,7 +11250,7 @@
               </a:rPr>
               <a:t>}</a:t>
             </a:r>
-            <a:endParaRPr lang="en-US" sz="1000" dirty="0">
+            <a:endParaRPr lang="en-US" sz="700" dirty="0">
               <a:solidFill>
                 <a:srgbClr val="AAAAAA"/>
               </a:solidFill>
@@ -11268,7 +11268,7 @@
               </a:spcAft>
             </a:pPr>
             <a:r>
-              <a:rPr lang="en-US" sz="1000" dirty="0">
+              <a:rPr lang="en-US" sz="700" dirty="0">
                 <a:solidFill>
                   <a:srgbClr val="F9FAF4"/>
                 </a:solidFill>
@@ -11277,7 +11277,7 @@
               </a:rPr>
               <a:t>}</a:t>
             </a:r>
-            <a:endParaRPr lang="en-US" sz="1000" dirty="0">
+            <a:endParaRPr lang="en-US" sz="700" dirty="0">
               <a:solidFill>
                 <a:srgbClr val="AAAAAA"/>
               </a:solidFill>
@@ -11286,7 +11286,7 @@
             </a:endParaRPr>
           </a:p>
           <a:p>
-            <a:endParaRPr lang="en-GB" sz="200" dirty="0"/>
+            <a:endParaRPr lang="en-GB" sz="100" dirty="0"/>
           </a:p>
         </p:txBody>
       </p:sp>
@@ -11319,29 +11319,505 @@
           </a:p>
         </p:txBody>
       </p:sp>
+      <p:grpSp>
+        <p:nvGrpSpPr>
+          <p:cNvPr id="16" name="Groupe 15">
+            <a:extLst>
+              <a:ext uri="{FF2B5EF4-FFF2-40B4-BE49-F238E27FC236}">
+                <a16:creationId xmlns:a16="http://schemas.microsoft.com/office/drawing/2014/main" id="{134D9619-FBBD-1F03-A187-7F6A9805AC01}"/>
+              </a:ext>
+            </a:extLst>
+          </p:cNvPr>
+          <p:cNvGrpSpPr/>
+          <p:nvPr/>
+        </p:nvGrpSpPr>
+        <p:grpSpPr>
+          <a:xfrm>
+            <a:off x="7608815" y="398477"/>
+            <a:ext cx="3550323" cy="2389680"/>
+            <a:chOff x="8498047" y="650147"/>
+            <a:chExt cx="3550323" cy="2389680"/>
+          </a:xfrm>
+        </p:grpSpPr>
+        <p:cxnSp>
+          <p:nvCxnSpPr>
+            <p:cNvPr id="7" name="Connecteur droit 6">
+              <a:extLst>
+                <a:ext uri="{FF2B5EF4-FFF2-40B4-BE49-F238E27FC236}">
+                  <a16:creationId xmlns:a16="http://schemas.microsoft.com/office/drawing/2014/main" id="{5C8F2D37-33B0-B9D2-9C5A-7CF050FC4F7B}"/>
+                </a:ext>
+              </a:extLst>
+            </p:cNvPr>
+            <p:cNvCxnSpPr/>
+            <p:nvPr/>
+          </p:nvCxnSpPr>
+          <p:spPr>
+            <a:xfrm>
+              <a:off x="8877300" y="2019300"/>
+              <a:ext cx="2447925" cy="0"/>
+            </a:xfrm>
+            <a:prstGeom prst="line">
+              <a:avLst/>
+            </a:prstGeom>
+            <a:ln>
+              <a:headEnd type="none"/>
+              <a:tailEnd type="arrow"/>
+            </a:ln>
+          </p:spPr>
+          <p:style>
+            <a:lnRef idx="1">
+              <a:schemeClr val="accent1"/>
+            </a:lnRef>
+            <a:fillRef idx="0">
+              <a:schemeClr val="accent1"/>
+            </a:fillRef>
+            <a:effectRef idx="0">
+              <a:schemeClr val="accent1"/>
+            </a:effectRef>
+            <a:fontRef idx="minor">
+              <a:schemeClr val="tx1"/>
+            </a:fontRef>
+          </p:style>
+        </p:cxnSp>
+        <p:cxnSp>
+          <p:nvCxnSpPr>
+            <p:cNvPr id="8" name="Connecteur droit 7">
+              <a:extLst>
+                <a:ext uri="{FF2B5EF4-FFF2-40B4-BE49-F238E27FC236}">
+                  <a16:creationId xmlns:a16="http://schemas.microsoft.com/office/drawing/2014/main" id="{618C82EF-D61E-8330-9371-27206D39E9AD}"/>
+                </a:ext>
+              </a:extLst>
+            </p:cNvPr>
+            <p:cNvCxnSpPr>
+              <a:cxnSpLocks/>
+            </p:cNvCxnSpPr>
+            <p:nvPr/>
+          </p:nvCxnSpPr>
+          <p:spPr>
+            <a:xfrm flipV="1">
+              <a:off x="9582150" y="1066800"/>
+              <a:ext cx="904875" cy="1657350"/>
+            </a:xfrm>
+            <a:prstGeom prst="line">
+              <a:avLst/>
+            </a:prstGeom>
+            <a:ln>
+              <a:tailEnd type="arrow"/>
+            </a:ln>
+          </p:spPr>
+          <p:style>
+            <a:lnRef idx="1">
+              <a:schemeClr val="accent1"/>
+            </a:lnRef>
+            <a:fillRef idx="0">
+              <a:schemeClr val="accent1"/>
+            </a:fillRef>
+            <a:effectRef idx="0">
+              <a:schemeClr val="accent1"/>
+            </a:effectRef>
+            <a:fontRef idx="minor">
+              <a:schemeClr val="tx1"/>
+            </a:fontRef>
+          </p:style>
+        </p:cxnSp>
+        <p:sp>
+          <p:nvSpPr>
+            <p:cNvPr id="13" name="Ellipse 12">
+              <a:extLst>
+                <a:ext uri="{FF2B5EF4-FFF2-40B4-BE49-F238E27FC236}">
+                  <a16:creationId xmlns:a16="http://schemas.microsoft.com/office/drawing/2014/main" id="{F8AD9E40-E166-F738-CA25-4DC68FEEB88F}"/>
+                </a:ext>
+              </a:extLst>
+            </p:cNvPr>
+            <p:cNvSpPr/>
+            <p:nvPr/>
+          </p:nvSpPr>
+          <p:spPr>
+            <a:xfrm>
+              <a:off x="9896475" y="1962150"/>
+              <a:ext cx="152400" cy="133350"/>
+            </a:xfrm>
+            <a:prstGeom prst="ellipse">
+              <a:avLst/>
+            </a:prstGeom>
+            <a:ln>
+              <a:noFill/>
+            </a:ln>
+          </p:spPr>
+          <p:style>
+            <a:lnRef idx="2">
+              <a:schemeClr val="accent1">
+                <a:shade val="15000"/>
+              </a:schemeClr>
+            </a:lnRef>
+            <a:fillRef idx="1">
+              <a:schemeClr val="accent1"/>
+            </a:fillRef>
+            <a:effectRef idx="0">
+              <a:schemeClr val="accent1"/>
+            </a:effectRef>
+            <a:fontRef idx="minor">
+              <a:schemeClr val="lt1"/>
+            </a:fontRef>
+          </p:style>
+          <p:txBody>
+            <a:bodyPr rtlCol="0" anchor="ctr"/>
+            <a:lstStyle/>
+            <a:p>
+              <a:pPr algn="ctr"/>
+              <a:endParaRPr lang="en-GB">
+                <a:solidFill>
+                  <a:srgbClr val="0070C0"/>
+                </a:solidFill>
+                <a:latin typeface="Courier New" panose="02070309020205020404" pitchFamily="49" charset="0"/>
+                <a:cs typeface="Courier New" panose="02070309020205020404" pitchFamily="49" charset="0"/>
+              </a:endParaRPr>
+            </a:p>
+          </p:txBody>
+        </p:sp>
+        <p:sp>
+          <p:nvSpPr>
+            <p:cNvPr id="2" name="ZoneTexte 1">
+              <a:extLst>
+                <a:ext uri="{FF2B5EF4-FFF2-40B4-BE49-F238E27FC236}">
+                  <a16:creationId xmlns:a16="http://schemas.microsoft.com/office/drawing/2014/main" id="{AB7F8AF9-6CD2-1B6F-4B4C-11B2BA9DEA52}"/>
+                </a:ext>
+              </a:extLst>
+            </p:cNvPr>
+            <p:cNvSpPr txBox="1"/>
+            <p:nvPr/>
+          </p:nvSpPr>
+          <p:spPr>
+            <a:xfrm>
+              <a:off x="8498047" y="1669409"/>
+              <a:ext cx="1149674" cy="369332"/>
+            </a:xfrm>
+            <a:prstGeom prst="rect">
+              <a:avLst/>
+            </a:prstGeom>
+            <a:noFill/>
+          </p:spPr>
+          <p:txBody>
+            <a:bodyPr wrap="none" rtlCol="0">
+              <a:spAutoFit/>
+            </a:bodyPr>
+            <a:lstStyle/>
+            <a:p>
+              <a:r>
+                <a:rPr lang="en-GB" dirty="0">
+                  <a:solidFill>
+                    <a:srgbClr val="0070C0"/>
+                  </a:solidFill>
+                  <a:latin typeface="Courier New" panose="02070309020205020404" pitchFamily="49" charset="0"/>
+                  <a:cs typeface="Courier New" panose="02070309020205020404" pitchFamily="49" charset="0"/>
+                </a:rPr>
+                <a:t>(x1,y1)</a:t>
+              </a:r>
+            </a:p>
+          </p:txBody>
+        </p:sp>
+        <p:sp>
+          <p:nvSpPr>
+            <p:cNvPr id="3" name="ZoneTexte 2">
+              <a:extLst>
+                <a:ext uri="{FF2B5EF4-FFF2-40B4-BE49-F238E27FC236}">
+                  <a16:creationId xmlns:a16="http://schemas.microsoft.com/office/drawing/2014/main" id="{D7359A16-8087-1F2D-C4B4-5CEBBF3824F0}"/>
+                </a:ext>
+              </a:extLst>
+            </p:cNvPr>
+            <p:cNvSpPr txBox="1"/>
+            <p:nvPr/>
+          </p:nvSpPr>
+          <p:spPr>
+            <a:xfrm>
+              <a:off x="10898696" y="1620473"/>
+              <a:ext cx="1149674" cy="369332"/>
+            </a:xfrm>
+            <a:prstGeom prst="rect">
+              <a:avLst/>
+            </a:prstGeom>
+            <a:noFill/>
+          </p:spPr>
+          <p:txBody>
+            <a:bodyPr wrap="none" rtlCol="0">
+              <a:spAutoFit/>
+            </a:bodyPr>
+            <a:lstStyle/>
+            <a:p>
+              <a:r>
+                <a:rPr lang="en-GB" dirty="0">
+                  <a:solidFill>
+                    <a:srgbClr val="0070C0"/>
+                  </a:solidFill>
+                  <a:latin typeface="Courier New" panose="02070309020205020404" pitchFamily="49" charset="0"/>
+                  <a:cs typeface="Courier New" panose="02070309020205020404" pitchFamily="49" charset="0"/>
+                </a:rPr>
+                <a:t>(x2,y2)</a:t>
+              </a:r>
+            </a:p>
+          </p:txBody>
+        </p:sp>
+        <p:sp>
+          <p:nvSpPr>
+            <p:cNvPr id="6" name="ZoneTexte 5">
+              <a:extLst>
+                <a:ext uri="{FF2B5EF4-FFF2-40B4-BE49-F238E27FC236}">
+                  <a16:creationId xmlns:a16="http://schemas.microsoft.com/office/drawing/2014/main" id="{E235B05E-97A4-ACBD-D04C-807F8A561250}"/>
+                </a:ext>
+              </a:extLst>
+            </p:cNvPr>
+            <p:cNvSpPr txBox="1"/>
+            <p:nvPr/>
+          </p:nvSpPr>
+          <p:spPr>
+            <a:xfrm>
+              <a:off x="9188740" y="2670495"/>
+              <a:ext cx="1149674" cy="369332"/>
+            </a:xfrm>
+            <a:prstGeom prst="rect">
+              <a:avLst/>
+            </a:prstGeom>
+            <a:noFill/>
+          </p:spPr>
+          <p:txBody>
+            <a:bodyPr wrap="none" rtlCol="0">
+              <a:spAutoFit/>
+            </a:bodyPr>
+            <a:lstStyle/>
+            <a:p>
+              <a:r>
+                <a:rPr lang="en-GB" dirty="0">
+                  <a:solidFill>
+                    <a:srgbClr val="0070C0"/>
+                  </a:solidFill>
+                  <a:latin typeface="Courier New" panose="02070309020205020404" pitchFamily="49" charset="0"/>
+                  <a:cs typeface="Courier New" panose="02070309020205020404" pitchFamily="49" charset="0"/>
+                </a:rPr>
+                <a:t>(x3,y3)</a:t>
+              </a:r>
+            </a:p>
+          </p:txBody>
+        </p:sp>
+        <p:sp>
+          <p:nvSpPr>
+            <p:cNvPr id="9" name="ZoneTexte 8">
+              <a:extLst>
+                <a:ext uri="{FF2B5EF4-FFF2-40B4-BE49-F238E27FC236}">
+                  <a16:creationId xmlns:a16="http://schemas.microsoft.com/office/drawing/2014/main" id="{61A76FA4-2B7E-5E69-4B43-3DBC0E1852DB}"/>
+                </a:ext>
+              </a:extLst>
+            </p:cNvPr>
+            <p:cNvSpPr txBox="1"/>
+            <p:nvPr/>
+          </p:nvSpPr>
+          <p:spPr>
+            <a:xfrm>
+              <a:off x="10280707" y="650147"/>
+              <a:ext cx="1149674" cy="369332"/>
+            </a:xfrm>
+            <a:prstGeom prst="rect">
+              <a:avLst/>
+            </a:prstGeom>
+            <a:noFill/>
+          </p:spPr>
+          <p:txBody>
+            <a:bodyPr wrap="none" rtlCol="0">
+              <a:spAutoFit/>
+            </a:bodyPr>
+            <a:lstStyle/>
+            <a:p>
+              <a:r>
+                <a:rPr lang="en-GB" dirty="0">
+                  <a:solidFill>
+                    <a:srgbClr val="0070C0"/>
+                  </a:solidFill>
+                  <a:latin typeface="Courier New" panose="02070309020205020404" pitchFamily="49" charset="0"/>
+                  <a:cs typeface="Courier New" panose="02070309020205020404" pitchFamily="49" charset="0"/>
+                </a:rPr>
+                <a:t>(x4,y4)</a:t>
+              </a:r>
+            </a:p>
+          </p:txBody>
+        </p:sp>
+        <p:sp>
+          <p:nvSpPr>
+            <p:cNvPr id="10" name="ZoneTexte 9">
+              <a:extLst>
+                <a:ext uri="{FF2B5EF4-FFF2-40B4-BE49-F238E27FC236}">
+                  <a16:creationId xmlns:a16="http://schemas.microsoft.com/office/drawing/2014/main" id="{EB192303-E378-ED60-D2BA-2DF9CFFEC21C}"/>
+                </a:ext>
+              </a:extLst>
+            </p:cNvPr>
+            <p:cNvSpPr txBox="1"/>
+            <p:nvPr/>
+          </p:nvSpPr>
+          <p:spPr>
+            <a:xfrm>
+              <a:off x="9808127" y="2073478"/>
+              <a:ext cx="1149674" cy="369332"/>
+            </a:xfrm>
+            <a:prstGeom prst="rect">
+              <a:avLst/>
+            </a:prstGeom>
+            <a:noFill/>
+          </p:spPr>
+          <p:txBody>
+            <a:bodyPr wrap="none" rtlCol="0">
+              <a:spAutoFit/>
+            </a:bodyPr>
+            <a:lstStyle/>
+            <a:p>
+              <a:r>
+                <a:rPr lang="en-GB" b="1" noProof="1">
+                  <a:solidFill>
+                    <a:srgbClr val="0070C0"/>
+                  </a:solidFill>
+                  <a:latin typeface="Courier New" panose="02070309020205020404" pitchFamily="49" charset="0"/>
+                  <a:cs typeface="Courier New" panose="02070309020205020404" pitchFamily="49" charset="0"/>
+                </a:rPr>
+                <a:t>(xI,yI)</a:t>
+              </a:r>
+            </a:p>
+          </p:txBody>
+        </p:sp>
+      </p:grpSp>
+      <p:sp>
+        <p:nvSpPr>
+          <p:cNvPr id="12" name="ZoneTexte 11">
+            <a:extLst>
+              <a:ext uri="{FF2B5EF4-FFF2-40B4-BE49-F238E27FC236}">
+                <a16:creationId xmlns:a16="http://schemas.microsoft.com/office/drawing/2014/main" id="{7BE702BC-861F-E163-53BE-DB1AB4559BF1}"/>
+              </a:ext>
+            </a:extLst>
+          </p:cNvPr>
+          <p:cNvSpPr txBox="1"/>
+          <p:nvPr/>
+        </p:nvSpPr>
+        <p:spPr>
+          <a:xfrm>
+            <a:off x="966833" y="1270555"/>
+            <a:ext cx="5190688" cy="461665"/>
+          </a:xfrm>
+          <a:prstGeom prst="rect">
+            <a:avLst/>
+          </a:prstGeom>
+          <a:noFill/>
+        </p:spPr>
+        <p:txBody>
+          <a:bodyPr wrap="square">
+            <a:spAutoFit/>
+          </a:bodyPr>
+          <a:lstStyle/>
+          <a:p>
+            <a:r>
+              <a:rPr lang="en-GB" sz="1200" dirty="0">
+                <a:hlinkClick r:id="rId2"/>
+              </a:rPr>
+              <a:t>https://en.wikipedia.org/wiki/Line%E2%80%93line_intersection</a:t>
+            </a:r>
+            <a:endParaRPr lang="en-GB" sz="1200" dirty="0"/>
+          </a:p>
+          <a:p>
+            <a:endParaRPr lang="en-GB" sz="1200" dirty="0"/>
+          </a:p>
+        </p:txBody>
+      </p:sp>
+      <p:pic>
+        <p:nvPicPr>
+          <p:cNvPr id="15" name="Image 14">
+            <a:extLst>
+              <a:ext uri="{FF2B5EF4-FFF2-40B4-BE49-F238E27FC236}">
+                <a16:creationId xmlns:a16="http://schemas.microsoft.com/office/drawing/2014/main" id="{150FE631-F598-B8B5-E227-D13816FDC933}"/>
+              </a:ext>
+            </a:extLst>
+          </p:cNvPr>
+          <p:cNvPicPr>
+            <a:picLocks noChangeAspect="1"/>
+          </p:cNvPicPr>
+          <p:nvPr/>
+        </p:nvPicPr>
+        <p:blipFill>
+          <a:blip r:embed="rId3"/>
+          <a:stretch>
+            <a:fillRect/>
+          </a:stretch>
+        </p:blipFill>
+        <p:spPr>
+          <a:xfrm>
+            <a:off x="1484851" y="1530189"/>
+            <a:ext cx="4370665" cy="1715738"/>
+          </a:xfrm>
+          <a:prstGeom prst="rect">
+            <a:avLst/>
+          </a:prstGeom>
+        </p:spPr>
+      </p:pic>
+      <p:sp>
+        <p:nvSpPr>
+          <p:cNvPr id="18" name="ZoneTexte 17">
+            <a:extLst>
+              <a:ext uri="{FF2B5EF4-FFF2-40B4-BE49-F238E27FC236}">
+                <a16:creationId xmlns:a16="http://schemas.microsoft.com/office/drawing/2014/main" id="{72CBB9EE-46B6-32B2-A85C-D559A5792DE1}"/>
+              </a:ext>
+            </a:extLst>
+          </p:cNvPr>
+          <p:cNvSpPr txBox="1"/>
+          <p:nvPr/>
+        </p:nvSpPr>
+        <p:spPr>
+          <a:xfrm>
+            <a:off x="4974673" y="2122415"/>
+            <a:ext cx="1119217" cy="261610"/>
+          </a:xfrm>
+          <a:prstGeom prst="rect">
+            <a:avLst/>
+          </a:prstGeom>
+          <a:noFill/>
+        </p:spPr>
+        <p:txBody>
+          <a:bodyPr wrap="none" rtlCol="0">
+            <a:spAutoFit/>
+          </a:bodyPr>
+          <a:lstStyle/>
+          <a:p>
+            <a:r>
+              <a:rPr lang="en-GB" sz="1100" dirty="0">
+                <a:latin typeface="Courier New" panose="02070309020205020404" pitchFamily="49" charset="0"/>
+                <a:cs typeface="Courier New" panose="02070309020205020404" pitchFamily="49" charset="0"/>
+              </a:rPr>
+              <a:t>denominator</a:t>
+            </a:r>
+          </a:p>
+        </p:txBody>
+      </p:sp>
       <p:cxnSp>
         <p:nvCxnSpPr>
-          <p:cNvPr id="7" name="Connecteur droit 6">
-            <a:extLst>
-              <a:ext uri="{FF2B5EF4-FFF2-40B4-BE49-F238E27FC236}">
-                <a16:creationId xmlns:a16="http://schemas.microsoft.com/office/drawing/2014/main" id="{5C8F2D37-33B0-B9D2-9C5A-7CF050FC4F7B}"/>
-              </a:ext>
-            </a:extLst>
-          </p:cNvPr>
-          <p:cNvCxnSpPr/>
+          <p:cNvPr id="20" name="Connecteur droit avec flèche 19">
+            <a:extLst>
+              <a:ext uri="{FF2B5EF4-FFF2-40B4-BE49-F238E27FC236}">
+                <a16:creationId xmlns:a16="http://schemas.microsoft.com/office/drawing/2014/main" id="{4FA7C29D-4ACC-2329-B3E4-915F9B1928FC}"/>
+              </a:ext>
+            </a:extLst>
+          </p:cNvPr>
+          <p:cNvCxnSpPr>
+            <a:cxnSpLocks/>
+            <a:endCxn id="18" idx="1"/>
+          </p:cNvCxnSpPr>
           <p:nvPr/>
         </p:nvCxnSpPr>
         <p:spPr>
           <a:xfrm>
-            <a:off x="8877300" y="2019300"/>
-            <a:ext cx="2447925" cy="0"/>
-          </a:xfrm>
-          <a:prstGeom prst="line">
+            <a:off x="4572000" y="1921079"/>
+            <a:ext cx="402673" cy="332141"/>
+          </a:xfrm>
+          <a:prstGeom prst="straightConnector1">
             <a:avLst/>
           </a:prstGeom>
           <a:ln>
-            <a:headEnd type="none"/>
-            <a:tailEnd type="arrow"/>
+            <a:solidFill>
+              <a:schemeClr val="tx1"/>
+            </a:solidFill>
+            <a:tailEnd type="triangle"/>
           </a:ln>
         </p:spPr>
         <p:style>
@@ -11361,28 +11837,32 @@
       </p:cxnSp>
       <p:cxnSp>
         <p:nvCxnSpPr>
-          <p:cNvPr id="8" name="Connecteur droit 7">
-            <a:extLst>
-              <a:ext uri="{FF2B5EF4-FFF2-40B4-BE49-F238E27FC236}">
-                <a16:creationId xmlns:a16="http://schemas.microsoft.com/office/drawing/2014/main" id="{618C82EF-D61E-8330-9371-27206D39E9AD}"/>
+          <p:cNvPr id="21" name="Connecteur droit avec flèche 20">
+            <a:extLst>
+              <a:ext uri="{FF2B5EF4-FFF2-40B4-BE49-F238E27FC236}">
+                <a16:creationId xmlns:a16="http://schemas.microsoft.com/office/drawing/2014/main" id="{0A29E0B6-6A02-5DF3-06A9-4CC044186669}"/>
               </a:ext>
             </a:extLst>
           </p:cNvPr>
           <p:cNvCxnSpPr>
             <a:cxnSpLocks/>
+            <a:endCxn id="18" idx="1"/>
           </p:cNvCxnSpPr>
           <p:nvPr/>
         </p:nvCxnSpPr>
         <p:spPr>
           <a:xfrm flipV="1">
-            <a:off x="9582150" y="1066800"/>
-            <a:ext cx="904875" cy="1657350"/>
-          </a:xfrm>
-          <a:prstGeom prst="line">
+            <a:off x="4697835" y="2253220"/>
+            <a:ext cx="276838" cy="456424"/>
+          </a:xfrm>
+          <a:prstGeom prst="straightConnector1">
             <a:avLst/>
           </a:prstGeom>
           <a:ln>
-            <a:tailEnd type="arrow"/>
+            <a:solidFill>
+              <a:schemeClr val="tx1"/>
+            </a:solidFill>
+            <a:tailEnd type="triangle"/>
           </a:ln>
         </p:spPr>
         <p:style>
@@ -11402,10 +11882,10 @@
       </p:cxnSp>
       <p:sp>
         <p:nvSpPr>
-          <p:cNvPr id="13" name="Ellipse 12">
-            <a:extLst>
-              <a:ext uri="{FF2B5EF4-FFF2-40B4-BE49-F238E27FC236}">
-                <a16:creationId xmlns:a16="http://schemas.microsoft.com/office/drawing/2014/main" id="{F8AD9E40-E166-F738-CA25-4DC68FEEB88F}"/>
+          <p:cNvPr id="25" name="Rectangle : coins arrondis 24">
+            <a:extLst>
+              <a:ext uri="{FF2B5EF4-FFF2-40B4-BE49-F238E27FC236}">
+                <a16:creationId xmlns:a16="http://schemas.microsoft.com/office/drawing/2014/main" id="{AD324200-B3DE-83FF-F2AB-B97918B84595}"/>
               </a:ext>
             </a:extLst>
           </p:cNvPr>
@@ -11414,12 +11894,19 @@
         </p:nvSpPr>
         <p:spPr>
           <a:xfrm>
-            <a:off x="9896475" y="1962150"/>
-            <a:ext cx="152400" cy="133350"/>
-          </a:xfrm>
-          <a:prstGeom prst="ellipse">
-            <a:avLst/>
-          </a:prstGeom>
+            <a:off x="7558481" y="318782"/>
+            <a:ext cx="3506598" cy="2558642"/>
+          </a:xfrm>
+          <a:prstGeom prst="roundRect">
+            <a:avLst/>
+          </a:prstGeom>
+          <a:noFill/>
+          <a:ln w="9525">
+            <a:solidFill>
+              <a:srgbClr val="0070C0"/>
+            </a:solidFill>
+            <a:prstDash val="dash"/>
+          </a:ln>
         </p:spPr>
         <p:style>
           <a:lnRef idx="2">
@@ -12491,7 +12978,7 @@
         </p:nvSpPr>
         <p:spPr>
           <a:xfrm>
-            <a:off x="1474452" y="4846652"/>
+            <a:off x="1466063" y="4586594"/>
             <a:ext cx="755015" cy="369332"/>
           </a:xfrm>
           <a:prstGeom prst="rect">
@@ -12582,7 +13069,7 @@
         </p:nvSpPr>
         <p:spPr>
           <a:xfrm>
-            <a:off x="1465451" y="2575944"/>
+            <a:off x="1448673" y="2273940"/>
             <a:ext cx="1143518" cy="369332"/>
           </a:xfrm>
           <a:prstGeom prst="rect">
@@ -12979,8 +13466,8 @@
         </p:nvSpPr>
         <p:spPr>
           <a:xfrm>
-            <a:off x="1168400" y="1454150"/>
-            <a:ext cx="617477" cy="369332"/>
+            <a:off x="799285" y="1504484"/>
+            <a:ext cx="1393330" cy="276999"/>
           </a:xfrm>
           <a:prstGeom prst="rect">
             <a:avLst/>
@@ -12991,10 +13478,31 @@
           <a:bodyPr wrap="none" rtlCol="0">
             <a:spAutoFit/>
           </a:bodyPr>
-          <a:lstStyle/>
+          <a:lstStyle>
+            <a:defPPr>
+              <a:defRPr lang="LID4096"/>
+            </a:defPPr>
+            <a:lvl1pPr>
+              <a:defRPr sz="1200">
+                <a:solidFill>
+                  <a:schemeClr val="accent1"/>
+                </a:solidFill>
+                <a:latin typeface="Courier New" panose="02070309020205020404" pitchFamily="49" charset="0"/>
+                <a:cs typeface="Courier New" panose="02070309020205020404" pitchFamily="49" charset="0"/>
+              </a:defRPr>
+            </a:lvl1pPr>
+          </a:lstStyle>
           <a:p>
             <a:r>
               <a:rPr lang="en-GB" dirty="0"/>
+              <a:t>(0,0) – </a:t>
+            </a:r>
+            <a:r>
+              <a:rPr lang="en-GB" dirty="0">
+                <a:solidFill>
+                  <a:srgbClr val="00B050"/>
+                </a:solidFill>
+              </a:rPr>
               <a:t>(0,0)</a:t>
             </a:r>
           </a:p>
@@ -13014,7 +13522,7 @@
         </p:nvSpPr>
         <p:spPr>
           <a:xfrm>
-            <a:off x="5029200" y="5010150"/>
+            <a:off x="5045978" y="4892704"/>
             <a:ext cx="1579278" cy="276999"/>
           </a:xfrm>
           <a:prstGeom prst="rect">
@@ -13055,8 +13563,8 @@
         </p:nvSpPr>
         <p:spPr>
           <a:xfrm>
-            <a:off x="4314825" y="2609850"/>
-            <a:ext cx="1765227" cy="276999"/>
+            <a:off x="4256102" y="2601461"/>
+            <a:ext cx="1547218" cy="253916"/>
           </a:xfrm>
           <a:prstGeom prst="rect">
             <a:avLst/>
@@ -13070,7 +13578,7 @@
           <a:lstStyle/>
           <a:p>
             <a:r>
-              <a:rPr lang="en-GB" sz="1200" dirty="0">
+              <a:rPr lang="en-GB" sz="1050" dirty="0">
                 <a:solidFill>
                   <a:srgbClr val="01A797"/>
                 </a:solidFill>
@@ -13080,7 +13588,7 @@
               <a:t>(</a:t>
             </a:r>
             <a:r>
-              <a:rPr lang="en-GB" sz="1200" dirty="0" err="1">
+              <a:rPr lang="en-GB" sz="1050" dirty="0" err="1">
                 <a:solidFill>
                   <a:srgbClr val="01A797"/>
                 </a:solidFill>
@@ -13090,7 +13598,7 @@
               <a:t>dWidth</a:t>
             </a:r>
             <a:r>
-              <a:rPr lang="en-GB" sz="1200" dirty="0">
+              <a:rPr lang="en-GB" sz="1050" dirty="0">
                 <a:solidFill>
                   <a:srgbClr val="01A797"/>
                 </a:solidFill>
@@ -13100,7 +13608,7 @@
               <a:t>, </a:t>
             </a:r>
             <a:r>
-              <a:rPr lang="en-GB" sz="1200" dirty="0" err="1">
+              <a:rPr lang="en-GB" sz="1050" dirty="0" err="1">
                 <a:solidFill>
                   <a:srgbClr val="01A797"/>
                 </a:solidFill>
@@ -13110,7 +13618,7 @@
               <a:t>dHeight</a:t>
             </a:r>
             <a:r>
-              <a:rPr lang="en-GB" sz="1200" dirty="0">
+              <a:rPr lang="en-GB" sz="1050" dirty="0">
                 <a:solidFill>
                   <a:srgbClr val="01A797"/>
                 </a:solidFill>
@@ -13574,8 +14082,8 @@
         </p:nvSpPr>
         <p:spPr>
           <a:xfrm>
-            <a:off x="6048375" y="1971675"/>
-            <a:ext cx="5581650" cy="2862322"/>
+            <a:off x="6048374" y="1971675"/>
+            <a:ext cx="5989827" cy="3216265"/>
           </a:xfrm>
           <a:prstGeom prst="rect">
             <a:avLst/>
@@ -13689,7 +14197,35 @@
                   <a:srgbClr val="0070C0"/>
                 </a:solidFill>
               </a:rPr>
-              <a:t> = amplitude * </a:t>
+              <a:t> = </a:t>
+            </a:r>
+            <a:r>
+              <a:rPr lang="en-GB" sz="1200" dirty="0" err="1">
+                <a:solidFill>
+                  <a:srgbClr val="FF0000"/>
+                </a:solidFill>
+                <a:latin typeface="Courier New" panose="02070309020205020404" pitchFamily="49" charset="0"/>
+                <a:cs typeface="Courier New" panose="02070309020205020404" pitchFamily="49" charset="0"/>
+              </a:rPr>
+              <a:t>minAngle</a:t>
+            </a:r>
+            <a:r>
+              <a:rPr lang="en-GB" sz="1200" dirty="0">
+                <a:solidFill>
+                  <a:srgbClr val="FF0000"/>
+                </a:solidFill>
+                <a:latin typeface="Courier New" panose="02070309020205020404" pitchFamily="49" charset="0"/>
+                <a:cs typeface="Courier New" panose="02070309020205020404" pitchFamily="49" charset="0"/>
+              </a:rPr>
+              <a:t> + </a:t>
+            </a:r>
+            <a:r>
+              <a:rPr lang="fr-BE" sz="1200" dirty="0">
+                <a:solidFill>
+                  <a:srgbClr val="0070C0"/>
+                </a:solidFill>
+              </a:rPr>
+              <a:t>amplitude * </a:t>
             </a:r>
             <a:r>
               <a:rPr lang="el-GR" sz="1200" dirty="0">
@@ -13926,7 +14462,7 @@
                 <a:effectLst/>
                 <a:latin typeface="Consolas" panose="020B0609020204030204" pitchFamily="49" charset="0"/>
               </a:rPr>
-              <a:t>(0,0, </a:t>
+              <a:t>(0,height, </a:t>
             </a:r>
             <a:r>
               <a:rPr lang="en-US" sz="1100" dirty="0" err="1">
@@ -14069,7 +14605,7 @@
                 <a:latin typeface="Courier New" panose="02070309020205020404" pitchFamily="49" charset="0"/>
                 <a:cs typeface="Courier New" panose="02070309020205020404" pitchFamily="49" charset="0"/>
               </a:rPr>
-              <a:t>) = ( X * </a:t>
+              <a:t>)   = ( X  * </a:t>
             </a:r>
             <a:r>
               <a:rPr lang="en-GB" sz="1200" dirty="0" err="1">
@@ -14089,7 +14625,7 @@
                 <a:latin typeface="Courier New" panose="02070309020205020404" pitchFamily="49" charset="0"/>
                 <a:cs typeface="Courier New" panose="02070309020205020404" pitchFamily="49" charset="0"/>
               </a:rPr>
-              <a:t>/width, Y * </a:t>
+              <a:t>/width,  Y * </a:t>
             </a:r>
             <a:r>
               <a:rPr lang="en-GB" sz="1200" dirty="0" err="1">
@@ -14109,8 +14645,157 @@
                 <a:latin typeface="Courier New" panose="02070309020205020404" pitchFamily="49" charset="0"/>
                 <a:cs typeface="Courier New" panose="02070309020205020404" pitchFamily="49" charset="0"/>
               </a:rPr>
-              <a:t>/height)</a:t>
-            </a:r>
+              <a:t>/height )</a:t>
+            </a:r>
+          </a:p>
+          <a:p>
+            <a:pPr marL="171450" indent="-171450">
+              <a:buFont typeface="Arial" panose="020B0604020202020204" pitchFamily="34" charset="0"/>
+              <a:buChar char="•"/>
+            </a:pPr>
+            <a:r>
+              <a:rPr lang="en-GB" sz="1200" dirty="0">
+                <a:solidFill>
+                  <a:srgbClr val="01A797"/>
+                </a:solidFill>
+                <a:latin typeface="Courier New" panose="02070309020205020404" pitchFamily="49" charset="0"/>
+                <a:cs typeface="Courier New" panose="02070309020205020404" pitchFamily="49" charset="0"/>
+              </a:rPr>
+              <a:t>(</a:t>
+            </a:r>
+            <a:r>
+              <a:rPr lang="en-GB" sz="1200" dirty="0" err="1">
+                <a:solidFill>
+                  <a:srgbClr val="01A797"/>
+                </a:solidFill>
+                <a:latin typeface="Courier New" panose="02070309020205020404" pitchFamily="49" charset="0"/>
+                <a:cs typeface="Courier New" panose="02070309020205020404" pitchFamily="49" charset="0"/>
+              </a:rPr>
+              <a:t>dXi</a:t>
+            </a:r>
+            <a:r>
+              <a:rPr lang="en-GB" sz="1200" dirty="0">
+                <a:solidFill>
+                  <a:srgbClr val="01A797"/>
+                </a:solidFill>
+                <a:latin typeface="Courier New" panose="02070309020205020404" pitchFamily="49" charset="0"/>
+                <a:cs typeface="Courier New" panose="02070309020205020404" pitchFamily="49" charset="0"/>
+              </a:rPr>
+              <a:t>, </a:t>
+            </a:r>
+            <a:r>
+              <a:rPr lang="en-GB" sz="1200" dirty="0" err="1">
+                <a:solidFill>
+                  <a:srgbClr val="01A797"/>
+                </a:solidFill>
+                <a:latin typeface="Courier New" panose="02070309020205020404" pitchFamily="49" charset="0"/>
+                <a:cs typeface="Courier New" panose="02070309020205020404" pitchFamily="49" charset="0"/>
+              </a:rPr>
+              <a:t>dYi</a:t>
+            </a:r>
+            <a:r>
+              <a:rPr lang="en-GB" sz="1200" dirty="0">
+                <a:solidFill>
+                  <a:srgbClr val="01A797"/>
+                </a:solidFill>
+                <a:latin typeface="Courier New" panose="02070309020205020404" pitchFamily="49" charset="0"/>
+                <a:cs typeface="Courier New" panose="02070309020205020404" pitchFamily="49" charset="0"/>
+              </a:rPr>
+              <a:t>) = ( </a:t>
+            </a:r>
+            <a:r>
+              <a:rPr lang="en-GB" sz="1200" dirty="0" err="1">
+                <a:solidFill>
+                  <a:srgbClr val="01A797"/>
+                </a:solidFill>
+                <a:latin typeface="Courier New" panose="02070309020205020404" pitchFamily="49" charset="0"/>
+                <a:cs typeface="Courier New" panose="02070309020205020404" pitchFamily="49" charset="0"/>
+              </a:rPr>
+              <a:t>xI</a:t>
+            </a:r>
+            <a:r>
+              <a:rPr lang="en-GB" sz="1200" dirty="0">
+                <a:solidFill>
+                  <a:srgbClr val="01A797"/>
+                </a:solidFill>
+                <a:latin typeface="Courier New" panose="02070309020205020404" pitchFamily="49" charset="0"/>
+                <a:cs typeface="Courier New" panose="02070309020205020404" pitchFamily="49" charset="0"/>
+              </a:rPr>
+              <a:t> * </a:t>
+            </a:r>
+            <a:r>
+              <a:rPr lang="en-GB" sz="1200" dirty="0" err="1">
+                <a:solidFill>
+                  <a:srgbClr val="01A797"/>
+                </a:solidFill>
+                <a:latin typeface="Courier New" panose="02070309020205020404" pitchFamily="49" charset="0"/>
+                <a:cs typeface="Courier New" panose="02070309020205020404" pitchFamily="49" charset="0"/>
+              </a:rPr>
+              <a:t>dWidth</a:t>
+            </a:r>
+            <a:r>
+              <a:rPr lang="en-GB" sz="1200" dirty="0">
+                <a:solidFill>
+                  <a:srgbClr val="01A797"/>
+                </a:solidFill>
+                <a:latin typeface="Courier New" panose="02070309020205020404" pitchFamily="49" charset="0"/>
+                <a:cs typeface="Courier New" panose="02070309020205020404" pitchFamily="49" charset="0"/>
+              </a:rPr>
+              <a:t>/width, </a:t>
+            </a:r>
+            <a:r>
+              <a:rPr lang="en-GB" sz="1200" dirty="0" err="1">
+                <a:solidFill>
+                  <a:srgbClr val="01A797"/>
+                </a:solidFill>
+                <a:latin typeface="Courier New" panose="02070309020205020404" pitchFamily="49" charset="0"/>
+                <a:cs typeface="Courier New" panose="02070309020205020404" pitchFamily="49" charset="0"/>
+              </a:rPr>
+              <a:t>yI</a:t>
+            </a:r>
+            <a:r>
+              <a:rPr lang="en-GB" sz="1200" dirty="0">
+                <a:solidFill>
+                  <a:srgbClr val="01A797"/>
+                </a:solidFill>
+                <a:latin typeface="Courier New" panose="02070309020205020404" pitchFamily="49" charset="0"/>
+                <a:cs typeface="Courier New" panose="02070309020205020404" pitchFamily="49" charset="0"/>
+              </a:rPr>
+              <a:t> * </a:t>
+            </a:r>
+            <a:r>
+              <a:rPr lang="en-GB" sz="1200" dirty="0" err="1">
+                <a:solidFill>
+                  <a:srgbClr val="01A797"/>
+                </a:solidFill>
+                <a:latin typeface="Courier New" panose="02070309020205020404" pitchFamily="49" charset="0"/>
+                <a:cs typeface="Courier New" panose="02070309020205020404" pitchFamily="49" charset="0"/>
+              </a:rPr>
+              <a:t>dHeight</a:t>
+            </a:r>
+            <a:r>
+              <a:rPr lang="en-GB" sz="1200" dirty="0">
+                <a:solidFill>
+                  <a:srgbClr val="01A797"/>
+                </a:solidFill>
+                <a:latin typeface="Courier New" panose="02070309020205020404" pitchFamily="49" charset="0"/>
+                <a:cs typeface="Courier New" panose="02070309020205020404" pitchFamily="49" charset="0"/>
+              </a:rPr>
+              <a:t>/height )</a:t>
+            </a:r>
+          </a:p>
+          <a:p>
+            <a:pPr marL="171450" indent="-171450">
+              <a:buFont typeface="Arial" panose="020B0604020202020204" pitchFamily="34" charset="0"/>
+              <a:buChar char="•"/>
+            </a:pPr>
+            <a:endParaRPr lang="en-GB" sz="1200" dirty="0">
+              <a:solidFill>
+                <a:srgbClr val="01A797"/>
+              </a:solidFill>
+              <a:latin typeface="Courier New" panose="02070309020205020404" pitchFamily="49" charset="0"/>
+              <a:cs typeface="Courier New" panose="02070309020205020404" pitchFamily="49" charset="0"/>
+            </a:endParaRPr>
           </a:p>
           <a:p>
             <a:pPr marL="171450" indent="-171450">
@@ -14169,6 +14854,9 @@
           <a:prstGeom prst="ellipse">
             <a:avLst/>
           </a:prstGeom>
+          <a:ln>
+            <a:noFill/>
+          </a:ln>
         </p:spPr>
         <p:style>
           <a:lnRef idx="2">
@@ -14296,6 +14984,9 @@
           <a:prstGeom prst="ellipse">
             <a:avLst/>
           </a:prstGeom>
+          <a:ln>
+            <a:noFill/>
+          </a:ln>
         </p:spPr>
         <p:style>
           <a:lnRef idx="2">
@@ -14503,6 +15194,88 @@
                 <a:cs typeface="Courier New" panose="02070309020205020404" pitchFamily="49" charset="0"/>
               </a:rPr>
               <a:t>)</a:t>
+            </a:r>
+          </a:p>
+        </p:txBody>
+      </p:sp>
+      <p:sp>
+        <p:nvSpPr>
+          <p:cNvPr id="6" name="ZoneTexte 5">
+            <a:extLst>
+              <a:ext uri="{FF2B5EF4-FFF2-40B4-BE49-F238E27FC236}">
+                <a16:creationId xmlns:a16="http://schemas.microsoft.com/office/drawing/2014/main" id="{70A4B4CE-F4BC-C3E1-F314-DF68FA5E4E29}"/>
+              </a:ext>
+            </a:extLst>
+          </p:cNvPr>
+          <p:cNvSpPr txBox="1"/>
+          <p:nvPr/>
+        </p:nvSpPr>
+        <p:spPr>
+          <a:xfrm>
+            <a:off x="1087773" y="4868936"/>
+            <a:ext cx="1207382" cy="276999"/>
+          </a:xfrm>
+          <a:prstGeom prst="rect">
+            <a:avLst/>
+          </a:prstGeom>
+          <a:noFill/>
+        </p:spPr>
+        <p:txBody>
+          <a:bodyPr wrap="none" rtlCol="0">
+            <a:spAutoFit/>
+          </a:bodyPr>
+          <a:lstStyle/>
+          <a:p>
+            <a:r>
+              <a:rPr lang="en-GB" sz="1200" dirty="0">
+                <a:solidFill>
+                  <a:schemeClr val="accent1"/>
+                </a:solidFill>
+                <a:latin typeface="Courier New" panose="02070309020205020404" pitchFamily="49" charset="0"/>
+                <a:cs typeface="Courier New" panose="02070309020205020404" pitchFamily="49" charset="0"/>
+              </a:rPr>
+              <a:t>(0, height)</a:t>
+            </a:r>
+          </a:p>
+        </p:txBody>
+      </p:sp>
+      <p:sp>
+        <p:nvSpPr>
+          <p:cNvPr id="8" name="ZoneTexte 7">
+            <a:extLst>
+              <a:ext uri="{FF2B5EF4-FFF2-40B4-BE49-F238E27FC236}">
+                <a16:creationId xmlns:a16="http://schemas.microsoft.com/office/drawing/2014/main" id="{3ADAE88B-2DCC-A2F8-0923-DD5C210B9A74}"/>
+              </a:ext>
+            </a:extLst>
+          </p:cNvPr>
+          <p:cNvSpPr txBox="1"/>
+          <p:nvPr/>
+        </p:nvSpPr>
+        <p:spPr>
+          <a:xfrm>
+            <a:off x="5248712" y="1496561"/>
+            <a:ext cx="1114408" cy="276999"/>
+          </a:xfrm>
+          <a:prstGeom prst="rect">
+            <a:avLst/>
+          </a:prstGeom>
+          <a:noFill/>
+        </p:spPr>
+        <p:txBody>
+          <a:bodyPr wrap="none" rtlCol="0">
+            <a:spAutoFit/>
+          </a:bodyPr>
+          <a:lstStyle/>
+          <a:p>
+            <a:r>
+              <a:rPr lang="en-GB" sz="1200" dirty="0">
+                <a:solidFill>
+                  <a:schemeClr val="accent1"/>
+                </a:solidFill>
+                <a:latin typeface="Courier New" panose="02070309020205020404" pitchFamily="49" charset="0"/>
+                <a:cs typeface="Courier New" panose="02070309020205020404" pitchFamily="49" charset="0"/>
+              </a:rPr>
+              <a:t>(width, 0)</a:t>
             </a:r>
           </a:p>
         </p:txBody>

</xml_diff>